<commit_message>
worked to refine notebook and preso
</commit_message>
<xml_diff>
--- a/Covid19Preso.pptx
+++ b/Covid19Preso.pptx
@@ -5,10 +5,10 @@
     <p:sldMasterId id="2147483648" r:id="rId1"/>
   </p:sldMasterIdLst>
   <p:notesMasterIdLst>
-    <p:notesMasterId r:id="rId13"/>
+    <p:notesMasterId r:id="rId14"/>
   </p:notesMasterIdLst>
   <p:handoutMasterIdLst>
-    <p:handoutMasterId r:id="rId14"/>
+    <p:handoutMasterId r:id="rId15"/>
   </p:handoutMasterIdLst>
   <p:sldIdLst>
     <p:sldId id="256" r:id="rId2"/>
@@ -20,8 +20,9 @@
     <p:sldId id="262" r:id="rId8"/>
     <p:sldId id="268" r:id="rId9"/>
     <p:sldId id="259" r:id="rId10"/>
-    <p:sldId id="266" r:id="rId11"/>
-    <p:sldId id="269" r:id="rId12"/>
+    <p:sldId id="270" r:id="rId11"/>
+    <p:sldId id="266" r:id="rId12"/>
+    <p:sldId id="269" r:id="rId13"/>
   </p:sldIdLst>
   <p:sldSz cx="12192000" cy="6858000"/>
   <p:notesSz cx="6858000" cy="9144000"/>
@@ -142,6 +143,18 @@
 </p:presentation>
 </file>
 
+<file path=ppt/commentAuthors.xml><?xml version="1.0" encoding="utf-8"?>
+<p:cmAuthorLst xmlns:a="http://schemas.openxmlformats.org/drawingml/2006/main" xmlns:r="http://schemas.openxmlformats.org/officeDocument/2006/relationships" xmlns:p="http://schemas.openxmlformats.org/presentationml/2006/main">
+  <p:cmAuthor id="1" name="Andrea Osika -X (aosika - BAY AREA TECHWORKERS at Cisco)" initials="AO-(-BATaC" lastIdx="1" clrIdx="0">
+    <p:extLst>
+      <p:ext uri="{19B8F6BF-5375-455C-9EA6-DF929625EA0E}">
+        <p15:presenceInfo xmlns:p15="http://schemas.microsoft.com/office/powerpoint/2012/main" userId="S::aosika@cisco.com::ee286a3d-2621-4912-b6b7-c2c175282c1e" providerId="AD"/>
+      </p:ext>
+    </p:extLst>
+  </p:cmAuthor>
+</p:cmAuthorLst>
+</file>
+
 <file path=ppt/handoutMasters/handoutMaster1.xml><?xml version="1.0" encoding="utf-8"?>
 <p:handoutMaster xmlns:a="http://schemas.openxmlformats.org/drawingml/2006/main" xmlns:r="http://schemas.openxmlformats.org/officeDocument/2006/relationships" xmlns:p="http://schemas.openxmlformats.org/presentationml/2006/main">
   <p:cSld>
@@ -224,7 +237,7 @@
           <a:p>
             <a:fld id="{043B725B-653D-4166-A8E9-72A38A1847CF}" type="datetimeFigureOut">
               <a:rPr lang="en-US"/>
-              <a:t>4/29/2020</a:t>
+              <a:t>4/30/2020</a:t>
             </a:fld>
             <a:endParaRPr/>
           </a:p>
@@ -389,7 +402,7 @@
           <a:p>
             <a:fld id="{783F64CD-0576-4A9A-BD06-7889D6E60BDC}" type="datetimeFigureOut">
               <a:rPr lang="en-US"/>
-              <a:t>4/29/2020</a:t>
+              <a:t>4/30/2020</a:t>
             </a:fld>
             <a:endParaRPr/>
           </a:p>
@@ -1499,7 +1512,7 @@
           <a:p>
             <a:fld id="{9555D449-B875-4B8D-8E66-224D27E54C9A}" type="slidenum">
               <a:rPr lang="en-US" smtClean="0"/>
-              <a:t>11</a:t>
+              <a:t>12</a:t>
             </a:fld>
             <a:endParaRPr lang="en-US"/>
           </a:p>
@@ -1854,7 +1867,7 @@
           <a:p>
             <a:fld id="{37CC0096-1860-4642-9CD2-0079EA5E7CD1}" type="datetimeFigureOut">
               <a:rPr lang="en-US"/>
-              <a:t>4/29/2020</a:t>
+              <a:t>4/30/2020</a:t>
             </a:fld>
             <a:endParaRPr/>
           </a:p>
@@ -2103,7 +2116,7 @@
           <a:p>
             <a:fld id="{37CC0096-1860-4642-9CD2-0079EA5E7CD1}" type="datetimeFigureOut">
               <a:rPr lang="en-US"/>
-              <a:t>4/29/2020</a:t>
+              <a:t>4/30/2020</a:t>
             </a:fld>
             <a:endParaRPr/>
           </a:p>
@@ -2289,7 +2302,7 @@
           <a:p>
             <a:fld id="{37CC0096-1860-4642-9CD2-0079EA5E7CD1}" type="datetimeFigureOut">
               <a:rPr lang="en-US"/>
-              <a:t>4/29/2020</a:t>
+              <a:t>4/30/2020</a:t>
             </a:fld>
             <a:endParaRPr/>
           </a:p>
@@ -2820,7 +2833,7 @@
           <a:p>
             <a:fld id="{37CC0096-1860-4642-9CD2-0079EA5E7CD1}" type="datetimeFigureOut">
               <a:rPr lang="en-US"/>
-              <a:t>4/29/2020</a:t>
+              <a:t>4/30/2020</a:t>
             </a:fld>
             <a:endParaRPr/>
           </a:p>
@@ -3272,7 +3285,7 @@
           <a:p>
             <a:fld id="{37CC0096-1860-4642-9CD2-0079EA5E7CD1}" type="datetimeFigureOut">
               <a:rPr lang="en-US"/>
-              <a:t>4/29/2020</a:t>
+              <a:t>4/30/2020</a:t>
             </a:fld>
             <a:endParaRPr/>
           </a:p>
@@ -3402,7 +3415,7 @@
           <a:p>
             <a:fld id="{37CC0096-1860-4642-9CD2-0079EA5E7CD1}" type="datetimeFigureOut">
               <a:rPr lang="en-US"/>
-              <a:t>4/29/2020</a:t>
+              <a:t>4/30/2020</a:t>
             </a:fld>
             <a:endParaRPr/>
           </a:p>
@@ -3509,7 +3522,7 @@
           <a:p>
             <a:fld id="{37CC0096-1860-4642-9CD2-0079EA5E7CD1}" type="datetimeFigureOut">
               <a:rPr lang="en-US"/>
-              <a:t>4/29/2020</a:t>
+              <a:t>4/30/2020</a:t>
             </a:fld>
             <a:endParaRPr/>
           </a:p>
@@ -4498,7 +4511,7 @@
             <a:fld id="{37CC0096-1860-4642-9CD2-0079EA5E7CD1}" type="datetimeFigureOut">
               <a:rPr lang="en-US" smtClean="0"/>
               <a:pPr/>
-              <a:t>4/29/2020</a:t>
+              <a:t>4/30/2020</a:t>
             </a:fld>
             <a:endParaRPr lang="en-US" dirty="0"/>
           </a:p>
@@ -5073,6 +5086,557 @@
       </p:grpSpPr>
       <p:sp>
         <p:nvSpPr>
+          <p:cNvPr id="10" name="Rectangle 9">
+            <a:extLst>
+              <a:ext uri="{FF2B5EF4-FFF2-40B4-BE49-F238E27FC236}">
+                <a16:creationId xmlns:a16="http://schemas.microsoft.com/office/drawing/2014/main" id="{F3702304-2283-4EE7-AD6E-8DBCE2E9213E}"/>
+              </a:ext>
+            </a:extLst>
+          </p:cNvPr>
+          <p:cNvSpPr/>
+          <p:nvPr/>
+        </p:nvSpPr>
+        <p:spPr>
+          <a:xfrm>
+            <a:off x="5846056" y="1899920"/>
+            <a:ext cx="3145544" cy="4572000"/>
+          </a:xfrm>
+          <a:prstGeom prst="rect">
+            <a:avLst/>
+          </a:prstGeom>
+        </p:spPr>
+        <p:style>
+          <a:lnRef idx="2">
+            <a:schemeClr val="dk1">
+              <a:shade val="50000"/>
+            </a:schemeClr>
+          </a:lnRef>
+          <a:fillRef idx="1">
+            <a:schemeClr val="dk1"/>
+          </a:fillRef>
+          <a:effectRef idx="0">
+            <a:schemeClr val="dk1"/>
+          </a:effectRef>
+          <a:fontRef idx="minor">
+            <a:schemeClr val="lt1"/>
+          </a:fontRef>
+        </p:style>
+        <p:txBody>
+          <a:bodyPr rtlCol="0" anchor="ctr"/>
+          <a:lstStyle/>
+          <a:p>
+            <a:pPr algn="ctr"/>
+            <a:endParaRPr lang="en-US" dirty="0"/>
+          </a:p>
+        </p:txBody>
+      </p:sp>
+      <p:sp>
+        <p:nvSpPr>
+          <p:cNvPr id="5" name="Rectangle 4">
+            <a:extLst>
+              <a:ext uri="{FF2B5EF4-FFF2-40B4-BE49-F238E27FC236}">
+                <a16:creationId xmlns:a16="http://schemas.microsoft.com/office/drawing/2014/main" id="{D5C32FAE-7148-4AF8-800E-5FA28CBA1388}"/>
+              </a:ext>
+            </a:extLst>
+          </p:cNvPr>
+          <p:cNvSpPr/>
+          <p:nvPr/>
+        </p:nvSpPr>
+        <p:spPr>
+          <a:xfrm>
+            <a:off x="152400" y="1905000"/>
+            <a:ext cx="5257800" cy="4572000"/>
+          </a:xfrm>
+          <a:prstGeom prst="rect">
+            <a:avLst/>
+          </a:prstGeom>
+        </p:spPr>
+        <p:style>
+          <a:lnRef idx="2">
+            <a:schemeClr val="dk1">
+              <a:shade val="50000"/>
+            </a:schemeClr>
+          </a:lnRef>
+          <a:fillRef idx="1">
+            <a:schemeClr val="dk1"/>
+          </a:fillRef>
+          <a:effectRef idx="0">
+            <a:schemeClr val="dk1"/>
+          </a:effectRef>
+          <a:fontRef idx="minor">
+            <a:schemeClr val="lt1"/>
+          </a:fontRef>
+        </p:style>
+        <p:txBody>
+          <a:bodyPr rtlCol="0" anchor="ctr"/>
+          <a:lstStyle/>
+          <a:p>
+            <a:pPr algn="ctr"/>
+            <a:endParaRPr lang="en-US"/>
+          </a:p>
+        </p:txBody>
+      </p:sp>
+      <p:sp>
+        <p:nvSpPr>
+          <p:cNvPr id="2" name="Title 1">
+            <a:extLst>
+              <a:ext uri="{FF2B5EF4-FFF2-40B4-BE49-F238E27FC236}">
+                <a16:creationId xmlns:a16="http://schemas.microsoft.com/office/drawing/2014/main" id="{7A99AB44-4069-460E-AC9C-200A43E2671D}"/>
+              </a:ext>
+            </a:extLst>
+          </p:cNvPr>
+          <p:cNvSpPr>
+            <a:spLocks noGrp="1"/>
+          </p:cNvSpPr>
+          <p:nvPr>
+            <p:ph type="title"/>
+          </p:nvPr>
+        </p:nvSpPr>
+        <p:spPr/>
+        <p:txBody>
+          <a:bodyPr/>
+          <a:lstStyle/>
+          <a:p>
+            <a:r>
+              <a:rPr lang="en-US" dirty="0"/>
+              <a:t>Recommendations:</a:t>
+            </a:r>
+          </a:p>
+        </p:txBody>
+      </p:sp>
+      <p:pic>
+        <p:nvPicPr>
+          <p:cNvPr id="1026" name="Picture 2" descr="Social Distancing Images, Stock Photos &amp; Vectors | Shutterstock">
+            <a:extLst>
+              <a:ext uri="{FF2B5EF4-FFF2-40B4-BE49-F238E27FC236}">
+                <a16:creationId xmlns:a16="http://schemas.microsoft.com/office/drawing/2014/main" id="{2561FE4D-521D-4F43-9DC3-27944E6DD7B0}"/>
+              </a:ext>
+            </a:extLst>
+          </p:cNvPr>
+          <p:cNvPicPr>
+            <a:picLocks noChangeAspect="1" noChangeArrowheads="1"/>
+          </p:cNvPicPr>
+          <p:nvPr/>
+        </p:nvPicPr>
+        <p:blipFill>
+          <a:blip r:embed="rId2">
+            <a:duotone>
+              <a:schemeClr val="accent1">
+                <a:shade val="45000"/>
+                <a:satMod val="135000"/>
+              </a:schemeClr>
+              <a:prstClr val="white"/>
+            </a:duotone>
+            <a:extLst>
+              <a:ext uri="{28A0092B-C50C-407E-A947-70E740481C1C}">
+                <a14:useLocalDpi xmlns:a14="http://schemas.microsoft.com/office/drawing/2010/main" val="0"/>
+              </a:ext>
+            </a:extLst>
+          </a:blip>
+          <a:srcRect/>
+          <a:stretch>
+            <a:fillRect/>
+          </a:stretch>
+        </p:blipFill>
+        <p:spPr bwMode="auto">
+          <a:xfrm>
+            <a:off x="429260" y="2341244"/>
+            <a:ext cx="1942609" cy="2095500"/>
+          </a:xfrm>
+          <a:prstGeom prst="rect">
+            <a:avLst/>
+          </a:prstGeom>
+          <a:noFill/>
+          <a:extLst>
+            <a:ext uri="{909E8E84-426E-40DD-AFC4-6F175D3DCCD1}">
+              <a14:hiddenFill xmlns:a14="http://schemas.microsoft.com/office/drawing/2010/main">
+                <a:solidFill>
+                  <a:srgbClr val="FFFFFF"/>
+                </a:solidFill>
+              </a14:hiddenFill>
+            </a:ext>
+          </a:extLst>
+        </p:spPr>
+      </p:pic>
+      <p:pic>
+        <p:nvPicPr>
+          <p:cNvPr id="1028" name="Picture 4" descr="Hand Wash Icons - Download Free Vector Icons | Noun Project">
+            <a:extLst>
+              <a:ext uri="{FF2B5EF4-FFF2-40B4-BE49-F238E27FC236}">
+                <a16:creationId xmlns:a16="http://schemas.microsoft.com/office/drawing/2014/main" id="{BADDB36B-0D0B-45D2-A0D5-C1A919EDAE87}"/>
+              </a:ext>
+            </a:extLst>
+          </p:cNvPr>
+          <p:cNvPicPr>
+            <a:picLocks noChangeAspect="1" noChangeArrowheads="1"/>
+          </p:cNvPicPr>
+          <p:nvPr/>
+        </p:nvPicPr>
+        <p:blipFill>
+          <a:blip r:embed="rId3">
+            <a:duotone>
+              <a:schemeClr val="accent1">
+                <a:shade val="45000"/>
+                <a:satMod val="135000"/>
+              </a:schemeClr>
+              <a:prstClr val="white"/>
+            </a:duotone>
+            <a:extLst>
+              <a:ext uri="{28A0092B-C50C-407E-A947-70E740481C1C}">
+                <a14:useLocalDpi xmlns:a14="http://schemas.microsoft.com/office/drawing/2010/main" val="0"/>
+              </a:ext>
+            </a:extLst>
+          </a:blip>
+          <a:srcRect/>
+          <a:stretch>
+            <a:fillRect/>
+          </a:stretch>
+        </p:blipFill>
+        <p:spPr bwMode="auto">
+          <a:xfrm>
+            <a:off x="2807725" y="2341245"/>
+            <a:ext cx="2095499" cy="2095499"/>
+          </a:xfrm>
+          <a:prstGeom prst="rect">
+            <a:avLst/>
+          </a:prstGeom>
+          <a:noFill/>
+          <a:extLst>
+            <a:ext uri="{909E8E84-426E-40DD-AFC4-6F175D3DCCD1}">
+              <a14:hiddenFill xmlns:a14="http://schemas.microsoft.com/office/drawing/2010/main">
+                <a:solidFill>
+                  <a:srgbClr val="FFFFFF"/>
+                </a:solidFill>
+              </a14:hiddenFill>
+            </a:ext>
+          </a:extLst>
+        </p:spPr>
+      </p:pic>
+      <p:pic>
+        <p:nvPicPr>
+          <p:cNvPr id="1030" name="Picture 6" descr="No Travel Icon of Colored Outline style - Available in SVG, PNG ...">
+            <a:extLst>
+              <a:ext uri="{FF2B5EF4-FFF2-40B4-BE49-F238E27FC236}">
+                <a16:creationId xmlns:a16="http://schemas.microsoft.com/office/drawing/2014/main" id="{9BC5219A-5F95-4093-9266-2A19CEF8FB54}"/>
+              </a:ext>
+            </a:extLst>
+          </p:cNvPr>
+          <p:cNvPicPr>
+            <a:picLocks noChangeAspect="1" noChangeArrowheads="1"/>
+          </p:cNvPicPr>
+          <p:nvPr/>
+        </p:nvPicPr>
+        <p:blipFill>
+          <a:blip r:embed="rId4">
+            <a:duotone>
+              <a:schemeClr val="accent1">
+                <a:shade val="45000"/>
+                <a:satMod val="135000"/>
+              </a:schemeClr>
+              <a:prstClr val="white"/>
+            </a:duotone>
+            <a:extLst>
+              <a:ext uri="{28A0092B-C50C-407E-A947-70E740481C1C}">
+                <a14:useLocalDpi xmlns:a14="http://schemas.microsoft.com/office/drawing/2010/main" val="0"/>
+              </a:ext>
+            </a:extLst>
+          </a:blip>
+          <a:srcRect/>
+          <a:stretch>
+            <a:fillRect/>
+          </a:stretch>
+        </p:blipFill>
+        <p:spPr bwMode="auto">
+          <a:xfrm>
+            <a:off x="6238876" y="2242820"/>
+            <a:ext cx="2219324" cy="2219324"/>
+          </a:xfrm>
+          <a:prstGeom prst="rect">
+            <a:avLst/>
+          </a:prstGeom>
+          <a:noFill/>
+          <a:extLst>
+            <a:ext uri="{909E8E84-426E-40DD-AFC4-6F175D3DCCD1}">
+              <a14:hiddenFill xmlns:a14="http://schemas.microsoft.com/office/drawing/2010/main">
+                <a:solidFill>
+                  <a:srgbClr val="FFFFFF"/>
+                </a:solidFill>
+              </a14:hiddenFill>
+            </a:ext>
+          </a:extLst>
+        </p:spPr>
+      </p:pic>
+      <p:sp>
+        <p:nvSpPr>
+          <p:cNvPr id="4" name="TextBox 3">
+            <a:extLst>
+              <a:ext uri="{FF2B5EF4-FFF2-40B4-BE49-F238E27FC236}">
+                <a16:creationId xmlns:a16="http://schemas.microsoft.com/office/drawing/2014/main" id="{CD0938D9-FF38-4ECC-B169-466CFACF937A}"/>
+              </a:ext>
+            </a:extLst>
+          </p:cNvPr>
+          <p:cNvSpPr txBox="1"/>
+          <p:nvPr/>
+        </p:nvSpPr>
+        <p:spPr>
+          <a:xfrm>
+            <a:off x="6434138" y="4805044"/>
+            <a:ext cx="1828800" cy="369332"/>
+          </a:xfrm>
+          <a:prstGeom prst="rect">
+            <a:avLst/>
+          </a:prstGeom>
+          <a:noFill/>
+        </p:spPr>
+        <p:txBody>
+          <a:bodyPr wrap="square" rtlCol="0">
+            <a:spAutoFit/>
+          </a:bodyPr>
+          <a:lstStyle/>
+          <a:p>
+            <a:r>
+              <a:rPr lang="en-US" dirty="0">
+                <a:solidFill>
+                  <a:schemeClr val="bg1"/>
+                </a:solidFill>
+              </a:rPr>
+              <a:t>Minimize travel</a:t>
+            </a:r>
+          </a:p>
+        </p:txBody>
+      </p:sp>
+      <p:sp>
+        <p:nvSpPr>
+          <p:cNvPr id="8" name="TextBox 7">
+            <a:extLst>
+              <a:ext uri="{FF2B5EF4-FFF2-40B4-BE49-F238E27FC236}">
+                <a16:creationId xmlns:a16="http://schemas.microsoft.com/office/drawing/2014/main" id="{E32FCC94-711D-4159-8137-904481C8FC25}"/>
+              </a:ext>
+            </a:extLst>
+          </p:cNvPr>
+          <p:cNvSpPr txBox="1"/>
+          <p:nvPr/>
+        </p:nvSpPr>
+        <p:spPr>
+          <a:xfrm>
+            <a:off x="666750" y="4872988"/>
+            <a:ext cx="3848100" cy="1200329"/>
+          </a:xfrm>
+          <a:prstGeom prst="rect">
+            <a:avLst/>
+          </a:prstGeom>
+          <a:noFill/>
+        </p:spPr>
+        <p:txBody>
+          <a:bodyPr wrap="square" rtlCol="0">
+            <a:spAutoFit/>
+          </a:bodyPr>
+          <a:lstStyle/>
+          <a:p>
+            <a:r>
+              <a:rPr lang="en-US" dirty="0">
+                <a:solidFill>
+                  <a:schemeClr val="bg1"/>
+                </a:solidFill>
+              </a:rPr>
+              <a:t>Practice social distancing and good hygiene.</a:t>
+            </a:r>
+          </a:p>
+          <a:p>
+            <a:r>
+              <a:rPr lang="en-US" dirty="0">
+                <a:solidFill>
+                  <a:schemeClr val="bg1"/>
+                </a:solidFill>
+              </a:rPr>
+              <a:t>Encourage/ensure those in your household do the same.</a:t>
+            </a:r>
+          </a:p>
+        </p:txBody>
+      </p:sp>
+      <p:sp>
+        <p:nvSpPr>
+          <p:cNvPr id="11" name="Rectangle 10">
+            <a:extLst>
+              <a:ext uri="{FF2B5EF4-FFF2-40B4-BE49-F238E27FC236}">
+                <a16:creationId xmlns:a16="http://schemas.microsoft.com/office/drawing/2014/main" id="{7D8034CD-50D0-43FC-AA94-C9A7C75EE1DD}"/>
+              </a:ext>
+            </a:extLst>
+          </p:cNvPr>
+          <p:cNvSpPr/>
+          <p:nvPr/>
+        </p:nvSpPr>
+        <p:spPr>
+          <a:xfrm>
+            <a:off x="9133840" y="1899920"/>
+            <a:ext cx="2905760" cy="4572000"/>
+          </a:xfrm>
+          <a:prstGeom prst="rect">
+            <a:avLst/>
+          </a:prstGeom>
+        </p:spPr>
+        <p:style>
+          <a:lnRef idx="2">
+            <a:schemeClr val="dk1">
+              <a:shade val="50000"/>
+            </a:schemeClr>
+          </a:lnRef>
+          <a:fillRef idx="1">
+            <a:schemeClr val="dk1"/>
+          </a:fillRef>
+          <a:effectRef idx="0">
+            <a:schemeClr val="dk1"/>
+          </a:effectRef>
+          <a:fontRef idx="minor">
+            <a:schemeClr val="lt1"/>
+          </a:fontRef>
+        </p:style>
+        <p:txBody>
+          <a:bodyPr rtlCol="0" anchor="ctr"/>
+          <a:lstStyle/>
+          <a:p>
+            <a:pPr algn="ctr"/>
+            <a:endParaRPr lang="en-US"/>
+          </a:p>
+        </p:txBody>
+      </p:sp>
+      <p:sp>
+        <p:nvSpPr>
+          <p:cNvPr id="12" name="TextBox 11">
+            <a:extLst>
+              <a:ext uri="{FF2B5EF4-FFF2-40B4-BE49-F238E27FC236}">
+                <a16:creationId xmlns:a16="http://schemas.microsoft.com/office/drawing/2014/main" id="{6FE66937-7309-46DE-8C89-F94DABA48FD0}"/>
+              </a:ext>
+            </a:extLst>
+          </p:cNvPr>
+          <p:cNvSpPr txBox="1"/>
+          <p:nvPr/>
+        </p:nvSpPr>
+        <p:spPr>
+          <a:xfrm>
+            <a:off x="9408796" y="4691550"/>
+            <a:ext cx="2580640" cy="1200329"/>
+          </a:xfrm>
+          <a:prstGeom prst="rect">
+            <a:avLst/>
+          </a:prstGeom>
+          <a:noFill/>
+        </p:spPr>
+        <p:txBody>
+          <a:bodyPr wrap="square" rtlCol="0">
+            <a:spAutoFit/>
+          </a:bodyPr>
+          <a:lstStyle/>
+          <a:p>
+            <a:r>
+              <a:rPr lang="en-US" dirty="0">
+                <a:solidFill>
+                  <a:schemeClr val="bg1"/>
+                </a:solidFill>
+              </a:rPr>
+              <a:t>If taking prescription medications, discuss with physician increased risk for infection.</a:t>
+            </a:r>
+          </a:p>
+        </p:txBody>
+      </p:sp>
+      <p:pic>
+        <p:nvPicPr>
+          <p:cNvPr id="1034" name="Picture 10" descr="Medicine Icons">
+            <a:extLst>
+              <a:ext uri="{FF2B5EF4-FFF2-40B4-BE49-F238E27FC236}">
+                <a16:creationId xmlns:a16="http://schemas.microsoft.com/office/drawing/2014/main" id="{0540E28A-15EE-477C-BCB7-900B1CBAA4F7}"/>
+              </a:ext>
+            </a:extLst>
+          </p:cNvPr>
+          <p:cNvPicPr>
+            <a:picLocks noChangeAspect="1" noChangeArrowheads="1"/>
+          </p:cNvPicPr>
+          <p:nvPr/>
+        </p:nvPicPr>
+        <p:blipFill>
+          <a:blip r:embed="rId5">
+            <a:duotone>
+              <a:schemeClr val="accent1">
+                <a:shade val="45000"/>
+                <a:satMod val="135000"/>
+              </a:schemeClr>
+              <a:prstClr val="white"/>
+            </a:duotone>
+            <a:extLst>
+              <a:ext uri="{28A0092B-C50C-407E-A947-70E740481C1C}">
+                <a14:useLocalDpi xmlns:a14="http://schemas.microsoft.com/office/drawing/2010/main" val="0"/>
+              </a:ext>
+            </a:extLst>
+          </a:blip>
+          <a:srcRect/>
+          <a:stretch>
+            <a:fillRect/>
+          </a:stretch>
+        </p:blipFill>
+        <p:spPr bwMode="auto">
+          <a:xfrm>
+            <a:off x="9515157" y="2242820"/>
+            <a:ext cx="2143125" cy="2143125"/>
+          </a:xfrm>
+          <a:prstGeom prst="rect">
+            <a:avLst/>
+          </a:prstGeom>
+          <a:noFill/>
+          <a:extLst>
+            <a:ext uri="{909E8E84-426E-40DD-AFC4-6F175D3DCCD1}">
+              <a14:hiddenFill xmlns:a14="http://schemas.microsoft.com/office/drawing/2010/main">
+                <a:solidFill>
+                  <a:srgbClr val="FFFFFF"/>
+                </a:solidFill>
+              </a14:hiddenFill>
+            </a:ext>
+          </a:extLst>
+        </p:spPr>
+      </p:pic>
+    </p:spTree>
+    <p:extLst>
+      <p:ext uri="{BB962C8B-B14F-4D97-AF65-F5344CB8AC3E}">
+        <p14:creationId xmlns:p14="http://schemas.microsoft.com/office/powerpoint/2010/main" val="811711130"/>
+      </p:ext>
+    </p:extLst>
+  </p:cSld>
+  <p:clrMapOvr>
+    <a:masterClrMapping/>
+  </p:clrMapOvr>
+  <mc:AlternateContent xmlns:mc="http://schemas.openxmlformats.org/markup-compatibility/2006" xmlns:p14="http://schemas.microsoft.com/office/powerpoint/2010/main">
+    <mc:Choice Requires="p14">
+      <p:transition spd="med" p14:dur="700">
+        <p:fade/>
+      </p:transition>
+    </mc:Choice>
+    <mc:Fallback xmlns="">
+      <p:transition spd="med">
+        <p:fade/>
+      </p:transition>
+    </mc:Fallback>
+  </mc:AlternateContent>
+</p:sld>
+</file>
+
+<file path=ppt/slides/slide11.xml><?xml version="1.0" encoding="utf-8"?>
+<p:sld xmlns:a="http://schemas.openxmlformats.org/drawingml/2006/main" xmlns:r="http://schemas.openxmlformats.org/officeDocument/2006/relationships" xmlns:p="http://schemas.openxmlformats.org/presentationml/2006/main">
+  <p:cSld>
+    <p:spTree>
+      <p:nvGrpSpPr>
+        <p:cNvPr id="1" name=""/>
+        <p:cNvGrpSpPr/>
+        <p:nvPr/>
+      </p:nvGrpSpPr>
+      <p:grpSpPr>
+        <a:xfrm>
+          <a:off x="0" y="0"/>
+          <a:ext cx="0" cy="0"/>
+          <a:chOff x="0" y="0"/>
+          <a:chExt cx="0" cy="0"/>
+        </a:xfrm>
+      </p:grpSpPr>
+      <p:sp>
+        <p:nvSpPr>
           <p:cNvPr id="22" name="Rectangle 21">
             <a:extLst>
               <a:ext uri="{FF2B5EF4-FFF2-40B4-BE49-F238E27FC236}">
@@ -5255,7 +5819,7 @@
         </p:nvSpPr>
         <p:spPr>
           <a:xfrm>
-            <a:off x="876300" y="1968549"/>
+            <a:off x="762000" y="2023236"/>
             <a:ext cx="3455438" cy="4500962"/>
           </a:xfrm>
           <a:prstGeom prst="rect">
@@ -5677,8 +6241,8 @@
         </p:nvSpPr>
         <p:spPr>
           <a:xfrm>
-            <a:off x="6661701" y="3992546"/>
-            <a:ext cx="3505200" cy="2585323"/>
+            <a:off x="6400801" y="4013693"/>
+            <a:ext cx="3886199" cy="2585323"/>
           </a:xfrm>
           <a:prstGeom prst="rect">
             <a:avLst/>
@@ -5692,7 +6256,50 @@
           <a:p>
             <a:r>
               <a:rPr lang="en-US" dirty="0"/>
-              <a:t>This feature was complex and the unsorted data contained over 57K values.  Since this feature demonstrated a top factor in contraction of COVID19, isolated work could be done to identify what medications or combination of medications if any could reduce contraction of the disease.</a:t>
+              <a:t>Out of the 1200 unique medications:</a:t>
+            </a:r>
+          </a:p>
+          <a:p>
+            <a:endParaRPr lang="en-US" dirty="0"/>
+          </a:p>
+          <a:p>
+            <a:pPr marL="285750" indent="-285750">
+              <a:buFont typeface="Arial" panose="020B0604020202020204" pitchFamily="34" charset="0"/>
+              <a:buChar char="•"/>
+            </a:pPr>
+            <a:r>
+              <a:rPr lang="en-US" dirty="0"/>
+              <a:t>Identify what medications or combinations </a:t>
+            </a:r>
+          </a:p>
+          <a:p>
+            <a:pPr marL="285750" indent="-285750">
+              <a:buFont typeface="Arial" panose="020B0604020202020204" pitchFamily="34" charset="0"/>
+              <a:buChar char="•"/>
+            </a:pPr>
+            <a:endParaRPr lang="en-US" dirty="0"/>
+          </a:p>
+          <a:p>
+            <a:pPr marL="285750" indent="-285750">
+              <a:buFont typeface="Arial" panose="020B0604020202020204" pitchFamily="34" charset="0"/>
+              <a:buChar char="•"/>
+            </a:pPr>
+            <a:r>
+              <a:rPr lang="en-US" dirty="0"/>
+              <a:t>Evaluate if increase in number of prescriptions </a:t>
+            </a:r>
+          </a:p>
+          <a:p>
+            <a:pPr marL="285750" indent="-285750">
+              <a:buFont typeface="Arial" panose="020B0604020202020204" pitchFamily="34" charset="0"/>
+              <a:buChar char="•"/>
+            </a:pPr>
+            <a:endParaRPr lang="en-US" dirty="0"/>
+          </a:p>
+          <a:p>
+            <a:r>
+              <a:rPr lang="en-US" dirty="0"/>
+              <a:t>Are contributing factors</a:t>
             </a:r>
           </a:p>
         </p:txBody>
@@ -5722,7 +6329,7 @@
 </p:sld>
 </file>
 
-<file path=ppt/slides/slide11.xml><?xml version="1.0" encoding="utf-8"?>
+<file path=ppt/slides/slide12.xml><?xml version="1.0" encoding="utf-8"?>
 <p:sld xmlns:a="http://schemas.openxmlformats.org/drawingml/2006/main" xmlns:r="http://schemas.openxmlformats.org/officeDocument/2006/relationships" xmlns:p="http://schemas.openxmlformats.org/presentationml/2006/main">
   <p:cSld>
     <p:spTree>

</xml_diff>

<commit_message>
preso copy of notebook working on non-tech preso
</commit_message>
<xml_diff>
--- a/Covid19Preso.pptx
+++ b/Covid19Preso.pptx
@@ -145,7 +145,7 @@
 
 <file path=ppt/commentAuthors.xml><?xml version="1.0" encoding="utf-8"?>
 <p:cmAuthorLst xmlns:a="http://schemas.openxmlformats.org/drawingml/2006/main" xmlns:r="http://schemas.openxmlformats.org/officeDocument/2006/relationships" xmlns:p="http://schemas.openxmlformats.org/presentationml/2006/main">
-  <p:cmAuthor id="1" name="Andrea Osika -X (aosika - BAY AREA TECHWORKERS at Cisco)" initials="AO-(-BATaC" lastIdx="1" clrIdx="0">
+  <p:cmAuthor id="1" name="Andrea Osika -X (aosika - BAY AREA TECHWORKERS at Cisco)" initials="AO-(-BATaC" lastIdx="2" clrIdx="0">
     <p:extLst>
       <p:ext uri="{19B8F6BF-5375-455C-9EA6-DF929625EA0E}">
         <p15:presenceInfo xmlns:p15="http://schemas.microsoft.com/office/powerpoint/2012/main" userId="S::aosika@cisco.com::ee286a3d-2621-4912-b6b7-c2c175282c1e" providerId="AD"/>
@@ -237,7 +237,7 @@
           <a:p>
             <a:fld id="{043B725B-653D-4166-A8E9-72A38A1847CF}" type="datetimeFigureOut">
               <a:rPr lang="en-US"/>
-              <a:t>4/30/2020</a:t>
+              <a:t>5/1/2020</a:t>
             </a:fld>
             <a:endParaRPr/>
           </a:p>
@@ -402,7 +402,7 @@
           <a:p>
             <a:fld id="{783F64CD-0576-4A9A-BD06-7889D6E60BDC}" type="datetimeFigureOut">
               <a:rPr lang="en-US"/>
-              <a:t>4/30/2020</a:t>
+              <a:t>5/1/2020</a:t>
             </a:fld>
             <a:endParaRPr/>
           </a:p>
@@ -996,6 +996,79 @@
             <a:endParaRPr lang="fr-FR" dirty="0"/>
           </a:p>
           <a:p>
+            <a:r>
+              <a:rPr lang="fr-FR" dirty="0" err="1"/>
+              <a:t>Testing</a:t>
+            </a:r>
+            <a:r>
+              <a:rPr lang="fr-FR" dirty="0"/>
+              <a:t> in the United States at </a:t>
+            </a:r>
+            <a:r>
+              <a:rPr lang="fr-FR" dirty="0" err="1"/>
+              <a:t>this</a:t>
+            </a:r>
+            <a:r>
+              <a:rPr lang="fr-FR" dirty="0"/>
+              <a:t> time </a:t>
+            </a:r>
+            <a:r>
+              <a:rPr lang="fr-FR" dirty="0" err="1"/>
+              <a:t>was</a:t>
+            </a:r>
+            <a:r>
+              <a:rPr lang="fr-FR" dirty="0"/>
+              <a:t> </a:t>
+            </a:r>
+            <a:r>
+              <a:rPr lang="fr-FR" dirty="0" err="1"/>
+              <a:t>limited</a:t>
+            </a:r>
+            <a:r>
+              <a:rPr lang="fr-FR" dirty="0"/>
+              <a:t> due to </a:t>
+            </a:r>
+            <a:r>
+              <a:rPr lang="fr-FR" dirty="0" err="1"/>
+              <a:t>shortages</a:t>
+            </a:r>
+            <a:r>
+              <a:rPr lang="fr-FR" dirty="0"/>
+              <a:t> of supplies and </a:t>
+            </a:r>
+            <a:r>
+              <a:rPr lang="fr-FR" dirty="0" err="1"/>
+              <a:t>latency</a:t>
+            </a:r>
+            <a:r>
+              <a:rPr lang="fr-FR" dirty="0"/>
+              <a:t> in </a:t>
+            </a:r>
+            <a:r>
+              <a:rPr lang="fr-FR" dirty="0" err="1"/>
+              <a:t>receiving</a:t>
+            </a:r>
+            <a:r>
+              <a:rPr lang="fr-FR" dirty="0"/>
+              <a:t> </a:t>
+            </a:r>
+            <a:r>
+              <a:rPr lang="fr-FR" dirty="0" err="1"/>
+              <a:t>results</a:t>
+            </a:r>
+            <a:r>
+              <a:rPr lang="fr-FR" dirty="0"/>
+              <a:t>.</a:t>
+            </a:r>
+            <a:br>
+              <a:rPr lang="fr-FR" dirty="0"/>
+            </a:br>
+            <a:endParaRPr lang="fr-FR" dirty="0"/>
+          </a:p>
+          <a:p>
+            <a:endParaRPr lang="fr-FR" dirty="0"/>
+          </a:p>
+          <a:p>
             <a:endParaRPr lang="en-US" dirty="0"/>
           </a:p>
           <a:p>
@@ -1249,7 +1322,7 @@
                 <a:ea typeface="+mn-ea"/>
                 <a:cs typeface="+mn-cs"/>
               </a:rPr>
-              <a:t> the diagnostic ability of binary classifiers. It shows the tradeoff between sensitivity and specificity (any increase in sensitivity will be accompanied by a decrease in specificity). The closer the curve follows the left-hand border and then the top border of the </a:t>
+              <a:t> the diagnostic ability of binary classifiers. It shows the tradeoff between sensitivity TP/(TP+FN) and specificity TN/(TN+FP)  (any increase in sensitivity will be accompanied by a decrease in specificity). The closer the curve follows the left-hand border and then the top border of the </a:t>
             </a:r>
             <a:r>
               <a:rPr lang="en-US" sz="1200" b="1" i="0" kern="1200" dirty="0">
@@ -1407,6 +1480,22 @@
           <a:bodyPr/>
           <a:lstStyle/>
           <a:p>
+            <a:r>
+              <a:rPr lang="en-US" dirty="0"/>
+              <a:t>Feature importance </a:t>
+            </a:r>
+            <a:r>
+              <a:rPr lang="en-US" sz="1200" b="0" i="0" kern="1200" dirty="0">
+                <a:solidFill>
+                  <a:schemeClr val="tx1"/>
+                </a:solidFill>
+                <a:effectLst/>
+                <a:latin typeface="+mn-lt"/>
+                <a:ea typeface="+mn-ea"/>
+                <a:cs typeface="+mn-cs"/>
+              </a:rPr>
+              <a:t>directly measures variable importance by observing the effect on model accuracy of randomly shuffling each predictor variable. </a:t>
+            </a:r>
             <a:endParaRPr lang="en-US" dirty="0"/>
           </a:p>
         </p:txBody>
@@ -1867,7 +1956,7 @@
           <a:p>
             <a:fld id="{37CC0096-1860-4642-9CD2-0079EA5E7CD1}" type="datetimeFigureOut">
               <a:rPr lang="en-US"/>
-              <a:t>4/30/2020</a:t>
+              <a:t>5/1/2020</a:t>
             </a:fld>
             <a:endParaRPr/>
           </a:p>
@@ -2116,7 +2205,7 @@
           <a:p>
             <a:fld id="{37CC0096-1860-4642-9CD2-0079EA5E7CD1}" type="datetimeFigureOut">
               <a:rPr lang="en-US"/>
-              <a:t>4/30/2020</a:t>
+              <a:t>5/1/2020</a:t>
             </a:fld>
             <a:endParaRPr/>
           </a:p>
@@ -2302,7 +2391,7 @@
           <a:p>
             <a:fld id="{37CC0096-1860-4642-9CD2-0079EA5E7CD1}" type="datetimeFigureOut">
               <a:rPr lang="en-US"/>
-              <a:t>4/30/2020</a:t>
+              <a:t>5/1/2020</a:t>
             </a:fld>
             <a:endParaRPr/>
           </a:p>
@@ -2833,7 +2922,7 @@
           <a:p>
             <a:fld id="{37CC0096-1860-4642-9CD2-0079EA5E7CD1}" type="datetimeFigureOut">
               <a:rPr lang="en-US"/>
-              <a:t>4/30/2020</a:t>
+              <a:t>5/1/2020</a:t>
             </a:fld>
             <a:endParaRPr/>
           </a:p>
@@ -3285,7 +3374,7 @@
           <a:p>
             <a:fld id="{37CC0096-1860-4642-9CD2-0079EA5E7CD1}" type="datetimeFigureOut">
               <a:rPr lang="en-US"/>
-              <a:t>4/30/2020</a:t>
+              <a:t>5/1/2020</a:t>
             </a:fld>
             <a:endParaRPr/>
           </a:p>
@@ -3415,7 +3504,7 @@
           <a:p>
             <a:fld id="{37CC0096-1860-4642-9CD2-0079EA5E7CD1}" type="datetimeFigureOut">
               <a:rPr lang="en-US"/>
-              <a:t>4/30/2020</a:t>
+              <a:t>5/1/2020</a:t>
             </a:fld>
             <a:endParaRPr/>
           </a:p>
@@ -3522,7 +3611,7 @@
           <a:p>
             <a:fld id="{37CC0096-1860-4642-9CD2-0079EA5E7CD1}" type="datetimeFigureOut">
               <a:rPr lang="en-US"/>
-              <a:t>4/30/2020</a:t>
+              <a:t>5/1/2020</a:t>
             </a:fld>
             <a:endParaRPr/>
           </a:p>
@@ -4511,7 +4600,7 @@
             <a:fld id="{37CC0096-1860-4642-9CD2-0079EA5E7CD1}" type="datetimeFigureOut">
               <a:rPr lang="en-US" smtClean="0"/>
               <a:pPr/>
-              <a:t>4/30/2020</a:t>
+              <a:t>5/1/2020</a:t>
             </a:fld>
             <a:endParaRPr lang="en-US" dirty="0"/>
           </a:p>
@@ -5144,7 +5233,7 @@
         </p:nvSpPr>
         <p:spPr>
           <a:xfrm>
-            <a:off x="152400" y="1905000"/>
+            <a:off x="152400" y="1840071"/>
             <a:ext cx="5257800" cy="4572000"/>
           </a:xfrm>
           <a:prstGeom prst="rect">
@@ -5192,7 +5281,12 @@
             <p:ph type="title"/>
           </p:nvPr>
         </p:nvSpPr>
-        <p:spPr/>
+        <p:spPr>
+          <a:xfrm>
+            <a:off x="381000" y="101673"/>
+            <a:ext cx="10058400" cy="1325563"/>
+          </a:xfrm>
+        </p:spPr>
         <p:txBody>
           <a:bodyPr/>
           <a:lstStyle/>
@@ -5336,6 +5430,15 @@
               <a:prstClr val="white"/>
             </a:duotone>
             <a:extLst>
+              <a:ext uri="{BEBA8EAE-BF5A-486C-A8C5-ECC9F3942E4B}">
+                <a14:imgProps xmlns:a14="http://schemas.microsoft.com/office/drawing/2010/main">
+                  <a14:imgLayer r:embed="rId5">
+                    <a14:imgEffect>
+                      <a14:saturation sat="400000"/>
+                    </a14:imgEffect>
+                  </a14:imgLayer>
+                </a14:imgProps>
+              </a:ext>
               <a:ext uri="{28A0092B-C50C-407E-A947-70E740481C1C}">
                 <a14:useLocalDpi xmlns:a14="http://schemas.microsoft.com/office/drawing/2010/main" val="0"/>
               </a:ext>
@@ -5354,16 +5457,14 @@
           <a:prstGeom prst="rect">
             <a:avLst/>
           </a:prstGeom>
-          <a:noFill/>
-          <a:extLst>
-            <a:ext uri="{909E8E84-426E-40DD-AFC4-6F175D3DCCD1}">
-              <a14:hiddenFill xmlns:a14="http://schemas.microsoft.com/office/drawing/2010/main">
-                <a:solidFill>
-                  <a:srgbClr val="FFFFFF"/>
-                </a:solidFill>
-              </a14:hiddenFill>
-            </a:ext>
-          </a:extLst>
+          <a:solidFill>
+            <a:schemeClr val="bg1"/>
+          </a:solidFill>
+          <a:ln>
+            <a:solidFill>
+              <a:srgbClr val="FDFAFA"/>
+            </a:solidFill>
+          </a:ln>
         </p:spPr>
       </p:pic>
       <p:sp>
@@ -5380,8 +5481,8 @@
         </p:nvSpPr>
         <p:spPr>
           <a:xfrm>
-            <a:off x="6434138" y="4805044"/>
-            <a:ext cx="1828800" cy="369332"/>
+            <a:off x="6238876" y="4805044"/>
+            <a:ext cx="2024062" cy="369332"/>
           </a:xfrm>
           <a:prstGeom prst="rect">
             <a:avLst/>
@@ -5394,6 +5495,10 @@
           </a:bodyPr>
           <a:lstStyle/>
           <a:p>
+            <a:pPr marL="285750" indent="-285750">
+              <a:buFont typeface="Arial" panose="020B0604020202020204" pitchFamily="34" charset="0"/>
+              <a:buChar char="•"/>
+            </a:pPr>
             <a:r>
               <a:rPr lang="en-US" dirty="0">
                 <a:solidFill>
@@ -5419,8 +5524,8 @@
         </p:nvSpPr>
         <p:spPr>
           <a:xfrm>
-            <a:off x="666750" y="4872988"/>
-            <a:ext cx="3848100" cy="1200329"/>
+            <a:off x="391160" y="4547244"/>
+            <a:ext cx="4591050" cy="1754326"/>
           </a:xfrm>
           <a:prstGeom prst="rect">
             <a:avLst/>
@@ -5433,6 +5538,10 @@
           </a:bodyPr>
           <a:lstStyle/>
           <a:p>
+            <a:pPr marL="285750" indent="-285750">
+              <a:buFont typeface="Arial" panose="020B0604020202020204" pitchFamily="34" charset="0"/>
+              <a:buChar char="•"/>
+            </a:pPr>
             <a:r>
               <a:rPr lang="en-US" dirty="0">
                 <a:solidFill>
@@ -5443,6 +5552,10 @@
             </a:r>
           </a:p>
           <a:p>
+            <a:pPr marL="285750" indent="-285750">
+              <a:buFont typeface="Arial" panose="020B0604020202020204" pitchFamily="34" charset="0"/>
+              <a:buChar char="•"/>
+            </a:pPr>
             <a:r>
               <a:rPr lang="en-US" dirty="0">
                 <a:solidFill>
@@ -5450,6 +5563,20 @@
                 </a:solidFill>
               </a:rPr>
               <a:t>Encourage/ensure those in your household do the same.</a:t>
+            </a:r>
+          </a:p>
+          <a:p>
+            <a:pPr marL="285750" indent="-285750">
+              <a:buFont typeface="Arial" panose="020B0604020202020204" pitchFamily="34" charset="0"/>
+              <a:buChar char="•"/>
+            </a:pPr>
+            <a:r>
+              <a:rPr lang="en-US" dirty="0">
+                <a:solidFill>
+                  <a:schemeClr val="bg1"/>
+                </a:solidFill>
+              </a:rPr>
+              <a:t>Avoid contact with those known to be infected.</a:t>
             </a:r>
           </a:p>
         </p:txBody>
@@ -5515,7 +5642,7 @@
         <p:spPr>
           <a:xfrm>
             <a:off x="9408796" y="4691550"/>
-            <a:ext cx="2580640" cy="1200329"/>
+            <a:ext cx="2580640" cy="1477328"/>
           </a:xfrm>
           <a:prstGeom prst="rect">
             <a:avLst/>
@@ -5534,7 +5661,7 @@
                   <a:schemeClr val="bg1"/>
                 </a:solidFill>
               </a:rPr>
-              <a:t>If taking prescription medications, discuss with physician increased risk for infection.</a:t>
+              <a:t>If taking prescription medications, discuss with physician possibility for increased risk for infection.</a:t>
             </a:r>
           </a:p>
         </p:txBody>
@@ -5554,7 +5681,7 @@
           <p:nvPr/>
         </p:nvPicPr>
         <p:blipFill>
-          <a:blip r:embed="rId5">
+          <a:blip r:embed="rId6">
             <a:duotone>
               <a:schemeClr val="accent1">
                 <a:shade val="45000"/>
@@ -5593,6 +5720,60 @@
           </a:extLst>
         </p:spPr>
       </p:pic>
+      <p:sp>
+        <p:nvSpPr>
+          <p:cNvPr id="3" name="Rectangle 2">
+            <a:extLst>
+              <a:ext uri="{FF2B5EF4-FFF2-40B4-BE49-F238E27FC236}">
+                <a16:creationId xmlns:a16="http://schemas.microsoft.com/office/drawing/2014/main" id="{7639BB74-E1F2-4274-A3F3-DE98811C310A}"/>
+              </a:ext>
+            </a:extLst>
+          </p:cNvPr>
+          <p:cNvSpPr/>
+          <p:nvPr/>
+        </p:nvSpPr>
+        <p:spPr>
+          <a:xfrm>
+            <a:off x="609600" y="4191000"/>
+            <a:ext cx="1600200" cy="194945"/>
+          </a:xfrm>
+          <a:prstGeom prst="rect">
+            <a:avLst/>
+          </a:prstGeom>
+          <a:solidFill>
+            <a:schemeClr val="bg1"/>
+          </a:solidFill>
+          <a:ln>
+            <a:solidFill>
+              <a:schemeClr val="bg1"/>
+            </a:solidFill>
+          </a:ln>
+        </p:spPr>
+        <p:style>
+          <a:lnRef idx="2">
+            <a:schemeClr val="accent1">
+              <a:shade val="50000"/>
+            </a:schemeClr>
+          </a:lnRef>
+          <a:fillRef idx="1">
+            <a:schemeClr val="accent1"/>
+          </a:fillRef>
+          <a:effectRef idx="0">
+            <a:schemeClr val="accent1"/>
+          </a:effectRef>
+          <a:fontRef idx="minor">
+            <a:schemeClr val="lt1"/>
+          </a:fontRef>
+        </p:style>
+        <p:txBody>
+          <a:bodyPr rtlCol="0" anchor="ctr"/>
+          <a:lstStyle/>
+          <a:p>
+            <a:pPr algn="ctr"/>
+            <a:endParaRPr lang="en-US"/>
+          </a:p>
+        </p:txBody>
+      </p:sp>
     </p:spTree>
     <p:extLst>
       <p:ext uri="{BB962C8B-B14F-4D97-AF65-F5344CB8AC3E}">
@@ -5621,6 +5802,19 @@
 <file path=ppt/slides/slide11.xml><?xml version="1.0" encoding="utf-8"?>
 <p:sld xmlns:a="http://schemas.openxmlformats.org/drawingml/2006/main" xmlns:r="http://schemas.openxmlformats.org/officeDocument/2006/relationships" xmlns:p="http://schemas.openxmlformats.org/presentationml/2006/main">
   <p:cSld>
+    <p:bg>
+      <p:bgPr>
+        <a:pattFill prst="pct5">
+          <a:fgClr>
+            <a:schemeClr val="bg2"/>
+          </a:fgClr>
+          <a:bgClr>
+            <a:schemeClr val="bg1"/>
+          </a:bgClr>
+        </a:pattFill>
+        <a:effectLst/>
+      </p:bgPr>
+    </p:bg>
     <p:spTree>
       <p:nvGrpSpPr>
         <p:cNvPr id="1" name=""/>
@@ -5649,8 +5843,8 @@
         </p:nvSpPr>
         <p:spPr>
           <a:xfrm>
-            <a:off x="5400247" y="1819674"/>
-            <a:ext cx="5984999" cy="4939106"/>
+            <a:off x="7162800" y="2200674"/>
+            <a:ext cx="4222446" cy="4047726"/>
           </a:xfrm>
           <a:prstGeom prst="rect">
             <a:avLst/>
@@ -5683,6 +5877,130 @@
       </p:sp>
       <p:sp>
         <p:nvSpPr>
+          <p:cNvPr id="13" name="Rectangle 12">
+            <a:extLst>
+              <a:ext uri="{FF2B5EF4-FFF2-40B4-BE49-F238E27FC236}">
+                <a16:creationId xmlns:a16="http://schemas.microsoft.com/office/drawing/2014/main" id="{B13B5151-5188-47BD-9573-849870770DB1}"/>
+              </a:ext>
+            </a:extLst>
+          </p:cNvPr>
+          <p:cNvSpPr/>
+          <p:nvPr/>
+        </p:nvSpPr>
+        <p:spPr>
+          <a:xfrm>
+            <a:off x="214886" y="1814604"/>
+            <a:ext cx="5652513" cy="4939106"/>
+          </a:xfrm>
+          <a:prstGeom prst="rect">
+            <a:avLst/>
+          </a:prstGeom>
+        </p:spPr>
+        <p:style>
+          <a:lnRef idx="2">
+            <a:schemeClr val="accent1">
+              <a:shade val="50000"/>
+            </a:schemeClr>
+          </a:lnRef>
+          <a:fillRef idx="1">
+            <a:schemeClr val="accent1"/>
+          </a:fillRef>
+          <a:effectRef idx="0">
+            <a:schemeClr val="accent1"/>
+          </a:effectRef>
+          <a:fontRef idx="minor">
+            <a:schemeClr val="lt1"/>
+          </a:fontRef>
+        </p:style>
+        <p:txBody>
+          <a:bodyPr rtlCol="0" anchor="ctr"/>
+          <a:lstStyle/>
+          <a:p>
+            <a:pPr algn="ctr"/>
+            <a:endParaRPr lang="en-US"/>
+          </a:p>
+        </p:txBody>
+      </p:sp>
+      <p:sp>
+        <p:nvSpPr>
+          <p:cNvPr id="2" name="Title 1"/>
+          <p:cNvSpPr>
+            <a:spLocks noGrp="1"/>
+          </p:cNvSpPr>
+          <p:nvPr>
+            <p:ph type="title"/>
+          </p:nvPr>
+        </p:nvSpPr>
+        <p:spPr>
+          <a:xfrm>
+            <a:off x="1066800" y="99220"/>
+            <a:ext cx="10058400" cy="1325563"/>
+          </a:xfrm>
+        </p:spPr>
+        <p:txBody>
+          <a:bodyPr anchor="ctr">
+            <a:normAutofit/>
+          </a:bodyPr>
+          <a:lstStyle/>
+          <a:p>
+            <a:r>
+              <a:rPr lang="en-US" dirty="0"/>
+              <a:t>Future Work:</a:t>
+            </a:r>
+          </a:p>
+        </p:txBody>
+      </p:sp>
+      <p:sp>
+        <p:nvSpPr>
+          <p:cNvPr id="16" name="Rectangle 15">
+            <a:extLst>
+              <a:ext uri="{FF2B5EF4-FFF2-40B4-BE49-F238E27FC236}">
+                <a16:creationId xmlns:a16="http://schemas.microsoft.com/office/drawing/2014/main" id="{8BE3BF35-4CA9-4325-A00F-5274171B5793}"/>
+              </a:ext>
+            </a:extLst>
+          </p:cNvPr>
+          <p:cNvSpPr/>
+          <p:nvPr/>
+        </p:nvSpPr>
+        <p:spPr>
+          <a:xfrm>
+            <a:off x="7451113" y="2404236"/>
+            <a:ext cx="3674087" cy="3615564"/>
+          </a:xfrm>
+          <a:prstGeom prst="rect">
+            <a:avLst/>
+          </a:prstGeom>
+          <a:solidFill>
+            <a:srgbClr val="F2F2F2"/>
+          </a:solidFill>
+        </p:spPr>
+        <p:style>
+          <a:lnRef idx="2">
+            <a:schemeClr val="accent1">
+              <a:shade val="50000"/>
+            </a:schemeClr>
+          </a:lnRef>
+          <a:fillRef idx="1">
+            <a:schemeClr val="accent1"/>
+          </a:fillRef>
+          <a:effectRef idx="0">
+            <a:schemeClr val="accent1"/>
+          </a:effectRef>
+          <a:fontRef idx="minor">
+            <a:schemeClr val="lt1"/>
+          </a:fontRef>
+        </p:style>
+        <p:txBody>
+          <a:bodyPr rtlCol="0" anchor="ctr"/>
+          <a:lstStyle/>
+          <a:p>
+            <a:pPr algn="ctr"/>
+            <a:endParaRPr lang="en-US"/>
+          </a:p>
+        </p:txBody>
+      </p:sp>
+      <p:sp>
+        <p:nvSpPr>
           <p:cNvPr id="23" name="Rectangle 22">
             <a:extLst>
               <a:ext uri="{FF2B5EF4-FFF2-40B4-BE49-F238E27FC236}">
@@ -5695,8 +6013,8 @@
         </p:nvSpPr>
         <p:spPr>
           <a:xfrm>
-            <a:off x="6400800" y="1973619"/>
-            <a:ext cx="3886200" cy="4604250"/>
+            <a:off x="577595" y="2023236"/>
+            <a:ext cx="5037329" cy="4604250"/>
           </a:xfrm>
           <a:prstGeom prst="rect">
             <a:avLst/>
@@ -5730,12 +6048,108 @@
           </a:p>
         </p:txBody>
       </p:sp>
+      <p:pic>
+        <p:nvPicPr>
+          <p:cNvPr id="1026" name="Picture 2" descr="How Do You Manage Taking Prescription Medications While In Recovery?">
+            <a:extLst>
+              <a:ext uri="{FF2B5EF4-FFF2-40B4-BE49-F238E27FC236}">
+                <a16:creationId xmlns:a16="http://schemas.microsoft.com/office/drawing/2014/main" id="{A8649058-8D5E-4D2E-B33B-C47E1A575836}"/>
+              </a:ext>
+            </a:extLst>
+          </p:cNvPr>
+          <p:cNvPicPr>
+            <a:picLocks noChangeAspect="1" noChangeArrowheads="1"/>
+          </p:cNvPicPr>
+          <p:nvPr/>
+        </p:nvPicPr>
+        <p:blipFill>
+          <a:blip r:embed="rId2">
+            <a:alphaModFix amt="29000"/>
+            <a:extLst>
+              <a:ext uri="{BEBA8EAE-BF5A-486C-A8C5-ECC9F3942E4B}">
+                <a14:imgProps xmlns:a14="http://schemas.microsoft.com/office/drawing/2010/main">
+                  <a14:imgLayer r:embed="rId3">
+                    <a14:imgEffect>
+                      <a14:saturation sat="111000"/>
+                    </a14:imgEffect>
+                  </a14:imgLayer>
+                </a14:imgProps>
+              </a:ext>
+              <a:ext uri="{28A0092B-C50C-407E-A947-70E740481C1C}">
+                <a14:useLocalDpi xmlns:a14="http://schemas.microsoft.com/office/drawing/2010/main" val="0"/>
+              </a:ext>
+            </a:extLst>
+          </a:blip>
+          <a:srcRect/>
+          <a:stretch>
+            <a:fillRect/>
+          </a:stretch>
+        </p:blipFill>
+        <p:spPr bwMode="auto">
+          <a:xfrm>
+            <a:off x="672773" y="3290936"/>
+            <a:ext cx="4846972" cy="3225440"/>
+          </a:xfrm>
+          <a:prstGeom prst="rect">
+            <a:avLst/>
+          </a:prstGeom>
+          <a:noFill/>
+          <a:extLst>
+            <a:ext uri="{909E8E84-426E-40DD-AFC4-6F175D3DCCD1}">
+              <a14:hiddenFill xmlns:a14="http://schemas.microsoft.com/office/drawing/2010/main">
+                <a:solidFill>
+                  <a:srgbClr val="FFFFFF"/>
+                </a:solidFill>
+              </a14:hiddenFill>
+            </a:ext>
+          </a:extLst>
+        </p:spPr>
+      </p:pic>
       <p:sp>
         <p:nvSpPr>
-          <p:cNvPr id="13" name="Rectangle 12">
+          <p:cNvPr id="19" name="Text Placeholder 4">
             <a:extLst>
               <a:ext uri="{FF2B5EF4-FFF2-40B4-BE49-F238E27FC236}">
-                <a16:creationId xmlns:a16="http://schemas.microsoft.com/office/drawing/2014/main" id="{B13B5151-5188-47BD-9573-849870770DB1}"/>
+                <a16:creationId xmlns:a16="http://schemas.microsoft.com/office/drawing/2014/main" id="{99D8F60B-DE32-4F9F-BF49-423AD7023B43}"/>
+              </a:ext>
+            </a:extLst>
+          </p:cNvPr>
+          <p:cNvSpPr>
+            <a:spLocks noGrp="1"/>
+          </p:cNvSpPr>
+          <p:nvPr>
+            <p:ph type="body" sz="quarter" idx="3"/>
+          </p:nvPr>
+        </p:nvSpPr>
+        <p:spPr>
+          <a:xfrm>
+            <a:off x="701876" y="2260028"/>
+            <a:ext cx="4800600" cy="762000"/>
+          </a:xfrm>
+        </p:spPr>
+        <p:txBody>
+          <a:bodyPr/>
+          <a:lstStyle/>
+          <a:p>
+            <a:r>
+              <a:rPr lang="en-US" dirty="0">
+                <a:solidFill>
+                  <a:schemeClr val="accent1">
+                    <a:lumMod val="75000"/>
+                  </a:schemeClr>
+                </a:solidFill>
+              </a:rPr>
+              <a:t>Prescription Medications: </a:t>
+            </a:r>
+          </a:p>
+        </p:txBody>
+      </p:sp>
+      <p:sp>
+        <p:nvSpPr>
+          <p:cNvPr id="18" name="Rectangle 17">
+            <a:extLst>
+              <a:ext uri="{FF2B5EF4-FFF2-40B4-BE49-F238E27FC236}">
+                <a16:creationId xmlns:a16="http://schemas.microsoft.com/office/drawing/2014/main" id="{C2552A96-96C3-4A12-94FD-A736622B4A6C}"/>
               </a:ext>
             </a:extLst>
           </p:cNvPr>
@@ -5744,113 +6158,195 @@
         </p:nvSpPr>
         <p:spPr>
           <a:xfrm>
-            <a:off x="214887" y="1814604"/>
-            <a:ext cx="4814313" cy="4939106"/>
+            <a:off x="680536" y="3429000"/>
+            <a:ext cx="5037329" cy="2554545"/>
           </a:xfrm>
           <a:prstGeom prst="rect">
             <a:avLst/>
           </a:prstGeom>
         </p:spPr>
-        <p:style>
-          <a:lnRef idx="2">
-            <a:schemeClr val="accent1">
-              <a:shade val="50000"/>
-            </a:schemeClr>
-          </a:lnRef>
-          <a:fillRef idx="1">
-            <a:schemeClr val="accent1"/>
-          </a:fillRef>
-          <a:effectRef idx="0">
-            <a:schemeClr val="accent1"/>
-          </a:effectRef>
-          <a:fontRef idx="minor">
-            <a:schemeClr val="lt1"/>
-          </a:fontRef>
-        </p:style>
         <p:txBody>
-          <a:bodyPr rtlCol="0" anchor="ctr"/>
+          <a:bodyPr wrap="square">
+            <a:spAutoFit/>
+          </a:bodyPr>
           <a:lstStyle/>
           <a:p>
-            <a:pPr algn="ctr"/>
-            <a:endParaRPr lang="en-US"/>
+            <a:r>
+              <a:rPr lang="en-US" sz="2000" dirty="0"/>
+              <a:t>Out of the 1200 unique medications:</a:t>
+            </a:r>
+          </a:p>
+          <a:p>
+            <a:endParaRPr lang="en-US" sz="2000" dirty="0"/>
+          </a:p>
+          <a:p>
+            <a:pPr marL="285750" indent="-285750">
+              <a:buFont typeface="Arial" panose="020B0604020202020204" pitchFamily="34" charset="0"/>
+              <a:buChar char="•"/>
+            </a:pPr>
+            <a:r>
+              <a:rPr lang="en-US" sz="2000" dirty="0"/>
+              <a:t>Identify what medications or combinations could be contributing factors</a:t>
+            </a:r>
+          </a:p>
+          <a:p>
+            <a:pPr marL="285750" indent="-285750">
+              <a:buFont typeface="Arial" panose="020B0604020202020204" pitchFamily="34" charset="0"/>
+              <a:buChar char="•"/>
+            </a:pPr>
+            <a:endParaRPr lang="en-US" sz="2000" dirty="0"/>
+          </a:p>
+          <a:p>
+            <a:pPr marL="285750" indent="-285750">
+              <a:buFont typeface="Arial" panose="020B0604020202020204" pitchFamily="34" charset="0"/>
+              <a:buChar char="•"/>
+            </a:pPr>
+            <a:r>
+              <a:rPr lang="en-US" sz="2000" dirty="0"/>
+              <a:t>Evaluate if increase in number of prescriptions are contributing factors</a:t>
+            </a:r>
           </a:p>
         </p:txBody>
       </p:sp>
-      <p:sp>
-        <p:nvSpPr>
-          <p:cNvPr id="2" name="Title 1"/>
-          <p:cNvSpPr>
-            <a:spLocks noGrp="1"/>
-          </p:cNvSpPr>
-          <p:nvPr>
-            <p:ph type="title"/>
-          </p:nvPr>
-        </p:nvSpPr>
-        <p:spPr>
-          <a:xfrm>
-            <a:off x="1066800" y="99220"/>
-            <a:ext cx="10058400" cy="1325563"/>
-          </a:xfrm>
-        </p:spPr>
-        <p:txBody>
-          <a:bodyPr anchor="ctr">
-            <a:normAutofit/>
-          </a:bodyPr>
-          <a:lstStyle/>
-          <a:p>
-            <a:r>
-              <a:rPr lang="en-US" dirty="0"/>
-              <a:t>FUTURE WORK:</a:t>
-            </a:r>
-          </a:p>
-        </p:txBody>
-      </p:sp>
-      <p:sp>
-        <p:nvSpPr>
-          <p:cNvPr id="16" name="Rectangle 15">
+      <p:pic>
+        <p:nvPicPr>
+          <p:cNvPr id="17" name="Picture 10" descr="Medicine Icons">
             <a:extLst>
               <a:ext uri="{FF2B5EF4-FFF2-40B4-BE49-F238E27FC236}">
-                <a16:creationId xmlns:a16="http://schemas.microsoft.com/office/drawing/2014/main" id="{8BE3BF35-4CA9-4325-A00F-5274171B5793}"/>
+                <a16:creationId xmlns:a16="http://schemas.microsoft.com/office/drawing/2014/main" id="{AEA0EC00-975B-4F87-99F0-1ED7B1B3A100}"/>
               </a:ext>
             </a:extLst>
           </p:cNvPr>
-          <p:cNvSpPr/>
+          <p:cNvPicPr>
+            <a:picLocks noChangeAspect="1" noChangeArrowheads="1"/>
+          </p:cNvPicPr>
           <p:nvPr/>
-        </p:nvSpPr>
-        <p:spPr>
+        </p:nvPicPr>
+        <p:blipFill>
+          <a:blip r:embed="rId4">
+            <a:duotone>
+              <a:schemeClr val="accent1">
+                <a:shade val="45000"/>
+                <a:satMod val="135000"/>
+              </a:schemeClr>
+              <a:prstClr val="white"/>
+            </a:duotone>
+            <a:extLst>
+              <a:ext uri="{28A0092B-C50C-407E-A947-70E740481C1C}">
+                <a14:useLocalDpi xmlns:a14="http://schemas.microsoft.com/office/drawing/2010/main" val="0"/>
+              </a:ext>
+            </a:extLst>
+          </a:blip>
+          <a:srcRect/>
+          <a:stretch>
+            <a:fillRect/>
+          </a:stretch>
+        </p:blipFill>
+        <p:spPr bwMode="auto">
           <a:xfrm>
-            <a:off x="762000" y="2023236"/>
-            <a:ext cx="3455438" cy="4500962"/>
+            <a:off x="4348363" y="2124455"/>
+            <a:ext cx="1033146" cy="1033146"/>
+          </a:xfrm>
+          <a:prstGeom prst="rect">
+            <a:avLst/>
+          </a:prstGeom>
+          <a:noFill/>
+          <a:extLst>
+            <a:ext uri="{909E8E84-426E-40DD-AFC4-6F175D3DCCD1}">
+              <a14:hiddenFill xmlns:a14="http://schemas.microsoft.com/office/drawing/2010/main">
+                <a:solidFill>
+                  <a:srgbClr val="FFFFFF"/>
+                </a:solidFill>
+              </a14:hiddenFill>
+            </a:ext>
+          </a:extLst>
+        </p:spPr>
+      </p:pic>
+      <p:pic>
+        <p:nvPicPr>
+          <p:cNvPr id="1028" name="Picture 4" descr="Free Thought Bubbles Clipart, Download Free Clip Art, Free Clip ...">
+            <a:extLst>
+              <a:ext uri="{FF2B5EF4-FFF2-40B4-BE49-F238E27FC236}">
+                <a16:creationId xmlns:a16="http://schemas.microsoft.com/office/drawing/2014/main" id="{E69D035F-517E-44A0-A41E-01A3D736FDA2}"/>
+              </a:ext>
+            </a:extLst>
+          </p:cNvPr>
+          <p:cNvPicPr>
+            <a:picLocks noChangeAspect="1" noChangeArrowheads="1"/>
+          </p:cNvPicPr>
+          <p:nvPr/>
+        </p:nvPicPr>
+        <p:blipFill>
+          <a:blip r:embed="rId5">
+            <a:duotone>
+              <a:schemeClr val="accent1">
+                <a:shade val="45000"/>
+                <a:satMod val="135000"/>
+              </a:schemeClr>
+              <a:prstClr val="white"/>
+            </a:duotone>
+            <a:extLst>
+              <a:ext uri="{28A0092B-C50C-407E-A947-70E740481C1C}">
+                <a14:useLocalDpi xmlns:a14="http://schemas.microsoft.com/office/drawing/2010/main" val="0"/>
+              </a:ext>
+            </a:extLst>
+          </a:blip>
+          <a:srcRect/>
+          <a:stretch>
+            <a:fillRect/>
+          </a:stretch>
+        </p:blipFill>
+        <p:spPr bwMode="auto">
+          <a:xfrm>
+            <a:off x="9864410" y="2580865"/>
+            <a:ext cx="1016140" cy="1076735"/>
           </a:xfrm>
           <a:prstGeom prst="rect">
             <a:avLst/>
           </a:prstGeom>
           <a:solidFill>
-            <a:schemeClr val="bg2"/>
+            <a:srgbClr val="FCF7F7"/>
           </a:solidFill>
         </p:spPr>
-        <p:style>
-          <a:lnRef idx="2">
-            <a:schemeClr val="accent1">
-              <a:shade val="50000"/>
-            </a:schemeClr>
-          </a:lnRef>
-          <a:fillRef idx="1">
-            <a:schemeClr val="accent1"/>
-          </a:fillRef>
-          <a:effectRef idx="0">
-            <a:schemeClr val="accent1"/>
-          </a:effectRef>
-          <a:fontRef idx="minor">
-            <a:schemeClr val="lt1"/>
-          </a:fontRef>
-        </p:style>
+      </p:pic>
+      <p:sp>
+        <p:nvSpPr>
+          <p:cNvPr id="11" name="TextBox 10">
+            <a:extLst>
+              <a:ext uri="{FF2B5EF4-FFF2-40B4-BE49-F238E27FC236}">
+                <a16:creationId xmlns:a16="http://schemas.microsoft.com/office/drawing/2014/main" id="{2B4C828F-2CC1-432D-8856-173D0C596351}"/>
+              </a:ext>
+            </a:extLst>
+          </p:cNvPr>
+          <p:cNvSpPr txBox="1"/>
+          <p:nvPr/>
+        </p:nvSpPr>
+        <p:spPr>
+          <a:xfrm>
+            <a:off x="10058400" y="2718556"/>
+            <a:ext cx="990600" cy="461665"/>
+          </a:xfrm>
+          <a:prstGeom prst="rect">
+            <a:avLst/>
+          </a:prstGeom>
+          <a:noFill/>
+        </p:spPr>
         <p:txBody>
-          <a:bodyPr rtlCol="0" anchor="ctr"/>
+          <a:bodyPr wrap="square" rtlCol="0">
+            <a:spAutoFit/>
+          </a:bodyPr>
           <a:lstStyle/>
           <a:p>
-            <a:pPr algn="ctr"/>
-            <a:endParaRPr lang="en-US"/>
+            <a:r>
+              <a:rPr lang="en-US" sz="2400" dirty="0">
+                <a:solidFill>
+                  <a:schemeClr val="accent1">
+                    <a:lumMod val="75000"/>
+                  </a:schemeClr>
+                </a:solidFill>
+              </a:rPr>
+              <a:t>???</a:t>
+            </a:r>
           </a:p>
         </p:txBody>
       </p:sp>
@@ -5870,7 +6366,7 @@
         </p:nvSpPr>
         <p:spPr>
           <a:xfrm>
-            <a:off x="1235038" y="1945082"/>
+            <a:off x="7433821" y="2589090"/>
             <a:ext cx="4800600" cy="762000"/>
           </a:xfrm>
           <a:prstGeom prst="rect">
@@ -6083,43 +6579,14 @@
           </a:lstStyle>
           <a:p>
             <a:r>
-              <a:rPr lang="en-US" dirty="0"/>
+              <a:rPr lang="en-US" dirty="0">
+                <a:solidFill>
+                  <a:schemeClr val="accent1">
+                    <a:lumMod val="75000"/>
+                  </a:schemeClr>
+                </a:solidFill>
+              </a:rPr>
               <a:t>Opinion Infection: </a:t>
-            </a:r>
-          </a:p>
-        </p:txBody>
-      </p:sp>
-      <p:sp>
-        <p:nvSpPr>
-          <p:cNvPr id="11" name="TextBox 10">
-            <a:extLst>
-              <a:ext uri="{FF2B5EF4-FFF2-40B4-BE49-F238E27FC236}">
-                <a16:creationId xmlns:a16="http://schemas.microsoft.com/office/drawing/2014/main" id="{2B4C828F-2CC1-432D-8856-173D0C596351}"/>
-              </a:ext>
-            </a:extLst>
-          </p:cNvPr>
-          <p:cNvSpPr txBox="1"/>
-          <p:nvPr/>
-        </p:nvSpPr>
-        <p:spPr>
-          <a:xfrm>
-            <a:off x="1844638" y="2942872"/>
-            <a:ext cx="990600" cy="646331"/>
-          </a:xfrm>
-          <a:prstGeom prst="rect">
-            <a:avLst/>
-          </a:prstGeom>
-          <a:noFill/>
-        </p:spPr>
-        <p:txBody>
-          <a:bodyPr wrap="square" rtlCol="0">
-            <a:spAutoFit/>
-          </a:bodyPr>
-          <a:lstStyle/>
-          <a:p>
-            <a:r>
-              <a:rPr lang="en-US" sz="3600" dirty="0"/>
-              <a:t>???</a:t>
             </a:r>
           </a:p>
         </p:txBody>
@@ -6138,13 +6605,19 @@
         </p:nvSpPr>
         <p:spPr>
           <a:xfrm>
-            <a:off x="1080052" y="4013694"/>
-            <a:ext cx="2572019" cy="2031325"/>
+            <a:off x="7611756" y="3990983"/>
+            <a:ext cx="3352800" cy="1754326"/>
           </a:xfrm>
           <a:prstGeom prst="rect">
             <a:avLst/>
           </a:prstGeom>
-          <a:noFill/>
+          <a:solidFill>
+            <a:schemeClr val="accent1">
+              <a:lumMod val="20000"/>
+              <a:lumOff val="80000"/>
+              <a:alpha val="50000"/>
+            </a:schemeClr>
+          </a:solidFill>
         </p:spPr>
         <p:txBody>
           <a:bodyPr wrap="square" rtlCol="0">
@@ -6152,154 +6625,13 @@
           </a:bodyPr>
           <a:lstStyle/>
           <a:p>
-            <a:r>
-              <a:rPr lang="en-US" dirty="0"/>
-              <a:t>There is not much data to inform what this feature is about. The questionnaire has had several versions an is no longer collecting data on this.</a:t>
-            </a:r>
-          </a:p>
-        </p:txBody>
-      </p:sp>
-      <p:sp>
-        <p:nvSpPr>
-          <p:cNvPr id="19" name="Text Placeholder 4">
-            <a:extLst>
-              <a:ext uri="{FF2B5EF4-FFF2-40B4-BE49-F238E27FC236}">
-                <a16:creationId xmlns:a16="http://schemas.microsoft.com/office/drawing/2014/main" id="{99D8F60B-DE32-4F9F-BF49-423AD7023B43}"/>
-              </a:ext>
-            </a:extLst>
-          </p:cNvPr>
-          <p:cNvSpPr>
-            <a:spLocks noGrp="1"/>
-          </p:cNvSpPr>
-          <p:nvPr>
-            <p:ph type="body" sz="quarter" idx="3"/>
-          </p:nvPr>
-        </p:nvSpPr>
-        <p:spPr>
-          <a:xfrm>
-            <a:off x="6554909" y="1828799"/>
-            <a:ext cx="4800600" cy="762000"/>
-          </a:xfrm>
-        </p:spPr>
-        <p:txBody>
-          <a:bodyPr/>
-          <a:lstStyle/>
-          <a:p>
-            <a:r>
-              <a:rPr lang="en-US" dirty="0"/>
-              <a:t>Prescription Medications: </a:t>
-            </a:r>
-          </a:p>
-        </p:txBody>
-      </p:sp>
-      <p:pic>
-        <p:nvPicPr>
-          <p:cNvPr id="10" name="Picture Placeholder 9" descr="A picture containing food&#10;&#10;Description automatically generated">
-            <a:extLst>
-              <a:ext uri="{FF2B5EF4-FFF2-40B4-BE49-F238E27FC236}">
-                <a16:creationId xmlns:a16="http://schemas.microsoft.com/office/drawing/2014/main" id="{A75E0C59-3DBB-4A47-80D5-1B1573BC40C7}"/>
-              </a:ext>
-            </a:extLst>
-          </p:cNvPr>
-          <p:cNvPicPr>
-            <a:picLocks noGrp="1" noChangeAspect="1"/>
-          </p:cNvPicPr>
-          <p:nvPr>
-            <p:ph sz="quarter" idx="4"/>
-          </p:nvPr>
-        </p:nvPicPr>
-        <p:blipFill rotWithShape="1">
-          <a:blip r:embed="rId2">
-            <a:extLst>
-              <a:ext uri="{28A0092B-C50C-407E-A947-70E740481C1C}">
-                <a14:useLocalDpi xmlns:a14="http://schemas.microsoft.com/office/drawing/2010/main" val="0"/>
-              </a:ext>
-            </a:extLst>
-          </a:blip>
-          <a:srcRect l="27100" r="2106" b="1"/>
-          <a:stretch/>
-        </p:blipFill>
-        <p:spPr>
-          <a:xfrm>
-            <a:off x="7380800" y="2381673"/>
-            <a:ext cx="1926200" cy="1528744"/>
-          </a:xfrm>
-          <a:noFill/>
-        </p:spPr>
-      </p:pic>
-      <p:sp>
-        <p:nvSpPr>
-          <p:cNvPr id="18" name="Rectangle 17">
-            <a:extLst>
-              <a:ext uri="{FF2B5EF4-FFF2-40B4-BE49-F238E27FC236}">
-                <a16:creationId xmlns:a16="http://schemas.microsoft.com/office/drawing/2014/main" id="{C2552A96-96C3-4A12-94FD-A736622B4A6C}"/>
-              </a:ext>
-            </a:extLst>
-          </p:cNvPr>
-          <p:cNvSpPr/>
-          <p:nvPr/>
-        </p:nvSpPr>
-        <p:spPr>
-          <a:xfrm>
-            <a:off x="6400801" y="4013693"/>
-            <a:ext cx="3886199" cy="2585323"/>
-          </a:xfrm>
-          <a:prstGeom prst="rect">
-            <a:avLst/>
-          </a:prstGeom>
-        </p:spPr>
-        <p:txBody>
-          <a:bodyPr wrap="square">
-            <a:spAutoFit/>
-          </a:bodyPr>
-          <a:lstStyle/>
-          <a:p>
-            <a:r>
-              <a:rPr lang="en-US" dirty="0"/>
-              <a:t>Out of the 1200 unique medications:</a:t>
-            </a:r>
-          </a:p>
-          <a:p>
-            <a:endParaRPr lang="en-US" dirty="0"/>
-          </a:p>
-          <a:p>
             <a:pPr marL="285750" indent="-285750">
               <a:buFont typeface="Arial" panose="020B0604020202020204" pitchFamily="34" charset="0"/>
               <a:buChar char="•"/>
             </a:pPr>
             <a:r>
               <a:rPr lang="en-US" dirty="0"/>
-              <a:t>Identify what medications or combinations </a:t>
-            </a:r>
-          </a:p>
-          <a:p>
-            <a:pPr marL="285750" indent="-285750">
-              <a:buFont typeface="Arial" panose="020B0604020202020204" pitchFamily="34" charset="0"/>
-              <a:buChar char="•"/>
-            </a:pPr>
-            <a:endParaRPr lang="en-US" dirty="0"/>
-          </a:p>
-          <a:p>
-            <a:pPr marL="285750" indent="-285750">
-              <a:buFont typeface="Arial" panose="020B0604020202020204" pitchFamily="34" charset="0"/>
-              <a:buChar char="•"/>
-            </a:pPr>
-            <a:r>
-              <a:rPr lang="en-US" dirty="0"/>
-              <a:t>Evaluate if increase in number of prescriptions </a:t>
-            </a:r>
-          </a:p>
-          <a:p>
-            <a:pPr marL="285750" indent="-285750">
-              <a:buFont typeface="Arial" panose="020B0604020202020204" pitchFamily="34" charset="0"/>
-              <a:buChar char="•"/>
-            </a:pPr>
-            <a:endParaRPr lang="en-US" dirty="0"/>
-          </a:p>
-          <a:p>
-            <a:r>
-              <a:rPr lang="en-US" dirty="0"/>
-              <a:t>Are contributing factors</a:t>
+              <a:t>Investigate the meaning behind this feature.  The questionnaire to collect data has had several versions and questions surrounding this no longer exist.</a:t>
             </a:r>
           </a:p>
         </p:txBody>
@@ -8675,7 +9007,7 @@
           <a:p>
             <a:r>
               <a:rPr lang="en-US" dirty="0"/>
-              <a:t>618K Self-Reported Samples</a:t>
+              <a:t>618K+ Self-Reported Samples</a:t>
             </a:r>
           </a:p>
           <a:p>
@@ -16061,7 +16393,7 @@
         </p:blipFill>
         <p:spPr>
           <a:xfrm>
-            <a:off x="6927" y="1664150"/>
+            <a:off x="120430" y="1676400"/>
             <a:ext cx="11749350" cy="4952745"/>
           </a:xfrm>
           <a:prstGeom prst="rect">
@@ -16105,8 +16437,8 @@
         </p:nvSpPr>
         <p:spPr>
           <a:xfrm>
-            <a:off x="1031488" y="1929041"/>
-            <a:ext cx="2016512" cy="461665"/>
+            <a:off x="179631" y="1792356"/>
+            <a:ext cx="3159512" cy="523220"/>
           </a:xfrm>
           <a:prstGeom prst="rect">
             <a:avLst/>
@@ -16120,7 +16452,7 @@
           <a:lstStyle/>
           <a:p>
             <a:r>
-              <a:rPr lang="en-US" sz="2400" dirty="0">
+              <a:rPr lang="en-US" sz="2800" dirty="0">
                 <a:solidFill>
                   <a:schemeClr val="accent4">
                     <a:lumMod val="75000"/>
@@ -16146,8 +16478,8 @@
         </p:nvSpPr>
         <p:spPr>
           <a:xfrm>
-            <a:off x="6172200" y="1941292"/>
-            <a:ext cx="5537200" cy="369332"/>
+            <a:off x="5712639" y="1803232"/>
+            <a:ext cx="5537200" cy="461665"/>
           </a:xfrm>
           <a:prstGeom prst="rect">
             <a:avLst/>
@@ -16161,7 +16493,7 @@
           <a:lstStyle/>
           <a:p>
             <a:r>
-              <a:rPr lang="en-US" dirty="0">
+              <a:rPr lang="en-US" sz="2400" dirty="0">
                 <a:solidFill>
                   <a:schemeClr val="accent4">
                     <a:lumMod val="75000"/>
@@ -16214,10 +16546,10 @@
       </p:pic>
       <p:pic>
         <p:nvPicPr>
-          <p:cNvPr id="11" name="Picture 10">
+          <p:cNvPr id="4" name="Picture 3">
             <a:extLst>
               <a:ext uri="{FF2B5EF4-FFF2-40B4-BE49-F238E27FC236}">
-                <a16:creationId xmlns:a16="http://schemas.microsoft.com/office/drawing/2014/main" id="{7F8D43AE-E2FE-4E53-A922-683F9E26337D}"/>
+                <a16:creationId xmlns:a16="http://schemas.microsoft.com/office/drawing/2014/main" id="{9D5467AE-28CC-4ED2-9C2A-E779A9C881FA}"/>
               </a:ext>
             </a:extLst>
           </p:cNvPr>
@@ -16242,8 +16574,8 @@
         </p:blipFill>
         <p:spPr>
           <a:xfrm>
-            <a:off x="108129" y="2390706"/>
-            <a:ext cx="5129813" cy="2257494"/>
+            <a:off x="5474020" y="2390706"/>
+            <a:ext cx="6112034" cy="3857694"/>
           </a:xfrm>
           <a:prstGeom prst="rect">
             <a:avLst/>
@@ -16252,10 +16584,10 @@
       </p:pic>
       <p:pic>
         <p:nvPicPr>
-          <p:cNvPr id="4" name="Picture 3">
+          <p:cNvPr id="3" name="Picture 2">
             <a:extLst>
               <a:ext uri="{FF2B5EF4-FFF2-40B4-BE49-F238E27FC236}">
-                <a16:creationId xmlns:a16="http://schemas.microsoft.com/office/drawing/2014/main" id="{9D5467AE-28CC-4ED2-9C2A-E779A9C881FA}"/>
+                <a16:creationId xmlns:a16="http://schemas.microsoft.com/office/drawing/2014/main" id="{8650EB01-DA9C-43B3-98BA-4AEFC3D44494}"/>
               </a:ext>
             </a:extLst>
           </p:cNvPr>
@@ -16280,14 +16612,182 @@
         </p:blipFill>
         <p:spPr>
           <a:xfrm>
-            <a:off x="5474020" y="2390706"/>
-            <a:ext cx="6112034" cy="3857694"/>
+            <a:off x="290136" y="2520843"/>
+            <a:ext cx="4671604" cy="1982011"/>
           </a:xfrm>
           <a:prstGeom prst="rect">
             <a:avLst/>
           </a:prstGeom>
         </p:spPr>
       </p:pic>
+      <p:grpSp>
+        <p:nvGrpSpPr>
+          <p:cNvPr id="13" name="Group 12">
+            <a:extLst>
+              <a:ext uri="{FF2B5EF4-FFF2-40B4-BE49-F238E27FC236}">
+                <a16:creationId xmlns:a16="http://schemas.microsoft.com/office/drawing/2014/main" id="{3993F53E-8284-4F2D-AC9B-0CDC3486C986}"/>
+              </a:ext>
+            </a:extLst>
+          </p:cNvPr>
+          <p:cNvGrpSpPr/>
+          <p:nvPr/>
+        </p:nvGrpSpPr>
+        <p:grpSpPr>
+          <a:xfrm>
+            <a:off x="259887" y="2368443"/>
+            <a:ext cx="1774125" cy="984357"/>
+            <a:chOff x="259887" y="2520843"/>
+            <a:chExt cx="1774125" cy="984357"/>
+          </a:xfrm>
+        </p:grpSpPr>
+        <p:sp>
+          <p:nvSpPr>
+            <p:cNvPr id="12" name="Arrow: Right 11">
+              <a:extLst>
+                <a:ext uri="{FF2B5EF4-FFF2-40B4-BE49-F238E27FC236}">
+                  <a16:creationId xmlns:a16="http://schemas.microsoft.com/office/drawing/2014/main" id="{CB6E5679-3FD4-4DCB-A2DF-8962742063A2}"/>
+                </a:ext>
+              </a:extLst>
+            </p:cNvPr>
+            <p:cNvSpPr/>
+            <p:nvPr/>
+          </p:nvSpPr>
+          <p:spPr>
+            <a:xfrm>
+              <a:off x="259887" y="2520843"/>
+              <a:ext cx="1340313" cy="984357"/>
+            </a:xfrm>
+            <a:prstGeom prst="rightArrow">
+              <a:avLst/>
+            </a:prstGeom>
+          </p:spPr>
+          <p:style>
+            <a:lnRef idx="1">
+              <a:schemeClr val="accent1"/>
+            </a:lnRef>
+            <a:fillRef idx="2">
+              <a:schemeClr val="accent1"/>
+            </a:fillRef>
+            <a:effectRef idx="1">
+              <a:schemeClr val="accent1"/>
+            </a:effectRef>
+            <a:fontRef idx="minor">
+              <a:schemeClr val="dk1"/>
+            </a:fontRef>
+          </p:style>
+          <p:txBody>
+            <a:bodyPr rtlCol="0" anchor="ctr"/>
+            <a:lstStyle/>
+            <a:p>
+              <a:pPr algn="ctr"/>
+              <a:endParaRPr lang="en-US"/>
+            </a:p>
+          </p:txBody>
+        </p:sp>
+        <p:sp>
+          <p:nvSpPr>
+            <p:cNvPr id="5" name="TextBox 4">
+              <a:extLst>
+                <a:ext uri="{FF2B5EF4-FFF2-40B4-BE49-F238E27FC236}">
+                  <a16:creationId xmlns:a16="http://schemas.microsoft.com/office/drawing/2014/main" id="{32AE3129-2C90-4EC3-8B45-5ADABAD24A02}"/>
+                </a:ext>
+              </a:extLst>
+            </p:cNvPr>
+            <p:cNvSpPr txBox="1"/>
+            <p:nvPr/>
+          </p:nvSpPr>
+          <p:spPr>
+            <a:xfrm>
+              <a:off x="273925" y="2759105"/>
+              <a:ext cx="1143000" cy="507831"/>
+            </a:xfrm>
+            <a:prstGeom prst="rect">
+              <a:avLst/>
+            </a:prstGeom>
+            <a:noFill/>
+          </p:spPr>
+          <p:txBody>
+            <a:bodyPr wrap="square" rtlCol="0">
+              <a:spAutoFit/>
+            </a:bodyPr>
+            <a:lstStyle/>
+            <a:p>
+              <a:r>
+                <a:rPr lang="en-US" sz="900" dirty="0">
+                  <a:solidFill>
+                    <a:schemeClr val="bg1"/>
+                  </a:solidFill>
+                </a:rPr>
+                <a:t>Biological, </a:t>
+              </a:r>
+            </a:p>
+            <a:p>
+              <a:r>
+                <a:rPr lang="en-US" sz="900" dirty="0">
+                  <a:solidFill>
+                    <a:schemeClr val="bg1"/>
+                  </a:solidFill>
+                </a:rPr>
+                <a:t>Behavioral,</a:t>
+              </a:r>
+            </a:p>
+            <a:p>
+              <a:r>
+                <a:rPr lang="en-US" sz="900" dirty="0">
+                  <a:solidFill>
+                    <a:schemeClr val="bg1"/>
+                  </a:solidFill>
+                </a:rPr>
+                <a:t>Environmental</a:t>
+              </a:r>
+              <a:endParaRPr lang="en-US" dirty="0">
+                <a:solidFill>
+                  <a:schemeClr val="bg1"/>
+                </a:solidFill>
+              </a:endParaRPr>
+            </a:p>
+          </p:txBody>
+        </p:sp>
+        <p:sp>
+          <p:nvSpPr>
+            <p:cNvPr id="7" name="TextBox 6">
+              <a:extLst>
+                <a:ext uri="{FF2B5EF4-FFF2-40B4-BE49-F238E27FC236}">
+                  <a16:creationId xmlns:a16="http://schemas.microsoft.com/office/drawing/2014/main" id="{6B002650-8436-4DA4-BFC0-D42533218ABB}"/>
+                </a:ext>
+              </a:extLst>
+            </p:cNvPr>
+            <p:cNvSpPr txBox="1"/>
+            <p:nvPr/>
+          </p:nvSpPr>
+          <p:spPr>
+            <a:xfrm>
+              <a:off x="891012" y="2802089"/>
+              <a:ext cx="1143000" cy="369332"/>
+            </a:xfrm>
+            <a:prstGeom prst="rect">
+              <a:avLst/>
+            </a:prstGeom>
+            <a:noFill/>
+          </p:spPr>
+          <p:txBody>
+            <a:bodyPr wrap="square" rtlCol="0">
+              <a:spAutoFit/>
+            </a:bodyPr>
+            <a:lstStyle/>
+            <a:p>
+              <a:r>
+                <a:rPr lang="en-US" dirty="0">
+                  <a:solidFill>
+                    <a:schemeClr val="bg1"/>
+                  </a:solidFill>
+                </a:rPr>
+                <a:t>Data</a:t>
+              </a:r>
+            </a:p>
+          </p:txBody>
+        </p:sp>
+      </p:grpSp>
     </p:spTree>
     <p:extLst>
       <p:ext uri="{BB962C8B-B14F-4D97-AF65-F5344CB8AC3E}">
@@ -16368,36 +16868,6 @@
           </a:p>
         </p:txBody>
       </p:sp>
-      <p:pic>
-        <p:nvPicPr>
-          <p:cNvPr id="4" name="Picture 3">
-            <a:extLst>
-              <a:ext uri="{FF2B5EF4-FFF2-40B4-BE49-F238E27FC236}">
-                <a16:creationId xmlns:a16="http://schemas.microsoft.com/office/drawing/2014/main" id="{CB40917C-72DB-4032-A97D-CC68DF65A2D7}"/>
-              </a:ext>
-            </a:extLst>
-          </p:cNvPr>
-          <p:cNvPicPr>
-            <a:picLocks noChangeAspect="1"/>
-          </p:cNvPicPr>
-          <p:nvPr/>
-        </p:nvPicPr>
-        <p:blipFill>
-          <a:blip r:embed="rId3"/>
-          <a:stretch>
-            <a:fillRect/>
-          </a:stretch>
-        </p:blipFill>
-        <p:spPr>
-          <a:xfrm>
-            <a:off x="6593333" y="2049150"/>
-            <a:ext cx="5598667" cy="4228093"/>
-          </a:xfrm>
-          <a:prstGeom prst="rect">
-            <a:avLst/>
-          </a:prstGeom>
-        </p:spPr>
-      </p:pic>
       <p:sp>
         <p:nvSpPr>
           <p:cNvPr id="5" name="Rectangle 4">
@@ -16459,7 +16929,7 @@
           <p:nvPr/>
         </p:nvPicPr>
         <p:blipFill>
-          <a:blip r:embed="rId4"/>
+          <a:blip r:embed="rId3"/>
           <a:stretch>
             <a:fillRect/>
           </a:stretch>
@@ -16556,6 +17026,120 @@
           </a:p>
         </p:txBody>
       </p:sp>
+      <p:sp>
+        <p:nvSpPr>
+          <p:cNvPr id="3" name="TextBox 2">
+            <a:extLst>
+              <a:ext uri="{FF2B5EF4-FFF2-40B4-BE49-F238E27FC236}">
+                <a16:creationId xmlns:a16="http://schemas.microsoft.com/office/drawing/2014/main" id="{E31C96D7-B47E-4FA5-85CF-AE2033A936C1}"/>
+              </a:ext>
+            </a:extLst>
+          </p:cNvPr>
+          <p:cNvSpPr txBox="1"/>
+          <p:nvPr/>
+        </p:nvSpPr>
+        <p:spPr>
+          <a:xfrm>
+            <a:off x="1447800" y="3810000"/>
+            <a:ext cx="1676400" cy="261610"/>
+          </a:xfrm>
+          <a:prstGeom prst="rect">
+            <a:avLst/>
+          </a:prstGeom>
+          <a:noFill/>
+        </p:spPr>
+        <p:txBody>
+          <a:bodyPr wrap="square" rtlCol="0">
+            <a:spAutoFit/>
+          </a:bodyPr>
+          <a:lstStyle/>
+          <a:p>
+            <a:r>
+              <a:rPr lang="en-US" sz="1100" dirty="0">
+                <a:solidFill>
+                  <a:schemeClr val="accent2">
+                    <a:lumMod val="20000"/>
+                    <a:lumOff val="80000"/>
+                  </a:schemeClr>
+                </a:solidFill>
+              </a:rPr>
+              <a:t>True Negative</a:t>
+            </a:r>
+          </a:p>
+        </p:txBody>
+      </p:sp>
+      <p:sp>
+        <p:nvSpPr>
+          <p:cNvPr id="9" name="TextBox 8">
+            <a:extLst>
+              <a:ext uri="{FF2B5EF4-FFF2-40B4-BE49-F238E27FC236}">
+                <a16:creationId xmlns:a16="http://schemas.microsoft.com/office/drawing/2014/main" id="{7A5FD056-C860-45FA-ABAD-AF4A7BC16BD2}"/>
+              </a:ext>
+            </a:extLst>
+          </p:cNvPr>
+          <p:cNvSpPr txBox="1"/>
+          <p:nvPr/>
+        </p:nvSpPr>
+        <p:spPr>
+          <a:xfrm>
+            <a:off x="3645733" y="5368897"/>
+            <a:ext cx="1676400" cy="261610"/>
+          </a:xfrm>
+          <a:prstGeom prst="rect">
+            <a:avLst/>
+          </a:prstGeom>
+          <a:noFill/>
+        </p:spPr>
+        <p:txBody>
+          <a:bodyPr wrap="square" rtlCol="0">
+            <a:spAutoFit/>
+          </a:bodyPr>
+          <a:lstStyle/>
+          <a:p>
+            <a:r>
+              <a:rPr lang="en-US" sz="1100" dirty="0">
+                <a:solidFill>
+                  <a:schemeClr val="accent2">
+                    <a:lumMod val="20000"/>
+                    <a:lumOff val="80000"/>
+                  </a:schemeClr>
+                </a:solidFill>
+              </a:rPr>
+              <a:t>True Positive</a:t>
+            </a:r>
+          </a:p>
+        </p:txBody>
+      </p:sp>
+      <p:pic>
+        <p:nvPicPr>
+          <p:cNvPr id="10" name="Picture 9">
+            <a:extLst>
+              <a:ext uri="{FF2B5EF4-FFF2-40B4-BE49-F238E27FC236}">
+                <a16:creationId xmlns:a16="http://schemas.microsoft.com/office/drawing/2014/main" id="{BA0B552D-74F3-47F6-8BDF-9C9D341E99DD}"/>
+              </a:ext>
+            </a:extLst>
+          </p:cNvPr>
+          <p:cNvPicPr>
+            <a:picLocks noChangeAspect="1"/>
+          </p:cNvPicPr>
+          <p:nvPr/>
+        </p:nvPicPr>
+        <p:blipFill>
+          <a:blip r:embed="rId4"/>
+          <a:stretch>
+            <a:fillRect/>
+          </a:stretch>
+        </p:blipFill>
+        <p:spPr>
+          <a:xfrm>
+            <a:off x="6856602" y="2311959"/>
+            <a:ext cx="5325566" cy="3519302"/>
+          </a:xfrm>
+          <a:prstGeom prst="rect">
+            <a:avLst/>
+          </a:prstGeom>
+        </p:spPr>
+      </p:pic>
     </p:spTree>
     <p:extLst>
       <p:ext uri="{BB962C8B-B14F-4D97-AF65-F5344CB8AC3E}">
@@ -16740,6 +17324,109 @@
       </p:grpSpPr>
       <p:sp>
         <p:nvSpPr>
+          <p:cNvPr id="5" name="Rectangle 4">
+            <a:extLst>
+              <a:ext uri="{FF2B5EF4-FFF2-40B4-BE49-F238E27FC236}">
+                <a16:creationId xmlns:a16="http://schemas.microsoft.com/office/drawing/2014/main" id="{00E362E1-51B8-4957-9422-944EE1216076}"/>
+              </a:ext>
+            </a:extLst>
+          </p:cNvPr>
+          <p:cNvSpPr/>
+          <p:nvPr/>
+        </p:nvSpPr>
+        <p:spPr>
+          <a:xfrm>
+            <a:off x="136332" y="2586132"/>
+            <a:ext cx="3886200" cy="3788122"/>
+          </a:xfrm>
+          <a:prstGeom prst="rect">
+            <a:avLst/>
+          </a:prstGeom>
+          <a:solidFill>
+            <a:schemeClr val="bg1"/>
+          </a:solidFill>
+        </p:spPr>
+        <p:style>
+          <a:lnRef idx="2">
+            <a:schemeClr val="accent1">
+              <a:shade val="50000"/>
+            </a:schemeClr>
+          </a:lnRef>
+          <a:fillRef idx="1">
+            <a:schemeClr val="accent1"/>
+          </a:fillRef>
+          <a:effectRef idx="0">
+            <a:schemeClr val="accent1"/>
+          </a:effectRef>
+          <a:fontRef idx="minor">
+            <a:schemeClr val="lt1"/>
+          </a:fontRef>
+        </p:style>
+        <p:txBody>
+          <a:bodyPr rtlCol="0" anchor="ctr"/>
+          <a:lstStyle/>
+          <a:p>
+            <a:pPr algn="ctr"/>
+            <a:endParaRPr lang="en-US"/>
+          </a:p>
+        </p:txBody>
+      </p:sp>
+      <p:pic>
+        <p:nvPicPr>
+          <p:cNvPr id="2054" name="Picture 6" descr="WASHING HANDS - Free miscellaneous icons">
+            <a:extLst>
+              <a:ext uri="{FF2B5EF4-FFF2-40B4-BE49-F238E27FC236}">
+                <a16:creationId xmlns:a16="http://schemas.microsoft.com/office/drawing/2014/main" id="{18EDBB62-60A8-42FF-B504-1E30AD285701}"/>
+              </a:ext>
+            </a:extLst>
+          </p:cNvPr>
+          <p:cNvPicPr>
+            <a:picLocks noChangeAspect="1" noChangeArrowheads="1"/>
+          </p:cNvPicPr>
+          <p:nvPr/>
+        </p:nvPicPr>
+        <p:blipFill>
+          <a:blip r:embed="rId3">
+            <a:duotone>
+              <a:schemeClr val="accent1">
+                <a:shade val="45000"/>
+                <a:satMod val="135000"/>
+              </a:schemeClr>
+              <a:prstClr val="white"/>
+            </a:duotone>
+            <a:extLst>
+              <a:ext uri="{28A0092B-C50C-407E-A947-70E740481C1C}">
+                <a14:useLocalDpi xmlns:a14="http://schemas.microsoft.com/office/drawing/2010/main" val="0"/>
+              </a:ext>
+            </a:extLst>
+          </a:blip>
+          <a:srcRect/>
+          <a:stretch>
+            <a:fillRect/>
+          </a:stretch>
+        </p:blipFill>
+        <p:spPr bwMode="auto">
+          <a:xfrm>
+            <a:off x="1482534" y="4178898"/>
+            <a:ext cx="1108266" cy="1108266"/>
+          </a:xfrm>
+          <a:prstGeom prst="rect">
+            <a:avLst/>
+          </a:prstGeom>
+          <a:noFill/>
+          <a:extLst>
+            <a:ext uri="{909E8E84-426E-40DD-AFC4-6F175D3DCCD1}">
+              <a14:hiddenFill xmlns:a14="http://schemas.microsoft.com/office/drawing/2010/main">
+                <a:solidFill>
+                  <a:srgbClr val="FFFFFF"/>
+                </a:solidFill>
+              </a14:hiddenFill>
+            </a:ext>
+          </a:extLst>
+        </p:spPr>
+      </p:pic>
+      <p:sp>
+        <p:nvSpPr>
           <p:cNvPr id="2" name="Title 1"/>
           <p:cNvSpPr>
             <a:spLocks noGrp="1"/>
@@ -16760,17 +17447,14 @@
           </a:bodyPr>
           <a:lstStyle/>
           <a:p>
-            <a:r>
-              <a:rPr lang="en-US" dirty="0"/>
-              <a:t>Behavioral Patterns Matter </a:t>
-            </a:r>
             <a:br>
               <a:rPr lang="en-US" dirty="0"/>
             </a:br>
             <a:r>
-              <a:rPr lang="en-US" sz="2800" dirty="0"/>
+              <a:rPr lang="en-US" sz="4000" dirty="0"/>
               <a:t>Top Factors by level of importance:</a:t>
             </a:r>
+            <a:endParaRPr lang="en-US" sz="2800" dirty="0"/>
           </a:p>
         </p:txBody>
       </p:sp>
@@ -16806,36 +17490,6 @@
           </a:p>
         </p:txBody>
       </p:sp>
-      <p:pic>
-        <p:nvPicPr>
-          <p:cNvPr id="25" name="Picture 24">
-            <a:extLst>
-              <a:ext uri="{FF2B5EF4-FFF2-40B4-BE49-F238E27FC236}">
-                <a16:creationId xmlns:a16="http://schemas.microsoft.com/office/drawing/2014/main" id="{C0E909A9-9D8F-4D07-836B-C625F71A4F33}"/>
-              </a:ext>
-            </a:extLst>
-          </p:cNvPr>
-          <p:cNvPicPr>
-            <a:picLocks noChangeAspect="1"/>
-          </p:cNvPicPr>
-          <p:nvPr/>
-        </p:nvPicPr>
-        <p:blipFill>
-          <a:blip r:embed="rId3"/>
-          <a:stretch>
-            <a:fillRect/>
-          </a:stretch>
-        </p:blipFill>
-        <p:spPr>
-          <a:xfrm>
-            <a:off x="4131697" y="1842286"/>
-            <a:ext cx="7257729" cy="4796136"/>
-          </a:xfrm>
-          <a:prstGeom prst="rect">
-            <a:avLst/>
-          </a:prstGeom>
-        </p:spPr>
-      </p:pic>
       <p:sp>
         <p:nvSpPr>
           <p:cNvPr id="26" name="TextBox 25">
@@ -16910,153 +17564,6 @@
           </a:p>
         </p:txBody>
       </p:sp>
-      <p:sp>
-        <p:nvSpPr>
-          <p:cNvPr id="11" name="TextBox 10">
-            <a:extLst>
-              <a:ext uri="{FF2B5EF4-FFF2-40B4-BE49-F238E27FC236}">
-                <a16:creationId xmlns:a16="http://schemas.microsoft.com/office/drawing/2014/main" id="{B863347A-089C-4391-A109-28796D8B5E9B}"/>
-              </a:ext>
-            </a:extLst>
-          </p:cNvPr>
-          <p:cNvSpPr txBox="1"/>
-          <p:nvPr/>
-        </p:nvSpPr>
-        <p:spPr>
-          <a:xfrm>
-            <a:off x="8534400" y="2362200"/>
-            <a:ext cx="373858" cy="584775"/>
-          </a:xfrm>
-          <a:prstGeom prst="rect">
-            <a:avLst/>
-          </a:prstGeom>
-          <a:noFill/>
-        </p:spPr>
-        <p:txBody>
-          <a:bodyPr wrap="square" rtlCol="0">
-            <a:spAutoFit/>
-          </a:bodyPr>
-          <a:lstStyle/>
-          <a:p>
-            <a:r>
-              <a:rPr lang="en-US" sz="3200" b="1" dirty="0"/>
-              <a:t>+</a:t>
-            </a:r>
-          </a:p>
-        </p:txBody>
-      </p:sp>
-      <p:sp>
-        <p:nvSpPr>
-          <p:cNvPr id="13" name="TextBox 12">
-            <a:extLst>
-              <a:ext uri="{FF2B5EF4-FFF2-40B4-BE49-F238E27FC236}">
-                <a16:creationId xmlns:a16="http://schemas.microsoft.com/office/drawing/2014/main" id="{82331FE8-5DEC-48C5-89B3-D8F71F54FC22}"/>
-              </a:ext>
-            </a:extLst>
-          </p:cNvPr>
-          <p:cNvSpPr txBox="1"/>
-          <p:nvPr/>
-        </p:nvSpPr>
-        <p:spPr>
-          <a:xfrm>
-            <a:off x="8466221" y="2995073"/>
-            <a:ext cx="373858" cy="584775"/>
-          </a:xfrm>
-          <a:prstGeom prst="rect">
-            <a:avLst/>
-          </a:prstGeom>
-          <a:noFill/>
-        </p:spPr>
-        <p:txBody>
-          <a:bodyPr wrap="square" rtlCol="0">
-            <a:spAutoFit/>
-          </a:bodyPr>
-          <a:lstStyle/>
-          <a:p>
-            <a:r>
-              <a:rPr lang="en-US" sz="3200" b="1" dirty="0"/>
-              <a:t>+</a:t>
-            </a:r>
-          </a:p>
-        </p:txBody>
-      </p:sp>
-      <p:sp>
-        <p:nvSpPr>
-          <p:cNvPr id="15" name="TextBox 14">
-            <a:extLst>
-              <a:ext uri="{FF2B5EF4-FFF2-40B4-BE49-F238E27FC236}">
-                <a16:creationId xmlns:a16="http://schemas.microsoft.com/office/drawing/2014/main" id="{A95A0E33-9291-4635-BEEB-35024AA3EB2F}"/>
-              </a:ext>
-            </a:extLst>
-          </p:cNvPr>
-          <p:cNvSpPr txBox="1"/>
-          <p:nvPr/>
-        </p:nvSpPr>
-        <p:spPr>
-          <a:xfrm>
-            <a:off x="8445332" y="3567599"/>
-            <a:ext cx="373858" cy="584775"/>
-          </a:xfrm>
-          <a:prstGeom prst="rect">
-            <a:avLst/>
-          </a:prstGeom>
-          <a:noFill/>
-        </p:spPr>
-        <p:txBody>
-          <a:bodyPr wrap="square" rtlCol="0">
-            <a:spAutoFit/>
-          </a:bodyPr>
-          <a:lstStyle/>
-          <a:p>
-            <a:r>
-              <a:rPr lang="en-US" sz="3200" b="1" dirty="0"/>
-              <a:t>+</a:t>
-            </a:r>
-          </a:p>
-        </p:txBody>
-      </p:sp>
-      <p:sp>
-        <p:nvSpPr>
-          <p:cNvPr id="14" name="TextBox 13">
-            <a:extLst>
-              <a:ext uri="{FF2B5EF4-FFF2-40B4-BE49-F238E27FC236}">
-                <a16:creationId xmlns:a16="http://schemas.microsoft.com/office/drawing/2014/main" id="{16D24B88-375F-47DF-9E79-22F435808E5C}"/>
-              </a:ext>
-            </a:extLst>
-          </p:cNvPr>
-          <p:cNvSpPr txBox="1"/>
-          <p:nvPr/>
-        </p:nvSpPr>
-        <p:spPr>
-          <a:xfrm>
-            <a:off x="8394755" y="4038785"/>
-            <a:ext cx="373858" cy="707886"/>
-          </a:xfrm>
-          <a:prstGeom prst="rect">
-            <a:avLst/>
-          </a:prstGeom>
-          <a:noFill/>
-        </p:spPr>
-        <p:txBody>
-          <a:bodyPr wrap="square" rtlCol="0">
-            <a:spAutoFit/>
-          </a:bodyPr>
-          <a:lstStyle/>
-          <a:p>
-            <a:r>
-              <a:rPr lang="en-US" sz="4000" b="1" dirty="0">
-                <a:solidFill>
-                  <a:schemeClr val="tx1">
-                    <a:lumMod val="65000"/>
-                    <a:lumOff val="35000"/>
-                  </a:schemeClr>
-                </a:solidFill>
-              </a:rPr>
-              <a:t>-</a:t>
-            </a:r>
-          </a:p>
-        </p:txBody>
-      </p:sp>
       <p:graphicFrame>
         <p:nvGraphicFramePr>
           <p:cNvPr id="6" name="Table 5">
@@ -17072,21 +17579,21 @@
           <p:nvPr>
             <p:extLst>
               <p:ext uri="{D42A27DB-BD31-4B8C-83A1-F6EECF244321}">
-                <p14:modId xmlns:p14="http://schemas.microsoft.com/office/powerpoint/2010/main" val="3634455047"/>
+                <p14:modId xmlns:p14="http://schemas.microsoft.com/office/powerpoint/2010/main" val="1364550204"/>
               </p:ext>
             </p:extLst>
           </p:nvPr>
         </p:nvGraphicFramePr>
         <p:xfrm>
-          <a:off x="76200" y="1885591"/>
-          <a:ext cx="4034608" cy="4761502"/>
+          <a:off x="4307226" y="2140233"/>
+          <a:ext cx="4350866" cy="4503269"/>
         </p:xfrm>
         <a:graphic>
           <a:graphicData uri="http://schemas.openxmlformats.org/drawingml/2006/table">
             <a:tbl>
               <a:tblPr/>
               <a:tblGrid>
-                <a:gridCol w="4034608">
+                <a:gridCol w="4350866">
                   <a:extLst>
                     <a:ext uri="{9D8B030D-6E8A-4147-A177-3AD203B41FA5}">
                       <a16:colId xmlns:a16="http://schemas.microsoft.com/office/drawing/2014/main" val="3785040884"/>
@@ -17094,13 +17601,13 @@
                   </a:extLst>
                 </a:gridCol>
               </a:tblGrid>
-              <a:tr h="476609">
+              <a:tr h="450329">
                 <a:tc>
                   <a:txBody>
                     <a:bodyPr/>
                     <a:lstStyle/>
                     <a:p>
-                      <a:pPr algn="r" fontAlgn="b"/>
+                      <a:pPr algn="l" fontAlgn="b"/>
                       <a:r>
                         <a:rPr lang="en-US" sz="2400" b="1" i="0" u="none" strike="noStrike" dirty="0">
                           <a:solidFill>
@@ -17143,7 +17650,7 @@
                   </a:ext>
                 </a:extLst>
               </a:tr>
-              <a:tr h="613868">
+              <a:tr h="580020">
                 <a:tc>
                   <a:txBody>
                     <a:bodyPr/>
@@ -17158,7 +17665,7 @@
                           <a:effectLst/>
                           <a:latin typeface="Calibri" panose="020F0502020204030204" pitchFamily="34" charset="0"/>
                         </a:rPr>
-                        <a:t>The individual exhibited COVD-19 symptoms</a:t>
+                        <a:t>Exhibiting COVID-19 symptoms</a:t>
                       </a:r>
                     </a:p>
                   </a:txBody>
@@ -17192,7 +17699,7 @@
                   </a:ext>
                 </a:extLst>
               </a:tr>
-              <a:tr h="624408">
+              <a:tr h="589977">
                 <a:tc>
                   <a:txBody>
                     <a:bodyPr/>
@@ -17207,7 +17714,7 @@
                           <a:effectLst/>
                           <a:latin typeface="Calibri" panose="020F0502020204030204" pitchFamily="34" charset="0"/>
                         </a:rPr>
-                        <a:t>The individual believed they could contract the disease</a:t>
+                        <a:t>Belief in contracting the disease</a:t>
                       </a:r>
                     </a:p>
                   </a:txBody>
@@ -17235,7 +17742,7 @@
                   </a:ext>
                 </a:extLst>
               </a:tr>
-              <a:tr h="592947">
+              <a:tr h="565938">
                 <a:tc>
                   <a:txBody>
                     <a:bodyPr/>
@@ -17243,14 +17750,27 @@
                     <a:p>
                       <a:pPr algn="l" fontAlgn="b"/>
                       <a:r>
-                        <a:rPr lang="en-US" sz="1800" b="0" i="0" u="none" strike="noStrike">
+                        <a:rPr lang="en-US" sz="1800" b="0" i="0" u="none" strike="noStrike" dirty="0">
                           <a:solidFill>
                             <a:srgbClr val="000000"/>
                           </a:solidFill>
                           <a:effectLst/>
                           <a:latin typeface="Calibri" panose="020F0502020204030204" pitchFamily="34" charset="0"/>
                         </a:rPr>
-                        <a:t>The individual came into contact with someone who tested positive for COVID-19</a:t>
+                        <a:t>Contact with others infected with </a:t>
+                      </a:r>
+                    </a:p>
+                    <a:p>
+                      <a:pPr algn="l" fontAlgn="b"/>
+                      <a:r>
+                        <a:rPr lang="en-US" sz="1800" b="0" i="0" u="none" strike="noStrike" dirty="0">
+                          <a:solidFill>
+                            <a:srgbClr val="000000"/>
+                          </a:solidFill>
+                          <a:effectLst/>
+                          <a:latin typeface="Calibri" panose="020F0502020204030204" pitchFamily="34" charset="0"/>
+                        </a:rPr>
+                        <a:t>COVID-19</a:t>
                       </a:r>
                     </a:p>
                   </a:txBody>
@@ -17278,7 +17798,7 @@
                   </a:ext>
                 </a:extLst>
               </a:tr>
-              <a:tr h="682666">
+              <a:tr h="645023">
                 <a:tc>
                   <a:txBody>
                     <a:bodyPr/>
@@ -17293,7 +17813,7 @@
                           <a:effectLst/>
                           <a:latin typeface="Calibri" panose="020F0502020204030204" pitchFamily="34" charset="0"/>
                         </a:rPr>
-                        <a:t>The household practiced social distancing and hand washing</a:t>
+                        <a:t>Household practiced social distancing &amp; hygiene</a:t>
                       </a:r>
                     </a:p>
                   </a:txBody>
@@ -17321,7 +17841,7 @@
                   </a:ext>
                 </a:extLst>
               </a:tr>
-              <a:tr h="608007">
+              <a:tr h="574482">
                 <a:tc>
                   <a:txBody>
                     <a:bodyPr/>
@@ -17336,7 +17856,7 @@
                           <a:effectLst/>
                           <a:latin typeface="Calibri" panose="020F0502020204030204" pitchFamily="34" charset="0"/>
                         </a:rPr>
-                        <a:t>The individual is taking prescription medication</a:t>
+                        <a:t>Taking prescription medication</a:t>
                       </a:r>
                     </a:p>
                   </a:txBody>
@@ -17364,7 +17884,7 @@
                   </a:ext>
                 </a:extLst>
               </a:tr>
-              <a:tr h="608007">
+              <a:tr h="574482">
                 <a:tc>
                   <a:txBody>
                     <a:bodyPr/>
@@ -17379,7 +17899,7 @@
                           <a:effectLst/>
                           <a:latin typeface="Calibri" panose="020F0502020204030204" pitchFamily="34" charset="0"/>
                         </a:rPr>
-                        <a:t>The individual travels to work that is critical</a:t>
+                        <a:t>Travel</a:t>
                       </a:r>
                     </a:p>
                   </a:txBody>
@@ -17407,7 +17927,7 @@
                   </a:ext>
                 </a:extLst>
               </a:tr>
-              <a:tr h="553540">
+              <a:tr h="523018">
                 <a:tc>
                   <a:txBody>
                     <a:bodyPr/>
@@ -17422,7 +17942,7 @@
                           <a:effectLst/>
                           <a:latin typeface="Calibri" panose="020F0502020204030204" pitchFamily="34" charset="0"/>
                         </a:rPr>
-                        <a:t>The household practiced social distancing and hand washing</a:t>
+                        <a:t>Practicing social distancing &amp; hygiene</a:t>
                       </a:r>
                     </a:p>
                   </a:txBody>
@@ -17463,13 +17983,15 @@
               </a:ext>
             </a:extLst>
           </p:cNvPr>
-          <p:cNvCxnSpPr/>
+          <p:cNvCxnSpPr>
+            <a:cxnSpLocks/>
+          </p:cNvCxnSpPr>
           <p:nvPr/>
         </p:nvCxnSpPr>
         <p:spPr>
           <a:xfrm>
-            <a:off x="4110808" y="2362200"/>
-            <a:ext cx="0" cy="4276222"/>
+            <a:off x="4267200" y="2560397"/>
+            <a:ext cx="0" cy="4065558"/>
           </a:xfrm>
           <a:prstGeom prst="line">
             <a:avLst/>
@@ -17500,13 +18022,15 @@
               </a:ext>
             </a:extLst>
           </p:cNvPr>
-          <p:cNvCxnSpPr/>
+          <p:cNvCxnSpPr>
+            <a:cxnSpLocks/>
+          </p:cNvCxnSpPr>
           <p:nvPr/>
         </p:nvCxnSpPr>
         <p:spPr>
           <a:xfrm>
-            <a:off x="76200" y="2362200"/>
-            <a:ext cx="11201401" cy="0"/>
+            <a:off x="4326881" y="2586132"/>
+            <a:ext cx="7110637" cy="0"/>
           </a:xfrm>
           <a:prstGeom prst="line">
             <a:avLst/>
@@ -17528,6 +18052,502 @@
           </a:fontRef>
         </p:style>
       </p:cxnSp>
+      <p:pic>
+        <p:nvPicPr>
+          <p:cNvPr id="2052" name="Picture 4">
+            <a:extLst>
+              <a:ext uri="{FF2B5EF4-FFF2-40B4-BE49-F238E27FC236}">
+                <a16:creationId xmlns:a16="http://schemas.microsoft.com/office/drawing/2014/main" id="{1F721424-AD6D-4C58-B0C0-9A47CF7E9A2F}"/>
+              </a:ext>
+            </a:extLst>
+          </p:cNvPr>
+          <p:cNvPicPr>
+            <a:picLocks noChangeAspect="1" noChangeArrowheads="1"/>
+          </p:cNvPicPr>
+          <p:nvPr/>
+        </p:nvPicPr>
+        <p:blipFill>
+          <a:blip r:embed="rId4">
+            <a:duotone>
+              <a:schemeClr val="accent1">
+                <a:shade val="45000"/>
+                <a:satMod val="135000"/>
+              </a:schemeClr>
+              <a:prstClr val="white"/>
+            </a:duotone>
+            <a:extLst>
+              <a:ext uri="{28A0092B-C50C-407E-A947-70E740481C1C}">
+                <a14:useLocalDpi xmlns:a14="http://schemas.microsoft.com/office/drawing/2010/main" val="0"/>
+              </a:ext>
+            </a:extLst>
+          </a:blip>
+          <a:srcRect/>
+          <a:stretch>
+            <a:fillRect/>
+          </a:stretch>
+        </p:blipFill>
+        <p:spPr bwMode="auto">
+          <a:xfrm>
+            <a:off x="152400" y="3490037"/>
+            <a:ext cx="1220470" cy="1220470"/>
+          </a:xfrm>
+          <a:prstGeom prst="rect">
+            <a:avLst/>
+          </a:prstGeom>
+          <a:noFill/>
+          <a:extLst>
+            <a:ext uri="{909E8E84-426E-40DD-AFC4-6F175D3DCCD1}">
+              <a14:hiddenFill xmlns:a14="http://schemas.microsoft.com/office/drawing/2010/main">
+                <a:solidFill>
+                  <a:srgbClr val="FFFFFF"/>
+                </a:solidFill>
+              </a14:hiddenFill>
+            </a:ext>
+          </a:extLst>
+        </p:spPr>
+      </p:pic>
+      <p:pic>
+        <p:nvPicPr>
+          <p:cNvPr id="2056" name="Picture 8" descr="signs, travelling, baggage, Bag, travels, Bags, Banned, travel ...">
+            <a:extLst>
+              <a:ext uri="{FF2B5EF4-FFF2-40B4-BE49-F238E27FC236}">
+                <a16:creationId xmlns:a16="http://schemas.microsoft.com/office/drawing/2014/main" id="{33DF8B61-543C-4DA1-A355-912B61591DE9}"/>
+              </a:ext>
+            </a:extLst>
+          </p:cNvPr>
+          <p:cNvPicPr>
+            <a:picLocks noChangeAspect="1" noChangeArrowheads="1"/>
+          </p:cNvPicPr>
+          <p:nvPr/>
+        </p:nvPicPr>
+        <p:blipFill>
+          <a:blip r:embed="rId5">
+            <a:duotone>
+              <a:schemeClr val="accent1">
+                <a:shade val="45000"/>
+                <a:satMod val="135000"/>
+              </a:schemeClr>
+              <a:prstClr val="white"/>
+            </a:duotone>
+            <a:extLst>
+              <a:ext uri="{28A0092B-C50C-407E-A947-70E740481C1C}">
+                <a14:useLocalDpi xmlns:a14="http://schemas.microsoft.com/office/drawing/2010/main" val="0"/>
+              </a:ext>
+            </a:extLst>
+          </a:blip>
+          <a:srcRect/>
+          <a:stretch>
+            <a:fillRect/>
+          </a:stretch>
+        </p:blipFill>
+        <p:spPr bwMode="auto">
+          <a:xfrm>
+            <a:off x="2680113" y="5105400"/>
+            <a:ext cx="1147763" cy="1147763"/>
+          </a:xfrm>
+          <a:prstGeom prst="rect">
+            <a:avLst/>
+          </a:prstGeom>
+          <a:noFill/>
+          <a:extLst>
+            <a:ext uri="{909E8E84-426E-40DD-AFC4-6F175D3DCCD1}">
+              <a14:hiddenFill xmlns:a14="http://schemas.microsoft.com/office/drawing/2010/main">
+                <a:solidFill>
+                  <a:srgbClr val="FFFFFF"/>
+                </a:solidFill>
+              </a14:hiddenFill>
+            </a:ext>
+          </a:extLst>
+        </p:spPr>
+      </p:pic>
+      <p:sp>
+        <p:nvSpPr>
+          <p:cNvPr id="4" name="TextBox 3">
+            <a:extLst>
+              <a:ext uri="{FF2B5EF4-FFF2-40B4-BE49-F238E27FC236}">
+                <a16:creationId xmlns:a16="http://schemas.microsoft.com/office/drawing/2014/main" id="{57EE8F21-8F69-4229-95DA-596CA450EEAD}"/>
+              </a:ext>
+            </a:extLst>
+          </p:cNvPr>
+          <p:cNvSpPr txBox="1"/>
+          <p:nvPr/>
+        </p:nvSpPr>
+        <p:spPr>
+          <a:xfrm>
+            <a:off x="871954" y="2705725"/>
+            <a:ext cx="3082567" cy="1446550"/>
+          </a:xfrm>
+          <a:prstGeom prst="rect">
+            <a:avLst/>
+          </a:prstGeom>
+          <a:noFill/>
+        </p:spPr>
+        <p:txBody>
+          <a:bodyPr wrap="square" rtlCol="0">
+            <a:spAutoFit/>
+          </a:bodyPr>
+          <a:lstStyle/>
+          <a:p>
+            <a:pPr algn="ctr"/>
+            <a:r>
+              <a:rPr lang="en-US" sz="4400" dirty="0">
+                <a:cs typeface="Aharoni" panose="02010803020104030203" pitchFamily="2" charset="-79"/>
+              </a:rPr>
+              <a:t>Behavior </a:t>
+            </a:r>
+          </a:p>
+          <a:p>
+            <a:pPr algn="ctr"/>
+            <a:r>
+              <a:rPr lang="en-US" sz="4400" dirty="0">
+                <a:cs typeface="Aharoni" panose="02010803020104030203" pitchFamily="2" charset="-79"/>
+              </a:rPr>
+              <a:t>Matters:</a:t>
+            </a:r>
+          </a:p>
+        </p:txBody>
+      </p:sp>
+      <p:grpSp>
+        <p:nvGrpSpPr>
+          <p:cNvPr id="17" name="Group 16">
+            <a:extLst>
+              <a:ext uri="{FF2B5EF4-FFF2-40B4-BE49-F238E27FC236}">
+                <a16:creationId xmlns:a16="http://schemas.microsoft.com/office/drawing/2014/main" id="{748A9B36-368A-4DC9-9472-64497AEF7B6F}"/>
+              </a:ext>
+            </a:extLst>
+          </p:cNvPr>
+          <p:cNvGrpSpPr/>
+          <p:nvPr/>
+        </p:nvGrpSpPr>
+        <p:grpSpPr>
+          <a:xfrm>
+            <a:off x="8458200" y="2662668"/>
+            <a:ext cx="457200" cy="3684669"/>
+            <a:chOff x="8382000" y="2657552"/>
+            <a:chExt cx="457200" cy="3684669"/>
+          </a:xfrm>
+        </p:grpSpPr>
+        <p:sp>
+          <p:nvSpPr>
+            <p:cNvPr id="12" name="TextBox 11">
+              <a:extLst>
+                <a:ext uri="{FF2B5EF4-FFF2-40B4-BE49-F238E27FC236}">
+                  <a16:creationId xmlns:a16="http://schemas.microsoft.com/office/drawing/2014/main" id="{BBE9661F-0813-4233-BEF8-8FC52552ACA6}"/>
+                </a:ext>
+              </a:extLst>
+            </p:cNvPr>
+            <p:cNvSpPr txBox="1"/>
+            <p:nvPr/>
+          </p:nvSpPr>
+          <p:spPr>
+            <a:xfrm>
+              <a:off x="8382000" y="2657552"/>
+              <a:ext cx="457200" cy="246221"/>
+            </a:xfrm>
+            <a:prstGeom prst="rect">
+              <a:avLst/>
+            </a:prstGeom>
+            <a:noFill/>
+          </p:spPr>
+          <p:txBody>
+            <a:bodyPr wrap="square" rtlCol="0">
+              <a:spAutoFit/>
+            </a:bodyPr>
+            <a:lstStyle/>
+            <a:p>
+              <a:r>
+                <a:rPr lang="en-US" sz="1000" dirty="0"/>
+                <a:t>+</a:t>
+              </a:r>
+            </a:p>
+          </p:txBody>
+        </p:sp>
+        <p:sp>
+          <p:nvSpPr>
+            <p:cNvPr id="24" name="TextBox 23">
+              <a:extLst>
+                <a:ext uri="{FF2B5EF4-FFF2-40B4-BE49-F238E27FC236}">
+                  <a16:creationId xmlns:a16="http://schemas.microsoft.com/office/drawing/2014/main" id="{713B020C-F1DD-49E5-AEE7-9003BB167A6D}"/>
+                </a:ext>
+              </a:extLst>
+            </p:cNvPr>
+            <p:cNvSpPr txBox="1"/>
+            <p:nvPr/>
+          </p:nvSpPr>
+          <p:spPr>
+            <a:xfrm>
+              <a:off x="8382000" y="3250767"/>
+              <a:ext cx="457200" cy="246221"/>
+            </a:xfrm>
+            <a:prstGeom prst="rect">
+              <a:avLst/>
+            </a:prstGeom>
+            <a:noFill/>
+          </p:spPr>
+          <p:txBody>
+            <a:bodyPr wrap="square" rtlCol="0">
+              <a:spAutoFit/>
+            </a:bodyPr>
+            <a:lstStyle/>
+            <a:p>
+              <a:r>
+                <a:rPr lang="en-US" sz="1000" dirty="0"/>
+                <a:t>+</a:t>
+              </a:r>
+            </a:p>
+          </p:txBody>
+        </p:sp>
+        <p:sp>
+          <p:nvSpPr>
+            <p:cNvPr id="27" name="TextBox 26">
+              <a:extLst>
+                <a:ext uri="{FF2B5EF4-FFF2-40B4-BE49-F238E27FC236}">
+                  <a16:creationId xmlns:a16="http://schemas.microsoft.com/office/drawing/2014/main" id="{F8D2833B-B4C7-4C65-A80F-3369CD12E08C}"/>
+                </a:ext>
+              </a:extLst>
+            </p:cNvPr>
+            <p:cNvSpPr txBox="1"/>
+            <p:nvPr/>
+          </p:nvSpPr>
+          <p:spPr>
+            <a:xfrm>
+              <a:off x="8382000" y="3807300"/>
+              <a:ext cx="304797" cy="246221"/>
+            </a:xfrm>
+            <a:prstGeom prst="rect">
+              <a:avLst/>
+            </a:prstGeom>
+            <a:noFill/>
+          </p:spPr>
+          <p:txBody>
+            <a:bodyPr wrap="square" rtlCol="0">
+              <a:spAutoFit/>
+            </a:bodyPr>
+            <a:lstStyle/>
+            <a:p>
+              <a:r>
+                <a:rPr lang="en-US" sz="1000" dirty="0"/>
+                <a:t>+</a:t>
+              </a:r>
+            </a:p>
+          </p:txBody>
+        </p:sp>
+        <p:sp>
+          <p:nvSpPr>
+            <p:cNvPr id="28" name="TextBox 27">
+              <a:extLst>
+                <a:ext uri="{FF2B5EF4-FFF2-40B4-BE49-F238E27FC236}">
+                  <a16:creationId xmlns:a16="http://schemas.microsoft.com/office/drawing/2014/main" id="{D76EC56C-F892-4A7F-B1AD-8FB81A2DBFEF}"/>
+                </a:ext>
+              </a:extLst>
+            </p:cNvPr>
+            <p:cNvSpPr txBox="1"/>
+            <p:nvPr/>
+          </p:nvSpPr>
+          <p:spPr>
+            <a:xfrm>
+              <a:off x="8382000" y="5102498"/>
+              <a:ext cx="457200" cy="246221"/>
+            </a:xfrm>
+            <a:prstGeom prst="rect">
+              <a:avLst/>
+            </a:prstGeom>
+            <a:noFill/>
+          </p:spPr>
+          <p:txBody>
+            <a:bodyPr wrap="square" rtlCol="0">
+              <a:spAutoFit/>
+            </a:bodyPr>
+            <a:lstStyle/>
+            <a:p>
+              <a:r>
+                <a:rPr lang="en-US" sz="1000" dirty="0"/>
+                <a:t>+</a:t>
+              </a:r>
+            </a:p>
+          </p:txBody>
+        </p:sp>
+        <p:sp>
+          <p:nvSpPr>
+            <p:cNvPr id="29" name="TextBox 28">
+              <a:extLst>
+                <a:ext uri="{FF2B5EF4-FFF2-40B4-BE49-F238E27FC236}">
+                  <a16:creationId xmlns:a16="http://schemas.microsoft.com/office/drawing/2014/main" id="{B189A998-E78B-483B-9176-0B48036F3023}"/>
+                </a:ext>
+              </a:extLst>
+            </p:cNvPr>
+            <p:cNvSpPr txBox="1"/>
+            <p:nvPr/>
+          </p:nvSpPr>
+          <p:spPr>
+            <a:xfrm>
+              <a:off x="8382000" y="5663905"/>
+              <a:ext cx="457200" cy="246221"/>
+            </a:xfrm>
+            <a:prstGeom prst="rect">
+              <a:avLst/>
+            </a:prstGeom>
+            <a:noFill/>
+          </p:spPr>
+          <p:txBody>
+            <a:bodyPr wrap="square" rtlCol="0">
+              <a:spAutoFit/>
+            </a:bodyPr>
+            <a:lstStyle/>
+            <a:p>
+              <a:r>
+                <a:rPr lang="en-US" sz="1000" dirty="0"/>
+                <a:t>+</a:t>
+              </a:r>
+            </a:p>
+          </p:txBody>
+        </p:sp>
+        <p:sp>
+          <p:nvSpPr>
+            <p:cNvPr id="30" name="TextBox 29">
+              <a:extLst>
+                <a:ext uri="{FF2B5EF4-FFF2-40B4-BE49-F238E27FC236}">
+                  <a16:creationId xmlns:a16="http://schemas.microsoft.com/office/drawing/2014/main" id="{BD956A6C-FDB4-4B92-B4F3-6355713BFE76}"/>
+                </a:ext>
+              </a:extLst>
+            </p:cNvPr>
+            <p:cNvSpPr txBox="1"/>
+            <p:nvPr/>
+          </p:nvSpPr>
+          <p:spPr>
+            <a:xfrm>
+              <a:off x="8406065" y="4459185"/>
+              <a:ext cx="280735" cy="246221"/>
+            </a:xfrm>
+            <a:prstGeom prst="rect">
+              <a:avLst/>
+            </a:prstGeom>
+            <a:noFill/>
+          </p:spPr>
+          <p:txBody>
+            <a:bodyPr wrap="square" rtlCol="0">
+              <a:spAutoFit/>
+            </a:bodyPr>
+            <a:lstStyle/>
+            <a:p>
+              <a:r>
+                <a:rPr lang="en-US" sz="1000" dirty="0"/>
+                <a:t>-</a:t>
+              </a:r>
+            </a:p>
+          </p:txBody>
+        </p:sp>
+        <p:sp>
+          <p:nvSpPr>
+            <p:cNvPr id="31" name="TextBox 30">
+              <a:extLst>
+                <a:ext uri="{FF2B5EF4-FFF2-40B4-BE49-F238E27FC236}">
+                  <a16:creationId xmlns:a16="http://schemas.microsoft.com/office/drawing/2014/main" id="{CB42CA43-9C2D-4F63-A1A5-90A5FAC9A706}"/>
+                </a:ext>
+              </a:extLst>
+            </p:cNvPr>
+            <p:cNvSpPr txBox="1"/>
+            <p:nvPr/>
+          </p:nvSpPr>
+          <p:spPr>
+            <a:xfrm>
+              <a:off x="8458200" y="6096000"/>
+              <a:ext cx="132361" cy="246221"/>
+            </a:xfrm>
+            <a:prstGeom prst="rect">
+              <a:avLst/>
+            </a:prstGeom>
+            <a:noFill/>
+          </p:spPr>
+          <p:txBody>
+            <a:bodyPr wrap="square" rtlCol="0">
+              <a:spAutoFit/>
+            </a:bodyPr>
+            <a:lstStyle/>
+            <a:p>
+              <a:r>
+                <a:rPr lang="en-US" sz="1000" dirty="0"/>
+                <a:t>-</a:t>
+              </a:r>
+            </a:p>
+          </p:txBody>
+        </p:sp>
+      </p:grpSp>
+      <p:cxnSp>
+        <p:nvCxnSpPr>
+          <p:cNvPr id="33" name="Straight Connector 32">
+            <a:extLst>
+              <a:ext uri="{FF2B5EF4-FFF2-40B4-BE49-F238E27FC236}">
+                <a16:creationId xmlns:a16="http://schemas.microsoft.com/office/drawing/2014/main" id="{4D986335-0B62-4540-A466-D8BD9FA3A666}"/>
+              </a:ext>
+            </a:extLst>
+          </p:cNvPr>
+          <p:cNvCxnSpPr>
+            <a:cxnSpLocks/>
+          </p:cNvCxnSpPr>
+          <p:nvPr/>
+        </p:nvCxnSpPr>
+        <p:spPr>
+          <a:xfrm>
+            <a:off x="8458200" y="2577944"/>
+            <a:ext cx="0" cy="4065558"/>
+          </a:xfrm>
+          <a:prstGeom prst="line">
+            <a:avLst/>
+          </a:prstGeom>
+          <a:ln w="12700"/>
+        </p:spPr>
+        <p:style>
+          <a:lnRef idx="1">
+            <a:schemeClr val="accent1"/>
+          </a:lnRef>
+          <a:fillRef idx="0">
+            <a:schemeClr val="accent1"/>
+          </a:fillRef>
+          <a:effectRef idx="0">
+            <a:schemeClr val="accent1"/>
+          </a:effectRef>
+          <a:fontRef idx="minor">
+            <a:schemeClr val="tx1"/>
+          </a:fontRef>
+        </p:style>
+      </p:cxnSp>
+      <p:sp>
+        <p:nvSpPr>
+          <p:cNvPr id="16" name="TextBox 15">
+            <a:extLst>
+              <a:ext uri="{FF2B5EF4-FFF2-40B4-BE49-F238E27FC236}">
+                <a16:creationId xmlns:a16="http://schemas.microsoft.com/office/drawing/2014/main" id="{EB759DCB-0BA8-4C5C-B99E-3E1AAD48B66A}"/>
+              </a:ext>
+            </a:extLst>
+          </p:cNvPr>
+          <p:cNvSpPr txBox="1"/>
+          <p:nvPr/>
+        </p:nvSpPr>
+        <p:spPr>
+          <a:xfrm>
+            <a:off x="8353917" y="2283398"/>
+            <a:ext cx="665760" cy="276999"/>
+          </a:xfrm>
+          <a:prstGeom prst="rect">
+            <a:avLst/>
+          </a:prstGeom>
+          <a:noFill/>
+        </p:spPr>
+        <p:txBody>
+          <a:bodyPr wrap="square" rtlCol="0">
+            <a:spAutoFit/>
+          </a:bodyPr>
+          <a:lstStyle/>
+          <a:p>
+            <a:r>
+              <a:rPr lang="en-US" sz="1200" dirty="0" err="1"/>
+              <a:t>Corr</a:t>
+            </a:r>
+            <a:endParaRPr lang="en-US" sz="1200" dirty="0"/>
+          </a:p>
+        </p:txBody>
+      </p:sp>
     </p:spTree>
     <p:extLst>
       <p:ext uri="{BB962C8B-B14F-4D97-AF65-F5344CB8AC3E}">

</xml_diff>

<commit_message>
working towards final notebook
</commit_message>
<xml_diff>
--- a/Covid19Preso.pptx
+++ b/Covid19Preso.pptx
@@ -5,10 +5,10 @@
     <p:sldMasterId id="2147483648" r:id="rId1"/>
   </p:sldMasterIdLst>
   <p:notesMasterIdLst>
-    <p:notesMasterId r:id="rId14"/>
+    <p:notesMasterId r:id="rId15"/>
   </p:notesMasterIdLst>
   <p:handoutMasterIdLst>
-    <p:handoutMasterId r:id="rId15"/>
+    <p:handoutMasterId r:id="rId16"/>
   </p:handoutMasterIdLst>
   <p:sldIdLst>
     <p:sldId id="256" r:id="rId2"/>
@@ -23,6 +23,7 @@
     <p:sldId id="270" r:id="rId11"/>
     <p:sldId id="266" r:id="rId12"/>
     <p:sldId id="269" r:id="rId13"/>
+    <p:sldId id="272" r:id="rId14"/>
   </p:sldIdLst>
   <p:sldSz cx="12192000" cy="6858000"/>
   <p:notesSz cx="6858000" cy="9144000"/>
@@ -237,7 +238,7 @@
           <a:p>
             <a:fld id="{043B725B-653D-4166-A8E9-72A38A1847CF}" type="datetimeFigureOut">
               <a:rPr lang="en-US"/>
-              <a:t>5/2/2020</a:t>
+              <a:t>5/4/2020</a:t>
             </a:fld>
             <a:endParaRPr/>
           </a:p>
@@ -402,7 +403,7 @@
           <a:p>
             <a:fld id="{783F64CD-0576-4A9A-BD06-7889D6E60BDC}" type="datetimeFigureOut">
               <a:rPr lang="en-US"/>
-              <a:t>5/2/2020</a:t>
+              <a:t>5/4/2020</a:t>
             </a:fld>
             <a:endParaRPr/>
           </a:p>
@@ -1241,6 +1242,10 @@
           <a:lstStyle/>
           <a:p>
             <a:r>
+              <a:rPr lang="en-US" dirty="0"/>
+              <a:t>Feature importance </a:t>
+            </a:r>
+            <a:r>
               <a:rPr lang="en-US" sz="1200" b="0" i="0" kern="1200" dirty="0">
                 <a:solidFill>
                   <a:schemeClr val="tx1"/>
@@ -1250,151 +1255,7 @@
                 <a:ea typeface="+mn-ea"/>
                 <a:cs typeface="+mn-cs"/>
               </a:rPr>
-              <a:t>A Receiver Operator Characteristic (</a:t>
-            </a:r>
-            <a:r>
-              <a:rPr lang="en-US" sz="1200" b="1" i="0" kern="1200" dirty="0">
-                <a:solidFill>
-                  <a:schemeClr val="tx1"/>
-                </a:solidFill>
-                <a:effectLst/>
-                <a:latin typeface="+mn-lt"/>
-                <a:ea typeface="+mn-ea"/>
-                <a:cs typeface="+mn-cs"/>
-              </a:rPr>
-              <a:t>ROC</a:t>
-            </a:r>
-            <a:r>
-              <a:rPr lang="en-US" sz="1200" b="0" i="0" kern="1200" dirty="0">
-                <a:solidFill>
-                  <a:schemeClr val="tx1"/>
-                </a:solidFill>
-                <a:effectLst/>
-                <a:latin typeface="+mn-lt"/>
-                <a:ea typeface="+mn-ea"/>
-                <a:cs typeface="+mn-cs"/>
-              </a:rPr>
-              <a:t>) </a:t>
-            </a:r>
-            <a:r>
-              <a:rPr lang="en-US" sz="1200" b="1" i="0" kern="1200" dirty="0">
-                <a:solidFill>
-                  <a:schemeClr val="tx1"/>
-                </a:solidFill>
-                <a:effectLst/>
-                <a:latin typeface="+mn-lt"/>
-                <a:ea typeface="+mn-ea"/>
-                <a:cs typeface="+mn-cs"/>
-              </a:rPr>
-              <a:t>curve</a:t>
-            </a:r>
-            <a:r>
-              <a:rPr lang="en-US" sz="1200" b="0" i="0" kern="1200" dirty="0">
-                <a:solidFill>
-                  <a:schemeClr val="tx1"/>
-                </a:solidFill>
-                <a:effectLst/>
-                <a:latin typeface="+mn-lt"/>
-                <a:ea typeface="+mn-ea"/>
-                <a:cs typeface="+mn-cs"/>
-              </a:rPr>
-              <a:t> is a graphical plot used to </a:t>
-            </a:r>
-            <a:r>
-              <a:rPr lang="en-US" sz="1200" b="1" i="0" kern="1200" dirty="0">
-                <a:solidFill>
-                  <a:schemeClr val="tx1"/>
-                </a:solidFill>
-                <a:effectLst/>
-                <a:latin typeface="+mn-lt"/>
-                <a:ea typeface="+mn-ea"/>
-                <a:cs typeface="+mn-cs"/>
-              </a:rPr>
-              <a:t>show</a:t>
-            </a:r>
-            <a:r>
-              <a:rPr lang="en-US" sz="1200" b="0" i="0" kern="1200" dirty="0">
-                <a:solidFill>
-                  <a:schemeClr val="tx1"/>
-                </a:solidFill>
-                <a:effectLst/>
-                <a:latin typeface="+mn-lt"/>
-                <a:ea typeface="+mn-ea"/>
-                <a:cs typeface="+mn-cs"/>
-              </a:rPr>
-              <a:t> the diagnostic ability of binary classifiers. It shows the tradeoff between sensitivity TP/(TP+FN) and specificity TN/(TN+FP)  (any increase in sensitivity will be accompanied by a decrease in specificity). The closer the curve follows the left-hand border and then the top border of the </a:t>
-            </a:r>
-            <a:r>
-              <a:rPr lang="en-US" sz="1200" b="1" i="0" kern="1200" dirty="0">
-                <a:solidFill>
-                  <a:schemeClr val="tx1"/>
-                </a:solidFill>
-                <a:effectLst/>
-                <a:latin typeface="+mn-lt"/>
-                <a:ea typeface="+mn-ea"/>
-                <a:cs typeface="+mn-cs"/>
-              </a:rPr>
-              <a:t>ROC</a:t>
-            </a:r>
-            <a:r>
-              <a:rPr lang="en-US" sz="1200" b="0" i="0" kern="1200" dirty="0">
-                <a:solidFill>
-                  <a:schemeClr val="tx1"/>
-                </a:solidFill>
-                <a:effectLst/>
-                <a:latin typeface="+mn-lt"/>
-                <a:ea typeface="+mn-ea"/>
-                <a:cs typeface="+mn-cs"/>
-              </a:rPr>
-              <a:t> space, the more accurate the test. The </a:t>
-            </a:r>
-            <a:r>
-              <a:rPr lang="en-US" sz="1200" b="0" i="0" u="sng" kern="1200" dirty="0">
-                <a:solidFill>
-                  <a:schemeClr val="tx1"/>
-                </a:solidFill>
-                <a:effectLst/>
-                <a:latin typeface="+mn-lt"/>
-                <a:ea typeface="+mn-ea"/>
-                <a:cs typeface="+mn-cs"/>
-              </a:rPr>
-              <a:t>area under </a:t>
-            </a:r>
-            <a:r>
-              <a:rPr lang="en-US" sz="1200" b="0" i="0" kern="1200" dirty="0">
-                <a:solidFill>
-                  <a:schemeClr val="tx1"/>
-                </a:solidFill>
-                <a:effectLst/>
-                <a:latin typeface="+mn-lt"/>
-                <a:ea typeface="+mn-ea"/>
-                <a:cs typeface="+mn-cs"/>
-              </a:rPr>
-              <a:t>an ROC </a:t>
-            </a:r>
-            <a:r>
-              <a:rPr lang="en-US" sz="1200" b="0" i="0" u="sng" kern="1200" dirty="0">
-                <a:solidFill>
-                  <a:schemeClr val="tx1"/>
-                </a:solidFill>
-                <a:effectLst/>
-                <a:latin typeface="+mn-lt"/>
-                <a:ea typeface="+mn-ea"/>
-                <a:cs typeface="+mn-cs"/>
-              </a:rPr>
-              <a:t>curve</a:t>
-            </a:r>
-            <a:r>
-              <a:rPr lang="en-US" sz="1200" b="0" i="0" kern="1200" dirty="0">
-                <a:solidFill>
-                  <a:schemeClr val="tx1"/>
-                </a:solidFill>
-                <a:effectLst/>
-                <a:latin typeface="+mn-lt"/>
-                <a:ea typeface="+mn-ea"/>
-                <a:cs typeface="+mn-cs"/>
-              </a:rPr>
-              <a:t> is a measure of the usefulness of a test in general, where a greater area means a more useful test, the areas under ROC curves are used to compare the usefulness of tests.</a:t>
+              <a:t>directly measures variable importance by observing the effect on model accuracy of randomly shuffling each predictor variable. The values total 1.  </a:t>
             </a:r>
             <a:endParaRPr lang="en-US" dirty="0"/>
           </a:p>
@@ -1480,21 +1341,138 @@
           <a:bodyPr/>
           <a:lstStyle/>
           <a:p>
-            <a:r>
+            <a:br>
               <a:rPr lang="en-US" dirty="0"/>
-              <a:t>Feature importance </a:t>
-            </a:r>
-            <a:r>
-              <a:rPr lang="en-US" sz="1200" b="0" i="0" kern="1200" dirty="0">
-                <a:solidFill>
-                  <a:schemeClr val="tx1"/>
-                </a:solidFill>
+            </a:br>
+            <a:r>
+              <a:rPr lang="en-US" dirty="0"/>
+              <a:t>covid19_positiveopinion_infection</a:t>
+            </a:r>
+            <a:r>
+              <a:rPr lang="en-US" dirty="0">
                 <a:effectLst/>
-                <a:latin typeface="+mn-lt"/>
-                <a:ea typeface="+mn-ea"/>
-                <a:cs typeface="+mn-cs"/>
               </a:rPr>
-              <a:t>directly measures variable importance by observing the effect on model accuracy of randomly shuffling each predictor variable. </a:t>
+              <a:t>0.049646*</a:t>
+            </a:r>
+          </a:p>
+          <a:p>
+            <a:r>
+              <a:rPr lang="en-US" dirty="0"/>
+              <a:t>covid19_symptoms</a:t>
+            </a:r>
+            <a:r>
+              <a:rPr lang="en-US" dirty="0">
+                <a:effectLst/>
+              </a:rPr>
+              <a:t>0.088013*</a:t>
+            </a:r>
+          </a:p>
+          <a:p>
+            <a:r>
+              <a:rPr lang="en-US" dirty="0"/>
+              <a:t>covid19_contact</a:t>
+            </a:r>
+            <a:r>
+              <a:rPr lang="en-US" dirty="0">
+                <a:effectLst/>
+              </a:rPr>
+              <a:t>0.050423*</a:t>
+            </a:r>
+          </a:p>
+          <a:p>
+            <a:r>
+              <a:rPr lang="en-US" b="1" dirty="0"/>
+              <a:t>rate_reducing_risk_house</a:t>
+            </a:r>
+            <a:r>
+              <a:rPr lang="en-US" b="1" dirty="0">
+                <a:effectLst/>
+              </a:rPr>
+              <a:t>-0.008963</a:t>
+            </a:r>
+          </a:p>
+          <a:p>
+            <a:r>
+              <a:rPr lang="en-US" dirty="0"/>
+              <a:t>omwasnull</a:t>
+            </a:r>
+            <a:r>
+              <a:rPr lang="en-US" dirty="0">
+                <a:effectLst/>
+              </a:rPr>
+              <a:t>0.002919</a:t>
+            </a:r>
+          </a:p>
+          <a:p>
+            <a:r>
+              <a:rPr lang="en-US" b="1" dirty="0"/>
+              <a:t>rate_reducing_risk_single</a:t>
+            </a:r>
+            <a:r>
+              <a:rPr lang="en-US" b="1" dirty="0">
+                <a:effectLst/>
+              </a:rPr>
+              <a:t>-0.012114</a:t>
+            </a:r>
+          </a:p>
+          <a:p>
+            <a:r>
+              <a:rPr lang="en-US" dirty="0"/>
+              <a:t>oiwasnull</a:t>
+            </a:r>
+            <a:r>
+              <a:rPr lang="en-US" dirty="0">
+                <a:effectLst/>
+              </a:rPr>
+              <a:t>0.002919</a:t>
+            </a:r>
+          </a:p>
+          <a:p>
+            <a:r>
+              <a:rPr lang="en-US" dirty="0"/>
+              <a:t>sex_male</a:t>
+            </a:r>
+            <a:r>
+              <a:rPr lang="en-US" dirty="0">
+                <a:effectLst/>
+              </a:rPr>
+              <a:t>0.009141</a:t>
+            </a:r>
+          </a:p>
+          <a:p>
+            <a:r>
+              <a:rPr lang="en-US" b="1" dirty="0"/>
+              <a:t>sex_female</a:t>
+            </a:r>
+            <a:r>
+              <a:rPr lang="en-US" b="1" dirty="0">
+                <a:effectLst/>
+              </a:rPr>
+              <a:t>-0.009122</a:t>
+            </a:r>
+          </a:p>
+          <a:p>
+            <a:r>
+              <a:rPr lang="en-US" dirty="0"/>
+              <a:t>bmi</a:t>
+            </a:r>
+            <a:r>
+              <a:rPr lang="en-US" dirty="0">
+                <a:effectLst/>
+              </a:rPr>
+              <a:t>0.004146</a:t>
+            </a:r>
+          </a:p>
+          <a:p>
+            <a:r>
+              <a:rPr lang="en-US" dirty="0"/>
+              <a:t>taking_prescription_medication</a:t>
+            </a:r>
+            <a:r>
+              <a:rPr lang="en-US" dirty="0">
+                <a:effectLst/>
+              </a:rPr>
+              <a:t>-0.004571</a:t>
             </a:r>
             <a:endParaRPr lang="en-US" dirty="0"/>
           </a:p>
@@ -1611,6 +1589,266 @@
     <p:extLst>
       <p:ext uri="{BB962C8B-B14F-4D97-AF65-F5344CB8AC3E}">
         <p14:creationId xmlns:p14="http://schemas.microsoft.com/office/powerpoint/2010/main" val="2737633482"/>
+      </p:ext>
+    </p:extLst>
+  </p:cSld>
+  <p:clrMapOvr>
+    <a:masterClrMapping/>
+  </p:clrMapOvr>
+</p:notes>
+</file>
+
+<file path=ppt/notesSlides/notesSlide8.xml><?xml version="1.0" encoding="utf-8"?>
+<p:notes xmlns:a="http://schemas.openxmlformats.org/drawingml/2006/main" xmlns:r="http://schemas.openxmlformats.org/officeDocument/2006/relationships" xmlns:p="http://schemas.openxmlformats.org/presentationml/2006/main">
+  <p:cSld>
+    <p:spTree>
+      <p:nvGrpSpPr>
+        <p:cNvPr id="1" name=""/>
+        <p:cNvGrpSpPr/>
+        <p:nvPr/>
+      </p:nvGrpSpPr>
+      <p:grpSpPr>
+        <a:xfrm>
+          <a:off x="0" y="0"/>
+          <a:ext cx="0" cy="0"/>
+          <a:chOff x="0" y="0"/>
+          <a:chExt cx="0" cy="0"/>
+        </a:xfrm>
+      </p:grpSpPr>
+      <p:sp>
+        <p:nvSpPr>
+          <p:cNvPr id="2" name="Slide Image Placeholder 1"/>
+          <p:cNvSpPr>
+            <a:spLocks noGrp="1" noRot="1" noChangeAspect="1"/>
+          </p:cNvSpPr>
+          <p:nvPr>
+            <p:ph type="sldImg"/>
+          </p:nvPr>
+        </p:nvSpPr>
+        <p:spPr/>
+      </p:sp>
+      <p:sp>
+        <p:nvSpPr>
+          <p:cNvPr id="3" name="Notes Placeholder 2"/>
+          <p:cNvSpPr>
+            <a:spLocks noGrp="1"/>
+          </p:cNvSpPr>
+          <p:nvPr>
+            <p:ph type="body" idx="1"/>
+          </p:nvPr>
+        </p:nvSpPr>
+        <p:spPr/>
+        <p:txBody>
+          <a:bodyPr/>
+          <a:lstStyle/>
+          <a:p>
+            <a:pPr marL="0" marR="0" lvl="0" indent="0" algn="l" defTabSz="914400" rtl="0" eaLnBrk="1" fontAlgn="auto" latinLnBrk="0" hangingPunct="1">
+              <a:lnSpc>
+                <a:spcPct val="100000"/>
+              </a:lnSpc>
+              <a:spcBef>
+                <a:spcPts val="0"/>
+              </a:spcBef>
+              <a:spcAft>
+                <a:spcPts val="0"/>
+              </a:spcAft>
+              <a:buClrTx/>
+              <a:buSzTx/>
+              <a:buFontTx/>
+              <a:buNone/>
+              <a:tabLst/>
+              <a:defRPr/>
+            </a:pPr>
+            <a:r>
+              <a:rPr lang="en-US" sz="1200" b="0" i="0" kern="1200" dirty="0">
+                <a:solidFill>
+                  <a:schemeClr val="tx1"/>
+                </a:solidFill>
+                <a:effectLst/>
+                <a:latin typeface="+mn-lt"/>
+                <a:ea typeface="+mn-ea"/>
+                <a:cs typeface="+mn-cs"/>
+              </a:rPr>
+              <a:t>A Receiver Operator Characteristic (</a:t>
+            </a:r>
+            <a:r>
+              <a:rPr lang="en-US" sz="1200" b="1" i="0" kern="1200" dirty="0">
+                <a:solidFill>
+                  <a:schemeClr val="tx1"/>
+                </a:solidFill>
+                <a:effectLst/>
+                <a:latin typeface="+mn-lt"/>
+                <a:ea typeface="+mn-ea"/>
+                <a:cs typeface="+mn-cs"/>
+              </a:rPr>
+              <a:t>ROC</a:t>
+            </a:r>
+            <a:r>
+              <a:rPr lang="en-US" sz="1200" b="0" i="0" kern="1200" dirty="0">
+                <a:solidFill>
+                  <a:schemeClr val="tx1"/>
+                </a:solidFill>
+                <a:effectLst/>
+                <a:latin typeface="+mn-lt"/>
+                <a:ea typeface="+mn-ea"/>
+                <a:cs typeface="+mn-cs"/>
+              </a:rPr>
+              <a:t>) </a:t>
+            </a:r>
+            <a:r>
+              <a:rPr lang="en-US" sz="1200" b="1" i="0" kern="1200" dirty="0">
+                <a:solidFill>
+                  <a:schemeClr val="tx1"/>
+                </a:solidFill>
+                <a:effectLst/>
+                <a:latin typeface="+mn-lt"/>
+                <a:ea typeface="+mn-ea"/>
+                <a:cs typeface="+mn-cs"/>
+              </a:rPr>
+              <a:t>curve</a:t>
+            </a:r>
+            <a:r>
+              <a:rPr lang="en-US" sz="1200" b="0" i="0" kern="1200" dirty="0">
+                <a:solidFill>
+                  <a:schemeClr val="tx1"/>
+                </a:solidFill>
+                <a:effectLst/>
+                <a:latin typeface="+mn-lt"/>
+                <a:ea typeface="+mn-ea"/>
+                <a:cs typeface="+mn-cs"/>
+              </a:rPr>
+              <a:t> is a graphical plot used to </a:t>
+            </a:r>
+            <a:r>
+              <a:rPr lang="en-US" sz="1200" b="1" i="0" kern="1200" dirty="0">
+                <a:solidFill>
+                  <a:schemeClr val="tx1"/>
+                </a:solidFill>
+                <a:effectLst/>
+                <a:latin typeface="+mn-lt"/>
+                <a:ea typeface="+mn-ea"/>
+                <a:cs typeface="+mn-cs"/>
+              </a:rPr>
+              <a:t>show</a:t>
+            </a:r>
+            <a:r>
+              <a:rPr lang="en-US" sz="1200" b="0" i="0" kern="1200" dirty="0">
+                <a:solidFill>
+                  <a:schemeClr val="tx1"/>
+                </a:solidFill>
+                <a:effectLst/>
+                <a:latin typeface="+mn-lt"/>
+                <a:ea typeface="+mn-ea"/>
+                <a:cs typeface="+mn-cs"/>
+              </a:rPr>
+              <a:t> the diagnostic ability of binary classifiers. It shows the tradeoff between sensitivity TP/(TP+FN) and specificity TN/(TN+FP)  (any increase in sensitivity will be accompanied by a decrease in specificity). The closer the curve follows the left-hand border and then the top border of the </a:t>
+            </a:r>
+            <a:r>
+              <a:rPr lang="en-US" sz="1200" b="1" i="0" kern="1200" dirty="0">
+                <a:solidFill>
+                  <a:schemeClr val="tx1"/>
+                </a:solidFill>
+                <a:effectLst/>
+                <a:latin typeface="+mn-lt"/>
+                <a:ea typeface="+mn-ea"/>
+                <a:cs typeface="+mn-cs"/>
+              </a:rPr>
+              <a:t>ROC</a:t>
+            </a:r>
+            <a:r>
+              <a:rPr lang="en-US" sz="1200" b="0" i="0" kern="1200" dirty="0">
+                <a:solidFill>
+                  <a:schemeClr val="tx1"/>
+                </a:solidFill>
+                <a:effectLst/>
+                <a:latin typeface="+mn-lt"/>
+                <a:ea typeface="+mn-ea"/>
+                <a:cs typeface="+mn-cs"/>
+              </a:rPr>
+              <a:t> space, the more accurate the test. The </a:t>
+            </a:r>
+            <a:r>
+              <a:rPr lang="en-US" sz="1200" b="0" i="0" u="sng" kern="1200" dirty="0">
+                <a:solidFill>
+                  <a:schemeClr val="tx1"/>
+                </a:solidFill>
+                <a:effectLst/>
+                <a:latin typeface="+mn-lt"/>
+                <a:ea typeface="+mn-ea"/>
+                <a:cs typeface="+mn-cs"/>
+              </a:rPr>
+              <a:t>area under </a:t>
+            </a:r>
+            <a:r>
+              <a:rPr lang="en-US" sz="1200" b="0" i="0" kern="1200" dirty="0">
+                <a:solidFill>
+                  <a:schemeClr val="tx1"/>
+                </a:solidFill>
+                <a:effectLst/>
+                <a:latin typeface="+mn-lt"/>
+                <a:ea typeface="+mn-ea"/>
+                <a:cs typeface="+mn-cs"/>
+              </a:rPr>
+              <a:t>an ROC </a:t>
+            </a:r>
+            <a:r>
+              <a:rPr lang="en-US" sz="1200" b="0" i="0" u="sng" kern="1200" dirty="0">
+                <a:solidFill>
+                  <a:schemeClr val="tx1"/>
+                </a:solidFill>
+                <a:effectLst/>
+                <a:latin typeface="+mn-lt"/>
+                <a:ea typeface="+mn-ea"/>
+                <a:cs typeface="+mn-cs"/>
+              </a:rPr>
+              <a:t>curve</a:t>
+            </a:r>
+            <a:r>
+              <a:rPr lang="en-US" sz="1200" b="0" i="0" kern="1200" dirty="0">
+                <a:solidFill>
+                  <a:schemeClr val="tx1"/>
+                </a:solidFill>
+                <a:effectLst/>
+                <a:latin typeface="+mn-lt"/>
+                <a:ea typeface="+mn-ea"/>
+                <a:cs typeface="+mn-cs"/>
+              </a:rPr>
+              <a:t> is a measure of the usefulness of a test in general, where a greater area means a more useful test, the areas under ROC curves are used to compare the usefulness of tests.</a:t>
+            </a:r>
+            <a:endParaRPr lang="en-US" dirty="0"/>
+          </a:p>
+          <a:p>
+            <a:endParaRPr lang="en-US" dirty="0"/>
+          </a:p>
+        </p:txBody>
+      </p:sp>
+      <p:sp>
+        <p:nvSpPr>
+          <p:cNvPr id="4" name="Slide Number Placeholder 3"/>
+          <p:cNvSpPr>
+            <a:spLocks noGrp="1"/>
+          </p:cNvSpPr>
+          <p:nvPr>
+            <p:ph type="sldNum" sz="quarter" idx="5"/>
+          </p:nvPr>
+        </p:nvSpPr>
+        <p:spPr/>
+        <p:txBody>
+          <a:bodyPr/>
+          <a:lstStyle/>
+          <a:p>
+            <a:fld id="{9555D449-B875-4B8D-8E66-224D27E54C9A}" type="slidenum">
+              <a:rPr lang="en-US" smtClean="0"/>
+              <a:t>13</a:t>
+            </a:fld>
+            <a:endParaRPr lang="en-US"/>
+          </a:p>
+        </p:txBody>
+      </p:sp>
+    </p:spTree>
+    <p:extLst>
+      <p:ext uri="{BB962C8B-B14F-4D97-AF65-F5344CB8AC3E}">
+        <p14:creationId xmlns:p14="http://schemas.microsoft.com/office/powerpoint/2010/main" val="390993250"/>
       </p:ext>
     </p:extLst>
   </p:cSld>
@@ -1956,7 +2194,7 @@
           <a:p>
             <a:fld id="{37CC0096-1860-4642-9CD2-0079EA5E7CD1}" type="datetimeFigureOut">
               <a:rPr lang="en-US"/>
-              <a:t>5/2/2020</a:t>
+              <a:t>5/4/2020</a:t>
             </a:fld>
             <a:endParaRPr/>
           </a:p>
@@ -2205,7 +2443,7 @@
           <a:p>
             <a:fld id="{37CC0096-1860-4642-9CD2-0079EA5E7CD1}" type="datetimeFigureOut">
               <a:rPr lang="en-US"/>
-              <a:t>5/2/2020</a:t>
+              <a:t>5/4/2020</a:t>
             </a:fld>
             <a:endParaRPr/>
           </a:p>
@@ -2391,7 +2629,7 @@
           <a:p>
             <a:fld id="{37CC0096-1860-4642-9CD2-0079EA5E7CD1}" type="datetimeFigureOut">
               <a:rPr lang="en-US"/>
-              <a:t>5/2/2020</a:t>
+              <a:t>5/4/2020</a:t>
             </a:fld>
             <a:endParaRPr/>
           </a:p>
@@ -2922,7 +3160,7 @@
           <a:p>
             <a:fld id="{37CC0096-1860-4642-9CD2-0079EA5E7CD1}" type="datetimeFigureOut">
               <a:rPr lang="en-US"/>
-              <a:t>5/2/2020</a:t>
+              <a:t>5/4/2020</a:t>
             </a:fld>
             <a:endParaRPr/>
           </a:p>
@@ -3374,7 +3612,7 @@
           <a:p>
             <a:fld id="{37CC0096-1860-4642-9CD2-0079EA5E7CD1}" type="datetimeFigureOut">
               <a:rPr lang="en-US"/>
-              <a:t>5/2/2020</a:t>
+              <a:t>5/4/2020</a:t>
             </a:fld>
             <a:endParaRPr/>
           </a:p>
@@ -3504,7 +3742,7 @@
           <a:p>
             <a:fld id="{37CC0096-1860-4642-9CD2-0079EA5E7CD1}" type="datetimeFigureOut">
               <a:rPr lang="en-US"/>
-              <a:t>5/2/2020</a:t>
+              <a:t>5/4/2020</a:t>
             </a:fld>
             <a:endParaRPr/>
           </a:p>
@@ -3611,7 +3849,7 @@
           <a:p>
             <a:fld id="{37CC0096-1860-4642-9CD2-0079EA5E7CD1}" type="datetimeFigureOut">
               <a:rPr lang="en-US"/>
-              <a:t>5/2/2020</a:t>
+              <a:t>5/4/2020</a:t>
             </a:fld>
             <a:endParaRPr/>
           </a:p>
@@ -4600,7 +4838,7 @@
             <a:fld id="{37CC0096-1860-4642-9CD2-0079EA5E7CD1}" type="datetimeFigureOut">
               <a:rPr lang="en-US" smtClean="0"/>
               <a:pPr/>
-              <a:t>5/2/2020</a:t>
+              <a:t>5/4/2020</a:t>
             </a:fld>
             <a:endParaRPr lang="en-US" dirty="0"/>
           </a:p>
@@ -5175,52 +5413,6 @@
       </p:grpSpPr>
       <p:sp>
         <p:nvSpPr>
-          <p:cNvPr id="10" name="Rectangle 9">
-            <a:extLst>
-              <a:ext uri="{FF2B5EF4-FFF2-40B4-BE49-F238E27FC236}">
-                <a16:creationId xmlns:a16="http://schemas.microsoft.com/office/drawing/2014/main" id="{F3702304-2283-4EE7-AD6E-8DBCE2E9213E}"/>
-              </a:ext>
-            </a:extLst>
-          </p:cNvPr>
-          <p:cNvSpPr/>
-          <p:nvPr/>
-        </p:nvSpPr>
-        <p:spPr>
-          <a:xfrm>
-            <a:off x="5846056" y="1899920"/>
-            <a:ext cx="3145544" cy="4572000"/>
-          </a:xfrm>
-          <a:prstGeom prst="rect">
-            <a:avLst/>
-          </a:prstGeom>
-        </p:spPr>
-        <p:style>
-          <a:lnRef idx="2">
-            <a:schemeClr val="dk1">
-              <a:shade val="50000"/>
-            </a:schemeClr>
-          </a:lnRef>
-          <a:fillRef idx="1">
-            <a:schemeClr val="dk1"/>
-          </a:fillRef>
-          <a:effectRef idx="0">
-            <a:schemeClr val="dk1"/>
-          </a:effectRef>
-          <a:fontRef idx="minor">
-            <a:schemeClr val="lt1"/>
-          </a:fontRef>
-        </p:style>
-        <p:txBody>
-          <a:bodyPr rtlCol="0" anchor="ctr"/>
-          <a:lstStyle/>
-          <a:p>
-            <a:pPr algn="ctr"/>
-            <a:endParaRPr lang="en-US" dirty="0"/>
-          </a:p>
-        </p:txBody>
-      </p:sp>
-      <p:sp>
-        <p:nvSpPr>
           <p:cNvPr id="5" name="Rectangle 4">
             <a:extLst>
               <a:ext uri="{FF2B5EF4-FFF2-40B4-BE49-F238E27FC236}">
@@ -5233,8 +5425,8 @@
         </p:nvSpPr>
         <p:spPr>
           <a:xfrm>
-            <a:off x="152400" y="1840071"/>
-            <a:ext cx="5257800" cy="4572000"/>
+            <a:off x="838200" y="1840070"/>
+            <a:ext cx="5943600" cy="4729479"/>
           </a:xfrm>
           <a:prstGeom prst="rect">
             <a:avLst/>
@@ -5334,8 +5526,8 @@
         </p:blipFill>
         <p:spPr bwMode="auto">
           <a:xfrm>
-            <a:off x="429260" y="2341244"/>
-            <a:ext cx="1942609" cy="2095500"/>
+            <a:off x="1500606" y="2293933"/>
+            <a:ext cx="2095499" cy="2260423"/>
           </a:xfrm>
           <a:prstGeom prst="rect">
             <a:avLst/>
@@ -5388,8 +5580,8 @@
         </p:blipFill>
         <p:spPr bwMode="auto">
           <a:xfrm>
-            <a:off x="2807725" y="2341245"/>
-            <a:ext cx="2095499" cy="2095499"/>
+            <a:off x="4072805" y="2332544"/>
+            <a:ext cx="2192912" cy="2192912"/>
           </a:xfrm>
           <a:prstGeom prst="rect">
             <a:avLst/>
@@ -5406,110 +5598,6 @@
           </a:extLst>
         </p:spPr>
       </p:pic>
-      <p:pic>
-        <p:nvPicPr>
-          <p:cNvPr id="1030" name="Picture 6" descr="No Travel Icon of Colored Outline style - Available in SVG, PNG ...">
-            <a:extLst>
-              <a:ext uri="{FF2B5EF4-FFF2-40B4-BE49-F238E27FC236}">
-                <a16:creationId xmlns:a16="http://schemas.microsoft.com/office/drawing/2014/main" id="{9BC5219A-5F95-4093-9266-2A19CEF8FB54}"/>
-              </a:ext>
-            </a:extLst>
-          </p:cNvPr>
-          <p:cNvPicPr>
-            <a:picLocks noChangeAspect="1" noChangeArrowheads="1"/>
-          </p:cNvPicPr>
-          <p:nvPr/>
-        </p:nvPicPr>
-        <p:blipFill>
-          <a:blip r:embed="rId4">
-            <a:duotone>
-              <a:schemeClr val="accent1">
-                <a:shade val="45000"/>
-                <a:satMod val="135000"/>
-              </a:schemeClr>
-              <a:prstClr val="white"/>
-            </a:duotone>
-            <a:extLst>
-              <a:ext uri="{BEBA8EAE-BF5A-486C-A8C5-ECC9F3942E4B}">
-                <a14:imgProps xmlns:a14="http://schemas.microsoft.com/office/drawing/2010/main">
-                  <a14:imgLayer r:embed="rId5">
-                    <a14:imgEffect>
-                      <a14:saturation sat="400000"/>
-                    </a14:imgEffect>
-                  </a14:imgLayer>
-                </a14:imgProps>
-              </a:ext>
-              <a:ext uri="{28A0092B-C50C-407E-A947-70E740481C1C}">
-                <a14:useLocalDpi xmlns:a14="http://schemas.microsoft.com/office/drawing/2010/main" val="0"/>
-              </a:ext>
-            </a:extLst>
-          </a:blip>
-          <a:srcRect/>
-          <a:stretch>
-            <a:fillRect/>
-          </a:stretch>
-        </p:blipFill>
-        <p:spPr bwMode="auto">
-          <a:xfrm>
-            <a:off x="6238876" y="2242820"/>
-            <a:ext cx="2219324" cy="2219324"/>
-          </a:xfrm>
-          <a:prstGeom prst="rect">
-            <a:avLst/>
-          </a:prstGeom>
-          <a:solidFill>
-            <a:schemeClr val="bg1"/>
-          </a:solidFill>
-          <a:ln>
-            <a:solidFill>
-              <a:srgbClr val="FDFAFA"/>
-            </a:solidFill>
-          </a:ln>
-        </p:spPr>
-      </p:pic>
-      <p:sp>
-        <p:nvSpPr>
-          <p:cNvPr id="4" name="TextBox 3">
-            <a:extLst>
-              <a:ext uri="{FF2B5EF4-FFF2-40B4-BE49-F238E27FC236}">
-                <a16:creationId xmlns:a16="http://schemas.microsoft.com/office/drawing/2014/main" id="{CD0938D9-FF38-4ECC-B169-466CFACF937A}"/>
-              </a:ext>
-            </a:extLst>
-          </p:cNvPr>
-          <p:cNvSpPr txBox="1"/>
-          <p:nvPr/>
-        </p:nvSpPr>
-        <p:spPr>
-          <a:xfrm>
-            <a:off x="6238876" y="4805044"/>
-            <a:ext cx="2024062" cy="369332"/>
-          </a:xfrm>
-          <a:prstGeom prst="rect">
-            <a:avLst/>
-          </a:prstGeom>
-          <a:noFill/>
-        </p:spPr>
-        <p:txBody>
-          <a:bodyPr wrap="square" rtlCol="0">
-            <a:spAutoFit/>
-          </a:bodyPr>
-          <a:lstStyle/>
-          <a:p>
-            <a:pPr marL="285750" indent="-285750">
-              <a:buFont typeface="Arial" panose="020B0604020202020204" pitchFamily="34" charset="0"/>
-              <a:buChar char="•"/>
-            </a:pPr>
-            <a:r>
-              <a:rPr lang="en-US" dirty="0">
-                <a:solidFill>
-                  <a:schemeClr val="bg1"/>
-                </a:solidFill>
-              </a:rPr>
-              <a:t>Minimize travel</a:t>
-            </a:r>
-          </a:p>
-        </p:txBody>
-      </p:sp>
       <p:sp>
         <p:nvSpPr>
           <p:cNvPr id="8" name="TextBox 7">
@@ -5524,8 +5612,8 @@
         </p:nvSpPr>
         <p:spPr>
           <a:xfrm>
-            <a:off x="391160" y="4547244"/>
-            <a:ext cx="4591050" cy="1754326"/>
+            <a:off x="1674667" y="4647479"/>
+            <a:ext cx="4591050" cy="1908215"/>
           </a:xfrm>
           <a:prstGeom prst="rect">
             <a:avLst/>
@@ -5578,6 +5666,33 @@
               </a:rPr>
               <a:t>Avoid contact with those known to be infected.</a:t>
             </a:r>
+          </a:p>
+          <a:p>
+            <a:pPr marL="742950" lvl="1" indent="-285750">
+              <a:buFont typeface="Arial" panose="020B0604020202020204" pitchFamily="34" charset="0"/>
+              <a:buChar char="•"/>
+            </a:pPr>
+            <a:r>
+              <a:rPr lang="en-US" sz="1000" dirty="0">
+                <a:solidFill>
+                  <a:schemeClr val="bg1"/>
+                </a:solidFill>
+              </a:rPr>
+              <a:t>Especially true for males, and those with higher  </a:t>
+            </a:r>
+            <a:r>
+              <a:rPr lang="en-US" sz="1000" dirty="0" err="1">
+                <a:solidFill>
+                  <a:schemeClr val="bg1"/>
+                </a:solidFill>
+              </a:rPr>
+              <a:t>bmi</a:t>
+            </a:r>
+            <a:endParaRPr lang="en-US" sz="1000" dirty="0">
+              <a:solidFill>
+                <a:schemeClr val="bg1"/>
+              </a:solidFill>
+            </a:endParaRPr>
           </a:p>
         </p:txBody>
       </p:sp>
@@ -5595,8 +5710,8 @@
         </p:nvSpPr>
         <p:spPr>
           <a:xfrm>
-            <a:off x="9133840" y="1899920"/>
-            <a:ext cx="2905760" cy="4572000"/>
+            <a:off x="7785634" y="1846998"/>
+            <a:ext cx="2905760" cy="4729478"/>
           </a:xfrm>
           <a:prstGeom prst="rect">
             <a:avLst/>
@@ -5641,7 +5756,7 @@
         </p:nvSpPr>
         <p:spPr>
           <a:xfrm>
-            <a:off x="9408796" y="4691550"/>
+            <a:off x="8060590" y="4638628"/>
             <a:ext cx="2580640" cy="1477328"/>
           </a:xfrm>
           <a:prstGeom prst="rect">
@@ -5681,7 +5796,7 @@
           <p:nvPr/>
         </p:nvPicPr>
         <p:blipFill>
-          <a:blip r:embed="rId6">
+          <a:blip r:embed="rId4">
             <a:duotone>
               <a:schemeClr val="accent1">
                 <a:shade val="45000"/>
@@ -5702,7 +5817,7 @@
         </p:blipFill>
         <p:spPr bwMode="auto">
           <a:xfrm>
-            <a:off x="9515157" y="2242820"/>
+            <a:off x="8166951" y="2189898"/>
             <a:ext cx="2143125" cy="2143125"/>
           </a:xfrm>
           <a:prstGeom prst="rect">
@@ -5734,7 +5849,7 @@
         </p:nvSpPr>
         <p:spPr>
           <a:xfrm>
-            <a:off x="609600" y="4191000"/>
+            <a:off x="1752600" y="4343400"/>
             <a:ext cx="1600200" cy="194945"/>
           </a:xfrm>
           <a:prstGeom prst="rect">
@@ -5770,7 +5885,7 @@
           <a:lstStyle/>
           <a:p>
             <a:pPr algn="ctr"/>
-            <a:endParaRPr lang="en-US"/>
+            <a:endParaRPr lang="en-US" dirty="0"/>
           </a:p>
         </p:txBody>
       </p:sp>
@@ -5843,8 +5958,8 @@
         </p:nvSpPr>
         <p:spPr>
           <a:xfrm>
-            <a:off x="7162800" y="2200674"/>
-            <a:ext cx="4222446" cy="4047726"/>
+            <a:off x="8763000" y="1814604"/>
+            <a:ext cx="3214114" cy="4939106"/>
           </a:xfrm>
           <a:prstGeom prst="rect">
             <a:avLst/>
@@ -5890,7 +6005,7 @@
         <p:spPr>
           <a:xfrm>
             <a:off x="214886" y="1814604"/>
-            <a:ext cx="5652513" cy="4939106"/>
+            <a:ext cx="5025699" cy="4939106"/>
           </a:xfrm>
           <a:prstGeom prst="rect">
             <a:avLst/>
@@ -5964,8 +6079,8 @@
         </p:nvSpPr>
         <p:spPr>
           <a:xfrm>
-            <a:off x="7451113" y="2404236"/>
-            <a:ext cx="3674087" cy="3615564"/>
+            <a:off x="9025194" y="2168510"/>
+            <a:ext cx="2779576" cy="4458976"/>
           </a:xfrm>
           <a:prstGeom prst="rect">
             <a:avLst/>
@@ -6013,8 +6128,8 @@
         </p:nvSpPr>
         <p:spPr>
           <a:xfrm>
-            <a:off x="577595" y="2023236"/>
-            <a:ext cx="5037329" cy="4604250"/>
+            <a:off x="577595" y="2057400"/>
+            <a:ext cx="4375405" cy="4570086"/>
           </a:xfrm>
           <a:prstGeom prst="rect">
             <a:avLst/>
@@ -6088,7 +6203,7 @@
         <p:spPr bwMode="auto">
           <a:xfrm>
             <a:off x="672773" y="3290936"/>
-            <a:ext cx="4846972" cy="3225440"/>
+            <a:ext cx="3823027" cy="3225440"/>
           </a:xfrm>
           <a:prstGeom prst="rect">
             <a:avLst/>
@@ -6123,7 +6238,7 @@
         </p:nvSpPr>
         <p:spPr>
           <a:xfrm>
-            <a:off x="701876" y="2260028"/>
+            <a:off x="640842" y="2260028"/>
             <a:ext cx="4800600" cy="762000"/>
           </a:xfrm>
         </p:spPr>
@@ -6158,8 +6273,8 @@
         </p:nvSpPr>
         <p:spPr>
           <a:xfrm>
-            <a:off x="680536" y="3429000"/>
-            <a:ext cx="5037329" cy="2554545"/>
+            <a:off x="680537" y="3429000"/>
+            <a:ext cx="3967664" cy="3170099"/>
           </a:xfrm>
           <a:prstGeom prst="rect">
             <a:avLst/>
@@ -6223,7 +6338,7 @@
           <p:nvPr/>
         </p:nvPicPr>
         <p:blipFill>
-          <a:blip r:embed="rId4">
+          <a:blip r:embed="rId4" cstate="print">
             <a:duotone>
               <a:schemeClr val="accent1">
                 <a:shade val="45000"/>
@@ -6244,8 +6359,8 @@
         </p:blipFill>
         <p:spPr bwMode="auto">
           <a:xfrm>
-            <a:off x="4348363" y="2124455"/>
-            <a:ext cx="1033146" cy="1033146"/>
+            <a:off x="4058777" y="2342635"/>
+            <a:ext cx="762000" cy="762000"/>
           </a:xfrm>
           <a:prstGeom prst="rect">
             <a:avLst/>
@@ -6298,8 +6413,8 @@
         </p:blipFill>
         <p:spPr bwMode="auto">
           <a:xfrm>
-            <a:off x="9864410" y="2580865"/>
-            <a:ext cx="1016140" cy="1076735"/>
+            <a:off x="11044270" y="2580865"/>
+            <a:ext cx="631049" cy="1076735"/>
           </a:xfrm>
           <a:prstGeom prst="rect">
             <a:avLst/>
@@ -6323,8 +6438,8 @@
         </p:nvSpPr>
         <p:spPr>
           <a:xfrm>
-            <a:off x="10058400" y="2718556"/>
-            <a:ext cx="990600" cy="461665"/>
+            <a:off x="11141161" y="2759632"/>
+            <a:ext cx="615188" cy="338554"/>
           </a:xfrm>
           <a:prstGeom prst="rect">
             <a:avLst/>
@@ -6338,7 +6453,7 @@
           <a:lstStyle/>
           <a:p>
             <a:r>
-              <a:rPr lang="en-US" sz="2400" dirty="0">
+              <a:rPr lang="en-US" sz="1600" dirty="0">
                 <a:solidFill>
                   <a:schemeClr val="accent1">
                     <a:lumMod val="75000"/>
@@ -6366,8 +6481,8 @@
         </p:nvSpPr>
         <p:spPr>
           <a:xfrm>
-            <a:off x="7433821" y="2589090"/>
-            <a:ext cx="4800600" cy="762000"/>
+            <a:off x="9085670" y="2131078"/>
+            <a:ext cx="2981294" cy="762000"/>
           </a:xfrm>
           <a:prstGeom prst="rect">
             <a:avLst/>
@@ -6605,8 +6720,8 @@
         </p:nvSpPr>
         <p:spPr>
           <a:xfrm>
-            <a:off x="7611756" y="3990983"/>
-            <a:ext cx="3352800" cy="1754326"/>
+            <a:off x="9208412" y="3179551"/>
+            <a:ext cx="2602588" cy="3170099"/>
           </a:xfrm>
           <a:prstGeom prst="rect">
             <a:avLst/>
@@ -6630,8 +6745,389 @@
               <a:buChar char="•"/>
             </a:pPr>
             <a:r>
-              <a:rPr lang="en-US" dirty="0"/>
+              <a:rPr lang="en-US" sz="2000" dirty="0"/>
               <a:t>Investigate the meaning behind this feature.  The questionnaire to collect data has had several versions and questions surrounding this no longer exist.</a:t>
+            </a:r>
+          </a:p>
+        </p:txBody>
+      </p:sp>
+      <p:sp>
+        <p:nvSpPr>
+          <p:cNvPr id="15" name="Rectangle 14">
+            <a:extLst>
+              <a:ext uri="{FF2B5EF4-FFF2-40B4-BE49-F238E27FC236}">
+                <a16:creationId xmlns:a16="http://schemas.microsoft.com/office/drawing/2014/main" id="{B593F756-297F-4978-B6D3-478B60EFE018}"/>
+              </a:ext>
+            </a:extLst>
+          </p:cNvPr>
+          <p:cNvSpPr/>
+          <p:nvPr/>
+        </p:nvSpPr>
+        <p:spPr>
+          <a:xfrm>
+            <a:off x="5315709" y="1814604"/>
+            <a:ext cx="3315869" cy="4939106"/>
+          </a:xfrm>
+          <a:prstGeom prst="rect">
+            <a:avLst/>
+          </a:prstGeom>
+        </p:spPr>
+        <p:style>
+          <a:lnRef idx="2">
+            <a:schemeClr val="accent1">
+              <a:shade val="50000"/>
+            </a:schemeClr>
+          </a:lnRef>
+          <a:fillRef idx="1">
+            <a:schemeClr val="accent1"/>
+          </a:fillRef>
+          <a:effectRef idx="0">
+            <a:schemeClr val="accent1"/>
+          </a:effectRef>
+          <a:fontRef idx="minor">
+            <a:schemeClr val="lt1"/>
+          </a:fontRef>
+        </p:style>
+        <p:txBody>
+          <a:bodyPr rtlCol="0" anchor="ctr"/>
+          <a:lstStyle/>
+          <a:p>
+            <a:pPr algn="ctr"/>
+            <a:endParaRPr lang="en-US"/>
+          </a:p>
+        </p:txBody>
+      </p:sp>
+      <p:sp>
+        <p:nvSpPr>
+          <p:cNvPr id="20" name="Rectangle 19">
+            <a:extLst>
+              <a:ext uri="{FF2B5EF4-FFF2-40B4-BE49-F238E27FC236}">
+                <a16:creationId xmlns:a16="http://schemas.microsoft.com/office/drawing/2014/main" id="{2AED76B2-0432-4BA1-967F-1A85981F779B}"/>
+              </a:ext>
+            </a:extLst>
+          </p:cNvPr>
+          <p:cNvSpPr/>
+          <p:nvPr/>
+        </p:nvSpPr>
+        <p:spPr>
+          <a:xfrm>
+            <a:off x="5468952" y="2057400"/>
+            <a:ext cx="2992740" cy="4451576"/>
+          </a:xfrm>
+          <a:prstGeom prst="rect">
+            <a:avLst/>
+          </a:prstGeom>
+          <a:solidFill>
+            <a:srgbClr val="F2F2F2"/>
+          </a:solidFill>
+        </p:spPr>
+        <p:style>
+          <a:lnRef idx="2">
+            <a:schemeClr val="accent1">
+              <a:shade val="50000"/>
+            </a:schemeClr>
+          </a:lnRef>
+          <a:fillRef idx="1">
+            <a:schemeClr val="accent1"/>
+          </a:fillRef>
+          <a:effectRef idx="0">
+            <a:schemeClr val="accent1"/>
+          </a:effectRef>
+          <a:fontRef idx="minor">
+            <a:schemeClr val="lt1"/>
+          </a:fontRef>
+        </p:style>
+        <p:txBody>
+          <a:bodyPr rtlCol="0" anchor="ctr"/>
+          <a:lstStyle/>
+          <a:p>
+            <a:pPr algn="ctr"/>
+            <a:endParaRPr lang="en-US"/>
+          </a:p>
+        </p:txBody>
+      </p:sp>
+      <p:sp>
+        <p:nvSpPr>
+          <p:cNvPr id="24" name="Text Placeholder 4">
+            <a:extLst>
+              <a:ext uri="{FF2B5EF4-FFF2-40B4-BE49-F238E27FC236}">
+                <a16:creationId xmlns:a16="http://schemas.microsoft.com/office/drawing/2014/main" id="{266F2F29-E4FF-4CBB-A26F-E7AF1B29AF8B}"/>
+              </a:ext>
+            </a:extLst>
+          </p:cNvPr>
+          <p:cNvSpPr txBox="1">
+            <a:spLocks/>
+          </p:cNvSpPr>
+          <p:nvPr/>
+        </p:nvSpPr>
+        <p:spPr>
+          <a:xfrm>
+            <a:off x="5982427" y="2156401"/>
+            <a:ext cx="2981294" cy="762000"/>
+          </a:xfrm>
+          <a:prstGeom prst="rect">
+            <a:avLst/>
+          </a:prstGeom>
+        </p:spPr>
+        <p:txBody>
+          <a:bodyPr vert="horz" lIns="91440" tIns="45720" rIns="91440" bIns="45720" rtlCol="0" anchor="ctr">
+            <a:noAutofit/>
+          </a:bodyPr>
+          <a:lstStyle>
+            <a:lvl1pPr marL="0" indent="0" algn="l" defTabSz="914400" rtl="0" eaLnBrk="1" latinLnBrk="0" hangingPunct="1">
+              <a:lnSpc>
+                <a:spcPct val="90000"/>
+              </a:lnSpc>
+              <a:spcBef>
+                <a:spcPts val="1800"/>
+              </a:spcBef>
+              <a:buSzPct val="100000"/>
+              <a:buFont typeface="Arial" pitchFamily="34" charset="0"/>
+              <a:buNone/>
+              <a:defRPr sz="2400" b="0" kern="1200" cap="none" baseline="0">
+                <a:solidFill>
+                  <a:schemeClr val="tx1">
+                    <a:lumMod val="75000"/>
+                    <a:lumOff val="25000"/>
+                  </a:schemeClr>
+                </a:solidFill>
+                <a:latin typeface="+mn-lt"/>
+                <a:ea typeface="+mn-ea"/>
+                <a:cs typeface="+mn-cs"/>
+              </a:defRPr>
+            </a:lvl1pPr>
+            <a:lvl2pPr marL="457200" indent="0" algn="l" defTabSz="914400" rtl="0" eaLnBrk="1" latinLnBrk="0" hangingPunct="1">
+              <a:lnSpc>
+                <a:spcPct val="90000"/>
+              </a:lnSpc>
+              <a:spcBef>
+                <a:spcPts val="600"/>
+              </a:spcBef>
+              <a:buSzPct val="100000"/>
+              <a:buFont typeface="Arial" pitchFamily="34" charset="0"/>
+              <a:buNone/>
+              <a:defRPr sz="2000" b="1" kern="1200">
+                <a:solidFill>
+                  <a:schemeClr val="tx1">
+                    <a:lumMod val="75000"/>
+                    <a:lumOff val="25000"/>
+                  </a:schemeClr>
+                </a:solidFill>
+                <a:latin typeface="+mn-lt"/>
+                <a:ea typeface="+mn-ea"/>
+                <a:cs typeface="+mn-cs"/>
+              </a:defRPr>
+            </a:lvl2pPr>
+            <a:lvl3pPr marL="914400" indent="0" algn="l" defTabSz="914400" rtl="0" eaLnBrk="1" latinLnBrk="0" hangingPunct="1">
+              <a:lnSpc>
+                <a:spcPct val="90000"/>
+              </a:lnSpc>
+              <a:spcBef>
+                <a:spcPts val="600"/>
+              </a:spcBef>
+              <a:buSzPct val="100000"/>
+              <a:buFont typeface="Arial" pitchFamily="34" charset="0"/>
+              <a:buNone/>
+              <a:defRPr sz="1800" b="1" kern="1200">
+                <a:solidFill>
+                  <a:schemeClr val="tx1">
+                    <a:lumMod val="75000"/>
+                    <a:lumOff val="25000"/>
+                  </a:schemeClr>
+                </a:solidFill>
+                <a:latin typeface="+mn-lt"/>
+                <a:ea typeface="+mn-ea"/>
+                <a:cs typeface="+mn-cs"/>
+              </a:defRPr>
+            </a:lvl3pPr>
+            <a:lvl4pPr marL="1371600" indent="0" algn="l" defTabSz="914400" rtl="0" eaLnBrk="1" latinLnBrk="0" hangingPunct="1">
+              <a:lnSpc>
+                <a:spcPct val="90000"/>
+              </a:lnSpc>
+              <a:spcBef>
+                <a:spcPts val="600"/>
+              </a:spcBef>
+              <a:buSzPct val="100000"/>
+              <a:buFont typeface="Arial" pitchFamily="34" charset="0"/>
+              <a:buNone/>
+              <a:defRPr sz="1600" b="1" kern="1200">
+                <a:solidFill>
+                  <a:schemeClr val="tx1">
+                    <a:lumMod val="75000"/>
+                    <a:lumOff val="25000"/>
+                  </a:schemeClr>
+                </a:solidFill>
+                <a:latin typeface="+mn-lt"/>
+                <a:ea typeface="+mn-ea"/>
+                <a:cs typeface="+mn-cs"/>
+              </a:defRPr>
+            </a:lvl4pPr>
+            <a:lvl5pPr marL="1828800" indent="0" algn="l" defTabSz="914400" rtl="0" eaLnBrk="1" latinLnBrk="0" hangingPunct="1">
+              <a:lnSpc>
+                <a:spcPct val="90000"/>
+              </a:lnSpc>
+              <a:spcBef>
+                <a:spcPts val="600"/>
+              </a:spcBef>
+              <a:buSzPct val="100000"/>
+              <a:buFont typeface="Arial" pitchFamily="34" charset="0"/>
+              <a:buNone/>
+              <a:defRPr sz="1600" b="1" kern="1200">
+                <a:solidFill>
+                  <a:schemeClr val="tx1">
+                    <a:lumMod val="75000"/>
+                    <a:lumOff val="25000"/>
+                  </a:schemeClr>
+                </a:solidFill>
+                <a:latin typeface="+mn-lt"/>
+                <a:ea typeface="+mn-ea"/>
+                <a:cs typeface="+mn-cs"/>
+              </a:defRPr>
+            </a:lvl5pPr>
+            <a:lvl6pPr marL="2286000" indent="0" algn="l" defTabSz="914400" rtl="0" eaLnBrk="1" latinLnBrk="0" hangingPunct="1">
+              <a:lnSpc>
+                <a:spcPct val="90000"/>
+              </a:lnSpc>
+              <a:spcBef>
+                <a:spcPts val="400"/>
+              </a:spcBef>
+              <a:buSzPct val="100000"/>
+              <a:buFont typeface="Arial" pitchFamily="34" charset="0"/>
+              <a:buNone/>
+              <a:defRPr sz="1600" b="1" kern="1200">
+                <a:solidFill>
+                  <a:schemeClr val="tx1">
+                    <a:lumMod val="75000"/>
+                    <a:lumOff val="25000"/>
+                  </a:schemeClr>
+                </a:solidFill>
+                <a:latin typeface="+mn-lt"/>
+                <a:ea typeface="+mn-ea"/>
+                <a:cs typeface="+mn-cs"/>
+              </a:defRPr>
+            </a:lvl6pPr>
+            <a:lvl7pPr marL="2743200" indent="0" algn="l" defTabSz="914400" rtl="0" eaLnBrk="1" latinLnBrk="0" hangingPunct="1">
+              <a:lnSpc>
+                <a:spcPct val="90000"/>
+              </a:lnSpc>
+              <a:spcBef>
+                <a:spcPts val="400"/>
+              </a:spcBef>
+              <a:buSzPct val="100000"/>
+              <a:buFont typeface="Arial" pitchFamily="34" charset="0"/>
+              <a:buNone/>
+              <a:defRPr sz="1600" b="1" kern="1200">
+                <a:solidFill>
+                  <a:schemeClr val="tx1">
+                    <a:lumMod val="75000"/>
+                    <a:lumOff val="25000"/>
+                  </a:schemeClr>
+                </a:solidFill>
+                <a:latin typeface="+mn-lt"/>
+                <a:ea typeface="+mn-ea"/>
+                <a:cs typeface="+mn-cs"/>
+              </a:defRPr>
+            </a:lvl7pPr>
+            <a:lvl8pPr marL="3200400" indent="0" algn="l" defTabSz="914400" rtl="0" eaLnBrk="1" latinLnBrk="0" hangingPunct="1">
+              <a:lnSpc>
+                <a:spcPct val="90000"/>
+              </a:lnSpc>
+              <a:spcBef>
+                <a:spcPts val="400"/>
+              </a:spcBef>
+              <a:buSzPct val="100000"/>
+              <a:buFont typeface="Arial" pitchFamily="34" charset="0"/>
+              <a:buNone/>
+              <a:defRPr sz="1600" b="1" kern="1200">
+                <a:solidFill>
+                  <a:schemeClr val="tx1">
+                    <a:lumMod val="75000"/>
+                    <a:lumOff val="25000"/>
+                  </a:schemeClr>
+                </a:solidFill>
+                <a:latin typeface="+mn-lt"/>
+                <a:ea typeface="+mn-ea"/>
+                <a:cs typeface="+mn-cs"/>
+              </a:defRPr>
+            </a:lvl8pPr>
+            <a:lvl9pPr marL="3657600" indent="0" algn="l" defTabSz="914400" rtl="0" eaLnBrk="1" latinLnBrk="0" hangingPunct="1">
+              <a:lnSpc>
+                <a:spcPct val="90000"/>
+              </a:lnSpc>
+              <a:spcBef>
+                <a:spcPts val="400"/>
+              </a:spcBef>
+              <a:buSzPct val="100000"/>
+              <a:buFont typeface="Arial" pitchFamily="34" charset="0"/>
+              <a:buNone/>
+              <a:defRPr sz="1600" b="1" kern="1200">
+                <a:solidFill>
+                  <a:schemeClr val="tx1">
+                    <a:lumMod val="75000"/>
+                    <a:lumOff val="25000"/>
+                  </a:schemeClr>
+                </a:solidFill>
+                <a:latin typeface="+mn-lt"/>
+                <a:ea typeface="+mn-ea"/>
+                <a:cs typeface="+mn-cs"/>
+              </a:defRPr>
+            </a:lvl9pPr>
+          </a:lstStyle>
+          <a:p>
+            <a:r>
+              <a:rPr lang="en-US" dirty="0">
+                <a:solidFill>
+                  <a:schemeClr val="accent1">
+                    <a:lumMod val="75000"/>
+                  </a:schemeClr>
+                </a:solidFill>
+              </a:rPr>
+              <a:t>BMI</a:t>
+            </a:r>
+          </a:p>
+        </p:txBody>
+      </p:sp>
+      <p:sp>
+        <p:nvSpPr>
+          <p:cNvPr id="25" name="TextBox 24">
+            <a:extLst>
+              <a:ext uri="{FF2B5EF4-FFF2-40B4-BE49-F238E27FC236}">
+                <a16:creationId xmlns:a16="http://schemas.microsoft.com/office/drawing/2014/main" id="{5032D929-EBE4-4529-B782-A1DDFA9C3D7F}"/>
+              </a:ext>
+            </a:extLst>
+          </p:cNvPr>
+          <p:cNvSpPr txBox="1"/>
+          <p:nvPr/>
+        </p:nvSpPr>
+        <p:spPr>
+          <a:xfrm>
+            <a:off x="5559406" y="3422554"/>
+            <a:ext cx="2746394" cy="2862322"/>
+          </a:xfrm>
+          <a:prstGeom prst="rect">
+            <a:avLst/>
+          </a:prstGeom>
+          <a:solidFill>
+            <a:schemeClr val="accent1">
+              <a:lumMod val="20000"/>
+              <a:lumOff val="80000"/>
+              <a:alpha val="50000"/>
+            </a:schemeClr>
+          </a:solidFill>
+        </p:spPr>
+        <p:txBody>
+          <a:bodyPr wrap="square" rtlCol="0">
+            <a:spAutoFit/>
+          </a:bodyPr>
+          <a:lstStyle/>
+          <a:p>
+            <a:pPr marL="285750" indent="-285750">
+              <a:buFont typeface="Arial" panose="020B0604020202020204" pitchFamily="34" charset="0"/>
+              <a:buChar char="•"/>
+            </a:pPr>
+            <a:r>
+              <a:rPr lang="en-US" sz="2000" dirty="0"/>
+              <a:t>In addition to this result, studies show that BMI is an important factor.  This feature could be further examined to determine what a possible threshold might be.</a:t>
             </a:r>
           </a:p>
         </p:txBody>
@@ -6736,6 +7232,106 @@
     <p:extLst>
       <p:ext uri="{BB962C8B-B14F-4D97-AF65-F5344CB8AC3E}">
         <p14:creationId xmlns:p14="http://schemas.microsoft.com/office/powerpoint/2010/main" val="2354640993"/>
+      </p:ext>
+    </p:extLst>
+  </p:cSld>
+  <p:clrMapOvr>
+    <a:masterClrMapping/>
+  </p:clrMapOvr>
+  <mc:AlternateContent xmlns:mc="http://schemas.openxmlformats.org/markup-compatibility/2006" xmlns:p14="http://schemas.microsoft.com/office/powerpoint/2010/main">
+    <mc:Choice Requires="p14">
+      <p:transition spd="med" p14:dur="700">
+        <p:fade/>
+      </p:transition>
+    </mc:Choice>
+    <mc:Fallback xmlns="">
+      <p:transition spd="med">
+        <p:fade/>
+      </p:transition>
+    </mc:Fallback>
+  </mc:AlternateContent>
+</p:sld>
+</file>
+
+<file path=ppt/slides/slide13.xml><?xml version="1.0" encoding="utf-8"?>
+<p:sld xmlns:a="http://schemas.openxmlformats.org/drawingml/2006/main" xmlns:r="http://schemas.openxmlformats.org/officeDocument/2006/relationships" xmlns:p="http://schemas.openxmlformats.org/presentationml/2006/main">
+  <p:cSld>
+    <p:spTree>
+      <p:nvGrpSpPr>
+        <p:cNvPr id="1" name=""/>
+        <p:cNvGrpSpPr/>
+        <p:nvPr/>
+      </p:nvGrpSpPr>
+      <p:grpSpPr>
+        <a:xfrm>
+          <a:off x="0" y="0"/>
+          <a:ext cx="0" cy="0"/>
+          <a:chOff x="0" y="0"/>
+          <a:chExt cx="0" cy="0"/>
+        </a:xfrm>
+      </p:grpSpPr>
+      <p:sp>
+        <p:nvSpPr>
+          <p:cNvPr id="2" name="Title 1">
+            <a:extLst>
+              <a:ext uri="{FF2B5EF4-FFF2-40B4-BE49-F238E27FC236}">
+                <a16:creationId xmlns:a16="http://schemas.microsoft.com/office/drawing/2014/main" id="{806BF1DA-B9BA-4F2A-A5A2-96E45612B669}"/>
+              </a:ext>
+            </a:extLst>
+          </p:cNvPr>
+          <p:cNvSpPr>
+            <a:spLocks noGrp="1"/>
+          </p:cNvSpPr>
+          <p:nvPr>
+            <p:ph type="title"/>
+          </p:nvPr>
+        </p:nvSpPr>
+        <p:spPr/>
+        <p:txBody>
+          <a:bodyPr/>
+          <a:lstStyle/>
+          <a:p>
+            <a:r>
+              <a:rPr lang="en-US" dirty="0"/>
+              <a:t>Receiver Operator Curve (ROC)</a:t>
+            </a:r>
+          </a:p>
+        </p:txBody>
+      </p:sp>
+      <p:pic>
+        <p:nvPicPr>
+          <p:cNvPr id="4" name="Picture 3">
+            <a:extLst>
+              <a:ext uri="{FF2B5EF4-FFF2-40B4-BE49-F238E27FC236}">
+                <a16:creationId xmlns:a16="http://schemas.microsoft.com/office/drawing/2014/main" id="{EDC28FAB-C109-4DFE-9D97-640E664F52C3}"/>
+              </a:ext>
+            </a:extLst>
+          </p:cNvPr>
+          <p:cNvPicPr>
+            <a:picLocks noChangeAspect="1"/>
+          </p:cNvPicPr>
+          <p:nvPr/>
+        </p:nvPicPr>
+        <p:blipFill>
+          <a:blip r:embed="rId3"/>
+          <a:stretch>
+            <a:fillRect/>
+          </a:stretch>
+        </p:blipFill>
+        <p:spPr>
+          <a:xfrm>
+            <a:off x="5867400" y="2057400"/>
+            <a:ext cx="5915025" cy="4548864"/>
+          </a:xfrm>
+          <a:prstGeom prst="rect">
+            <a:avLst/>
+          </a:prstGeom>
+        </p:spPr>
+      </p:pic>
+    </p:spTree>
+    <p:extLst>
+      <p:ext uri="{BB962C8B-B14F-4D97-AF65-F5344CB8AC3E}">
+        <p14:creationId xmlns:p14="http://schemas.microsoft.com/office/powerpoint/2010/main" val="1438998939"/>
       </p:ext>
     </p:extLst>
   </p:cSld>
@@ -16972,7 +17568,7 @@
             <a:pPr algn="ctr"/>
             <a:r>
               <a:rPr lang="en-US" sz="1200" dirty="0"/>
-              <a:t>COVID-19 Contact=False</a:t>
+              <a:t>COVID-19 Contact=True</a:t>
             </a:r>
           </a:p>
         </p:txBody>
@@ -17022,13 +17618,6 @@
               <a:t>Other Feature</a:t>
             </a:r>
           </a:p>
-          <a:p>
-            <a:pPr algn="ctr"/>
-            <a:r>
-              <a:rPr lang="en-US" sz="700" dirty="0"/>
-              <a:t>COVID-19 -</a:t>
-            </a:r>
-          </a:p>
         </p:txBody>
       </p:sp>
       <p:sp>
@@ -17074,13 +17663,6 @@
             <a:r>
               <a:rPr lang="en-US" sz="1200" dirty="0"/>
               <a:t>Other Feature</a:t>
-            </a:r>
-          </a:p>
-          <a:p>
-            <a:pPr algn="ctr"/>
-            <a:r>
-              <a:rPr lang="en-US" sz="700" dirty="0"/>
-              <a:t>COVID-19 +</a:t>
             </a:r>
           </a:p>
         </p:txBody>
@@ -17378,15 +17960,13 @@
           <a:p>
             <a:r>
               <a:rPr lang="en-US" dirty="0"/>
-              <a:t>Modeling Results:</a:t>
-            </a:r>
-            <a:br>
-              <a:rPr lang="en-US" dirty="0"/>
-            </a:br>
-            <a:r>
-              <a:rPr lang="en-US" dirty="0"/>
-              <a:t> Accuracy: 96%</a:t>
-            </a:r>
+              <a:t>Modeling Results: </a:t>
+            </a:r>
+            <a:r>
+              <a:rPr lang="en-US" sz="2400" dirty="0"/>
+              <a:t> 95.8% Accuracy</a:t>
+            </a:r>
+            <a:endParaRPr lang="en-US" dirty="0"/>
           </a:p>
         </p:txBody>
       </p:sp>
@@ -17404,8 +17984,8 @@
         </p:nvSpPr>
         <p:spPr>
           <a:xfrm>
-            <a:off x="6037115" y="2091427"/>
-            <a:ext cx="441698" cy="4228093"/>
+            <a:off x="5874242" y="2037560"/>
+            <a:ext cx="352318" cy="4733860"/>
           </a:xfrm>
           <a:prstGeom prst="rect">
             <a:avLst/>
@@ -17458,8 +18038,8 @@
         </p:blipFill>
         <p:spPr>
           <a:xfrm>
-            <a:off x="6553200" y="2091427"/>
-            <a:ext cx="5451696" cy="4228093"/>
+            <a:off x="6327590" y="2290576"/>
+            <a:ext cx="5753003" cy="4461773"/>
           </a:xfrm>
           <a:prstGeom prst="rect">
             <a:avLst/>
@@ -17480,7 +18060,7 @@
         </p:nvSpPr>
         <p:spPr>
           <a:xfrm>
-            <a:off x="7848600" y="3810000"/>
+            <a:off x="7696200" y="4050535"/>
             <a:ext cx="1676400" cy="261610"/>
           </a:xfrm>
           <a:prstGeom prst="rect">
@@ -17522,7 +18102,7 @@
         </p:nvSpPr>
         <p:spPr>
           <a:xfrm>
-            <a:off x="10058400" y="5410200"/>
+            <a:off x="10034155" y="5723555"/>
             <a:ext cx="1676400" cy="261610"/>
           </a:xfrm>
           <a:prstGeom prst="rect">
@@ -17550,36 +18130,6 @@
           </a:p>
         </p:txBody>
       </p:sp>
-      <p:pic>
-        <p:nvPicPr>
-          <p:cNvPr id="10" name="Picture 9">
-            <a:extLst>
-              <a:ext uri="{FF2B5EF4-FFF2-40B4-BE49-F238E27FC236}">
-                <a16:creationId xmlns:a16="http://schemas.microsoft.com/office/drawing/2014/main" id="{BA0B552D-74F3-47F6-8BDF-9C9D341E99DD}"/>
-              </a:ext>
-            </a:extLst>
-          </p:cNvPr>
-          <p:cNvPicPr>
-            <a:picLocks noChangeAspect="1"/>
-          </p:cNvPicPr>
-          <p:nvPr/>
-        </p:nvPicPr>
-        <p:blipFill>
-          <a:blip r:embed="rId4"/>
-          <a:stretch>
-            <a:fillRect/>
-          </a:stretch>
-        </p:blipFill>
-        <p:spPr>
-          <a:xfrm>
-            <a:off x="197264" y="2300473"/>
-            <a:ext cx="5765464" cy="3810000"/>
-          </a:xfrm>
-          <a:prstGeom prst="rect">
-            <a:avLst/>
-          </a:prstGeom>
-        </p:spPr>
-      </p:pic>
       <p:pic>
         <p:nvPicPr>
           <p:cNvPr id="11" name="Picture 10">
@@ -17595,7 +18145,7 @@
           <p:nvPr/>
         </p:nvPicPr>
         <p:blipFill>
-          <a:blip r:embed="rId5">
+          <a:blip r:embed="rId4">
             <a:duotone>
               <a:schemeClr val="accent1">
                 <a:shade val="45000"/>
@@ -17633,8 +18183,8 @@
         </p:nvSpPr>
         <p:spPr>
           <a:xfrm>
-            <a:off x="4228556" y="2233666"/>
-            <a:ext cx="1661224" cy="461665"/>
+            <a:off x="385650" y="1736485"/>
+            <a:ext cx="5176950" cy="830997"/>
           </a:xfrm>
           <a:prstGeom prst="rect">
             <a:avLst/>
@@ -17644,21 +18194,549 @@
           </a:solidFill>
         </p:spPr>
         <p:txBody>
+          <a:bodyPr wrap="square">
+            <a:spAutoFit/>
+          </a:bodyPr>
+          <a:lstStyle/>
+          <a:p>
+            <a:pPr algn="ctr"/>
+            <a:r>
+              <a:rPr lang="en-US" sz="2400" b="1" dirty="0">
+                <a:solidFill>
+                  <a:schemeClr val="accent1">
+                    <a:lumMod val="50000"/>
+                  </a:schemeClr>
+                </a:solidFill>
+                <a:latin typeface="Calibri" panose="020F0502020204030204" pitchFamily="34" charset="0"/>
+              </a:rPr>
+              <a:t>Feature Importance in Predicting the </a:t>
+            </a:r>
+          </a:p>
+          <a:p>
+            <a:pPr algn="ctr"/>
+            <a:r>
+              <a:rPr lang="en-US" sz="2400" b="1" dirty="0">
+                <a:solidFill>
+                  <a:schemeClr val="accent1">
+                    <a:lumMod val="50000"/>
+                  </a:schemeClr>
+                </a:solidFill>
+                <a:latin typeface="Calibri" panose="020F0502020204030204" pitchFamily="34" charset="0"/>
+              </a:rPr>
+              <a:t>Contraction of COVID-19</a:t>
+            </a:r>
+            <a:endParaRPr lang="en-US" dirty="0">
+              <a:solidFill>
+                <a:schemeClr val="accent1">
+                  <a:lumMod val="50000"/>
+                </a:schemeClr>
+              </a:solidFill>
+            </a:endParaRPr>
+          </a:p>
+        </p:txBody>
+      </p:sp>
+      <p:pic>
+        <p:nvPicPr>
+          <p:cNvPr id="25" name="Picture 24">
+            <a:extLst>
+              <a:ext uri="{FF2B5EF4-FFF2-40B4-BE49-F238E27FC236}">
+                <a16:creationId xmlns:a16="http://schemas.microsoft.com/office/drawing/2014/main" id="{677C32EF-D748-4D7B-9F95-46C0CB61F96A}"/>
+              </a:ext>
+            </a:extLst>
+          </p:cNvPr>
+          <p:cNvPicPr>
+            <a:picLocks noChangeAspect="1"/>
+          </p:cNvPicPr>
+          <p:nvPr/>
+        </p:nvPicPr>
+        <p:blipFill>
+          <a:blip r:embed="rId5">
+            <a:duotone>
+              <a:schemeClr val="accent1">
+                <a:shade val="45000"/>
+                <a:satMod val="135000"/>
+              </a:schemeClr>
+              <a:prstClr val="white"/>
+            </a:duotone>
+          </a:blip>
+          <a:stretch>
+            <a:fillRect/>
+          </a:stretch>
+        </p:blipFill>
+        <p:spPr>
+          <a:xfrm>
+            <a:off x="187104" y="2502103"/>
+            <a:ext cx="5517057" cy="4305703"/>
+          </a:xfrm>
+          <a:prstGeom prst="rect">
+            <a:avLst/>
+          </a:prstGeom>
+        </p:spPr>
+      </p:pic>
+      <p:sp>
+        <p:nvSpPr>
+          <p:cNvPr id="13" name="Rectangle 12">
+            <a:extLst>
+              <a:ext uri="{FF2B5EF4-FFF2-40B4-BE49-F238E27FC236}">
+                <a16:creationId xmlns:a16="http://schemas.microsoft.com/office/drawing/2014/main" id="{928EE878-98EB-4DEB-8E02-344E732E687A}"/>
+              </a:ext>
+            </a:extLst>
+          </p:cNvPr>
+          <p:cNvSpPr/>
+          <p:nvPr/>
+        </p:nvSpPr>
+        <p:spPr>
+          <a:xfrm>
+            <a:off x="561046" y="2579061"/>
+            <a:ext cx="1946046" cy="276999"/>
+          </a:xfrm>
+          <a:prstGeom prst="rect">
+            <a:avLst/>
+          </a:prstGeom>
+        </p:spPr>
+        <p:txBody>
           <a:bodyPr wrap="none">
             <a:spAutoFit/>
           </a:bodyPr>
           <a:lstStyle/>
           <a:p>
             <a:r>
-              <a:rPr lang="en-US" sz="2400" b="1" dirty="0">
+              <a:rPr lang="en-US" sz="1200" dirty="0">
                 <a:solidFill>
-                  <a:srgbClr val="000000"/>
+                  <a:schemeClr val="bg1"/>
                 </a:solidFill>
-                <a:latin typeface="Calibri" panose="020F0502020204030204" pitchFamily="34" charset="0"/>
               </a:rPr>
-              <a:t>Importance</a:t>
-            </a:r>
-            <a:endParaRPr lang="en-US" dirty="0"/>
+              <a:t>Belief individual is infected</a:t>
+            </a:r>
+          </a:p>
+        </p:txBody>
+      </p:sp>
+      <p:sp>
+        <p:nvSpPr>
+          <p:cNvPr id="14" name="Rectangle 13">
+            <a:extLst>
+              <a:ext uri="{FF2B5EF4-FFF2-40B4-BE49-F238E27FC236}">
+                <a16:creationId xmlns:a16="http://schemas.microsoft.com/office/drawing/2014/main" id="{4616D06F-9131-4FEB-99E1-F8589200F986}"/>
+              </a:ext>
+            </a:extLst>
+          </p:cNvPr>
+          <p:cNvSpPr/>
+          <p:nvPr/>
+        </p:nvSpPr>
+        <p:spPr>
+          <a:xfrm>
+            <a:off x="489712" y="2926223"/>
+            <a:ext cx="2221506" cy="276999"/>
+          </a:xfrm>
+          <a:prstGeom prst="rect">
+            <a:avLst/>
+          </a:prstGeom>
+        </p:spPr>
+        <p:txBody>
+          <a:bodyPr wrap="none">
+            <a:spAutoFit/>
+          </a:bodyPr>
+          <a:lstStyle/>
+          <a:p>
+            <a:r>
+              <a:rPr lang="en-US" sz="1200" dirty="0">
+                <a:solidFill>
+                  <a:schemeClr val="bg1"/>
+                </a:solidFill>
+              </a:rPr>
+              <a:t>Exhibiting COVID-19 symptoms</a:t>
+            </a:r>
+          </a:p>
+        </p:txBody>
+      </p:sp>
+      <p:sp>
+        <p:nvSpPr>
+          <p:cNvPr id="15" name="Rectangle 14">
+            <a:extLst>
+              <a:ext uri="{FF2B5EF4-FFF2-40B4-BE49-F238E27FC236}">
+                <a16:creationId xmlns:a16="http://schemas.microsoft.com/office/drawing/2014/main" id="{9697C9C2-6B66-4E9E-83BF-E72E13A5D4F5}"/>
+              </a:ext>
+            </a:extLst>
+          </p:cNvPr>
+          <p:cNvSpPr/>
+          <p:nvPr/>
+        </p:nvSpPr>
+        <p:spPr>
+          <a:xfrm>
+            <a:off x="1677526" y="3276967"/>
+            <a:ext cx="3018519" cy="276999"/>
+          </a:xfrm>
+          <a:prstGeom prst="rect">
+            <a:avLst/>
+          </a:prstGeom>
+        </p:spPr>
+        <p:txBody>
+          <a:bodyPr wrap="none">
+            <a:spAutoFit/>
+          </a:bodyPr>
+          <a:lstStyle/>
+          <a:p>
+            <a:r>
+              <a:rPr lang="en-US" sz="1200" dirty="0"/>
+              <a:t>Contact with others infected with COVID-19</a:t>
+            </a:r>
+          </a:p>
+        </p:txBody>
+      </p:sp>
+      <p:sp>
+        <p:nvSpPr>
+          <p:cNvPr id="16" name="Rectangle 15">
+            <a:extLst>
+              <a:ext uri="{FF2B5EF4-FFF2-40B4-BE49-F238E27FC236}">
+                <a16:creationId xmlns:a16="http://schemas.microsoft.com/office/drawing/2014/main" id="{C73DF8CD-CCC1-45EC-811B-C1124A11ADCC}"/>
+              </a:ext>
+            </a:extLst>
+          </p:cNvPr>
+          <p:cNvSpPr/>
+          <p:nvPr/>
+        </p:nvSpPr>
+        <p:spPr>
+          <a:xfrm>
+            <a:off x="622164" y="3630212"/>
+            <a:ext cx="4232377" cy="276999"/>
+          </a:xfrm>
+          <a:prstGeom prst="rect">
+            <a:avLst/>
+          </a:prstGeom>
+        </p:spPr>
+        <p:txBody>
+          <a:bodyPr wrap="none">
+            <a:spAutoFit/>
+          </a:bodyPr>
+          <a:lstStyle/>
+          <a:p>
+            <a:r>
+              <a:rPr lang="en-US" sz="1200" dirty="0"/>
+              <a:t>Social distancing and hand washing practiced as a household</a:t>
+            </a:r>
+          </a:p>
+        </p:txBody>
+      </p:sp>
+      <p:sp>
+        <p:nvSpPr>
+          <p:cNvPr id="17" name="Rectangle 16">
+            <a:extLst>
+              <a:ext uri="{FF2B5EF4-FFF2-40B4-BE49-F238E27FC236}">
+                <a16:creationId xmlns:a16="http://schemas.microsoft.com/office/drawing/2014/main" id="{BD73EC62-6008-4398-8A73-C62B0A2A3436}"/>
+              </a:ext>
+            </a:extLst>
+          </p:cNvPr>
+          <p:cNvSpPr/>
+          <p:nvPr/>
+        </p:nvSpPr>
+        <p:spPr>
+          <a:xfrm>
+            <a:off x="609600" y="4308103"/>
+            <a:ext cx="4227568" cy="276999"/>
+          </a:xfrm>
+          <a:prstGeom prst="rect">
+            <a:avLst/>
+          </a:prstGeom>
+        </p:spPr>
+        <p:txBody>
+          <a:bodyPr wrap="none">
+            <a:spAutoFit/>
+          </a:bodyPr>
+          <a:lstStyle/>
+          <a:p>
+            <a:r>
+              <a:rPr lang="en-US" sz="1200" dirty="0"/>
+              <a:t>Social distancing and hand washing practiced as an individual</a:t>
+            </a:r>
+          </a:p>
+        </p:txBody>
+      </p:sp>
+      <p:sp>
+        <p:nvSpPr>
+          <p:cNvPr id="18" name="Rectangle 17">
+            <a:extLst>
+              <a:ext uri="{FF2B5EF4-FFF2-40B4-BE49-F238E27FC236}">
+                <a16:creationId xmlns:a16="http://schemas.microsoft.com/office/drawing/2014/main" id="{2B2929EB-0C0D-4609-B9EA-EDD211895701}"/>
+              </a:ext>
+            </a:extLst>
+          </p:cNvPr>
+          <p:cNvSpPr/>
+          <p:nvPr/>
+        </p:nvSpPr>
+        <p:spPr>
+          <a:xfrm>
+            <a:off x="596606" y="3983457"/>
+            <a:ext cx="4514377" cy="246221"/>
+          </a:xfrm>
+          <a:prstGeom prst="rect">
+            <a:avLst/>
+          </a:prstGeom>
+        </p:spPr>
+        <p:txBody>
+          <a:bodyPr wrap="none">
+            <a:spAutoFit/>
+          </a:bodyPr>
+          <a:lstStyle/>
+          <a:p>
+            <a:r>
+              <a:rPr lang="en-US" sz="1000" dirty="0"/>
+              <a:t>No answer when asked if respondent believed they could die from the infection</a:t>
+            </a:r>
+          </a:p>
+        </p:txBody>
+      </p:sp>
+      <p:sp>
+        <p:nvSpPr>
+          <p:cNvPr id="20" name="Rectangle 19">
+            <a:extLst>
+              <a:ext uri="{FF2B5EF4-FFF2-40B4-BE49-F238E27FC236}">
+                <a16:creationId xmlns:a16="http://schemas.microsoft.com/office/drawing/2014/main" id="{852835E0-144D-4566-9EBD-C11547D31757}"/>
+              </a:ext>
+            </a:extLst>
+          </p:cNvPr>
+          <p:cNvSpPr/>
+          <p:nvPr/>
+        </p:nvSpPr>
+        <p:spPr>
+          <a:xfrm>
+            <a:off x="622164" y="4684816"/>
+            <a:ext cx="3663182" cy="246221"/>
+          </a:xfrm>
+          <a:prstGeom prst="rect">
+            <a:avLst/>
+          </a:prstGeom>
+        </p:spPr>
+        <p:txBody>
+          <a:bodyPr wrap="none">
+            <a:spAutoFit/>
+          </a:bodyPr>
+          <a:lstStyle/>
+          <a:p>
+            <a:r>
+              <a:rPr lang="en-US" sz="1000" dirty="0"/>
+              <a:t>No answer when asked if respondent believed had the infection</a:t>
+            </a:r>
+          </a:p>
+        </p:txBody>
+      </p:sp>
+      <p:sp>
+        <p:nvSpPr>
+          <p:cNvPr id="21" name="Rectangle 20">
+            <a:extLst>
+              <a:ext uri="{FF2B5EF4-FFF2-40B4-BE49-F238E27FC236}">
+                <a16:creationId xmlns:a16="http://schemas.microsoft.com/office/drawing/2014/main" id="{F2B6E1F3-8BFA-4AC0-8044-B62DC49450C8}"/>
+              </a:ext>
+            </a:extLst>
+          </p:cNvPr>
+          <p:cNvSpPr/>
+          <p:nvPr/>
+        </p:nvSpPr>
+        <p:spPr>
+          <a:xfrm>
+            <a:off x="596606" y="4968922"/>
+            <a:ext cx="556667" cy="276999"/>
+          </a:xfrm>
+          <a:prstGeom prst="rect">
+            <a:avLst/>
+          </a:prstGeom>
+        </p:spPr>
+        <p:txBody>
+          <a:bodyPr wrap="square">
+            <a:spAutoFit/>
+          </a:bodyPr>
+          <a:lstStyle/>
+          <a:p>
+            <a:r>
+              <a:rPr lang="en-US" sz="1200" dirty="0"/>
+              <a:t>Male</a:t>
+            </a:r>
+          </a:p>
+        </p:txBody>
+      </p:sp>
+      <p:sp>
+        <p:nvSpPr>
+          <p:cNvPr id="22" name="Rectangle 21">
+            <a:extLst>
+              <a:ext uri="{FF2B5EF4-FFF2-40B4-BE49-F238E27FC236}">
+                <a16:creationId xmlns:a16="http://schemas.microsoft.com/office/drawing/2014/main" id="{C3B275F4-B19E-439A-BFCF-7D76789A4572}"/>
+              </a:ext>
+            </a:extLst>
+          </p:cNvPr>
+          <p:cNvSpPr/>
+          <p:nvPr/>
+        </p:nvSpPr>
+        <p:spPr>
+          <a:xfrm>
+            <a:off x="581411" y="5283806"/>
+            <a:ext cx="675313" cy="276999"/>
+          </a:xfrm>
+          <a:prstGeom prst="rect">
+            <a:avLst/>
+          </a:prstGeom>
+        </p:spPr>
+        <p:txBody>
+          <a:bodyPr wrap="none">
+            <a:spAutoFit/>
+          </a:bodyPr>
+          <a:lstStyle/>
+          <a:p>
+            <a:r>
+              <a:rPr lang="en-US" sz="1200" dirty="0"/>
+              <a:t>Female</a:t>
+            </a:r>
+          </a:p>
+        </p:txBody>
+      </p:sp>
+      <p:sp>
+        <p:nvSpPr>
+          <p:cNvPr id="23" name="Rectangle 22">
+            <a:extLst>
+              <a:ext uri="{FF2B5EF4-FFF2-40B4-BE49-F238E27FC236}">
+                <a16:creationId xmlns:a16="http://schemas.microsoft.com/office/drawing/2014/main" id="{2136F052-85CB-4D12-8261-C00074CD5EC4}"/>
+              </a:ext>
+            </a:extLst>
+          </p:cNvPr>
+          <p:cNvSpPr/>
+          <p:nvPr/>
+        </p:nvSpPr>
+        <p:spPr>
+          <a:xfrm>
+            <a:off x="561046" y="5664829"/>
+            <a:ext cx="442750" cy="276999"/>
+          </a:xfrm>
+          <a:prstGeom prst="rect">
+            <a:avLst/>
+          </a:prstGeom>
+        </p:spPr>
+        <p:txBody>
+          <a:bodyPr wrap="none">
+            <a:spAutoFit/>
+          </a:bodyPr>
+          <a:lstStyle/>
+          <a:p>
+            <a:r>
+              <a:rPr lang="en-US" sz="1200" dirty="0"/>
+              <a:t>BMI</a:t>
+            </a:r>
+          </a:p>
+        </p:txBody>
+      </p:sp>
+      <p:sp>
+        <p:nvSpPr>
+          <p:cNvPr id="10" name="TextBox 9">
+            <a:extLst>
+              <a:ext uri="{FF2B5EF4-FFF2-40B4-BE49-F238E27FC236}">
+                <a16:creationId xmlns:a16="http://schemas.microsoft.com/office/drawing/2014/main" id="{54A1D6C4-948D-43D3-9C5E-EC6718F8E3D2}"/>
+              </a:ext>
+            </a:extLst>
+          </p:cNvPr>
+          <p:cNvSpPr txBox="1"/>
+          <p:nvPr/>
+        </p:nvSpPr>
+        <p:spPr>
+          <a:xfrm>
+            <a:off x="1600465" y="5076644"/>
+            <a:ext cx="556667" cy="338554"/>
+          </a:xfrm>
+          <a:prstGeom prst="rect">
+            <a:avLst/>
+          </a:prstGeom>
+          <a:noFill/>
+        </p:spPr>
+        <p:txBody>
+          <a:bodyPr wrap="square" rtlCol="0">
+            <a:spAutoFit/>
+          </a:bodyPr>
+          <a:lstStyle/>
+          <a:p>
+            <a:r>
+              <a:rPr lang="en-US" sz="1600" dirty="0">
+                <a:solidFill>
+                  <a:schemeClr val="accent1">
+                    <a:lumMod val="75000"/>
+                  </a:schemeClr>
+                </a:solidFill>
+              </a:rPr>
+              <a:t>Sex</a:t>
+            </a:r>
+          </a:p>
+        </p:txBody>
+      </p:sp>
+      <p:sp>
+        <p:nvSpPr>
+          <p:cNvPr id="6" name="Right Brace 5">
+            <a:extLst>
+              <a:ext uri="{FF2B5EF4-FFF2-40B4-BE49-F238E27FC236}">
+                <a16:creationId xmlns:a16="http://schemas.microsoft.com/office/drawing/2014/main" id="{1B218399-F903-4230-8DC3-14AE1EB564D4}"/>
+              </a:ext>
+            </a:extLst>
+          </p:cNvPr>
+          <p:cNvSpPr/>
+          <p:nvPr/>
+        </p:nvSpPr>
+        <p:spPr>
+          <a:xfrm>
+            <a:off x="1303309" y="5051752"/>
+            <a:ext cx="242534" cy="345439"/>
+          </a:xfrm>
+          <a:prstGeom prst="rightBrace">
+            <a:avLst/>
+          </a:prstGeom>
+        </p:spPr>
+        <p:style>
+          <a:lnRef idx="1">
+            <a:schemeClr val="accent1"/>
+          </a:lnRef>
+          <a:fillRef idx="0">
+            <a:schemeClr val="accent1"/>
+          </a:fillRef>
+          <a:effectRef idx="0">
+            <a:schemeClr val="accent1"/>
+          </a:effectRef>
+          <a:fontRef idx="minor">
+            <a:schemeClr val="tx1"/>
+          </a:fontRef>
+        </p:style>
+        <p:txBody>
+          <a:bodyPr rtlCol="0" anchor="ctr"/>
+          <a:lstStyle/>
+          <a:p>
+            <a:pPr algn="ctr"/>
+            <a:endParaRPr lang="en-US"/>
+          </a:p>
+        </p:txBody>
+      </p:sp>
+      <p:sp>
+        <p:nvSpPr>
+          <p:cNvPr id="26" name="Rectangle 25">
+            <a:extLst>
+              <a:ext uri="{FF2B5EF4-FFF2-40B4-BE49-F238E27FC236}">
+                <a16:creationId xmlns:a16="http://schemas.microsoft.com/office/drawing/2014/main" id="{CE81D414-6CE0-4229-8D26-2432C89FA0BB}"/>
+              </a:ext>
+            </a:extLst>
+          </p:cNvPr>
+          <p:cNvSpPr/>
+          <p:nvPr/>
+        </p:nvSpPr>
+        <p:spPr>
+          <a:xfrm>
+            <a:off x="538650" y="5985165"/>
+            <a:ext cx="2285434" cy="276999"/>
+          </a:xfrm>
+          <a:prstGeom prst="rect">
+            <a:avLst/>
+          </a:prstGeom>
+        </p:spPr>
+        <p:txBody>
+          <a:bodyPr wrap="none">
+            <a:spAutoFit/>
+          </a:bodyPr>
+          <a:lstStyle/>
+          <a:p>
+            <a:r>
+              <a:rPr lang="en-US" sz="1200" dirty="0"/>
+              <a:t>Taking prescription medications</a:t>
+            </a:r>
           </a:p>
         </p:txBody>
       </p:sp>
@@ -17857,9 +18935,9 @@
         </p:nvGrpSpPr>
         <p:grpSpPr>
           <a:xfrm>
-            <a:off x="8077200" y="2310573"/>
-            <a:ext cx="3827262" cy="3650990"/>
-            <a:chOff x="304799" y="2239268"/>
+            <a:off x="10047007" y="4661024"/>
+            <a:ext cx="2098695" cy="1806128"/>
+            <a:chOff x="312013" y="2505293"/>
             <a:chExt cx="3886200" cy="3788122"/>
           </a:xfrm>
         </p:grpSpPr>
@@ -17877,7 +18955,7 @@
           </p:nvSpPr>
           <p:spPr>
             <a:xfrm>
-              <a:off x="304799" y="2239268"/>
+              <a:off x="312013" y="2505293"/>
               <a:ext cx="3886200" cy="3788122"/>
             </a:xfrm>
             <a:prstGeom prst="rect">
@@ -17941,7 +19019,7 @@
             <p:nvPr/>
           </p:nvPicPr>
           <p:blipFill>
-            <a:blip r:embed="rId3">
+            <a:blip r:embed="rId3" cstate="print">
               <a:duotone>
                 <a:schemeClr val="accent1">
                   <a:shade val="45000"/>
@@ -17962,8 +19040,8 @@
           </p:blipFill>
           <p:spPr bwMode="auto">
             <a:xfrm>
-              <a:off x="1683314" y="3926046"/>
-              <a:ext cx="1108266" cy="1108266"/>
+              <a:off x="2594840" y="4337645"/>
+              <a:ext cx="1108267" cy="1108266"/>
             </a:xfrm>
             <a:prstGeom prst="rect">
               <a:avLst/>
@@ -17995,7 +19073,7 @@
             <p:nvPr/>
           </p:nvPicPr>
           <p:blipFill>
-            <a:blip r:embed="rId4">
+            <a:blip r:embed="rId4" cstate="print">
               <a:duotone>
                 <a:schemeClr val="accent1">
                   <a:shade val="45000"/>
@@ -18016,62 +19094,8 @@
           </p:blipFill>
           <p:spPr bwMode="auto">
             <a:xfrm>
-              <a:off x="388879" y="3178885"/>
-              <a:ext cx="1220470" cy="1220470"/>
-            </a:xfrm>
-            <a:prstGeom prst="rect">
-              <a:avLst/>
-            </a:prstGeom>
-            <a:noFill/>
-            <a:extLst>
-              <a:ext uri="{909E8E84-426E-40DD-AFC4-6F175D3DCCD1}">
-                <a14:hiddenFill xmlns:a14="http://schemas.microsoft.com/office/drawing/2010/main">
-                  <a:solidFill>
-                    <a:srgbClr val="FFFFFF"/>
-                  </a:solidFill>
-                </a14:hiddenFill>
-              </a:ext>
-            </a:extLst>
-          </p:spPr>
-        </p:pic>
-        <p:pic>
-          <p:nvPicPr>
-            <p:cNvPr id="2056" name="Picture 8" descr="signs, travelling, baggage, Bag, travels, Bags, Banned, travel ...">
-              <a:extLst>
-                <a:ext uri="{FF2B5EF4-FFF2-40B4-BE49-F238E27FC236}">
-                  <a16:creationId xmlns:a16="http://schemas.microsoft.com/office/drawing/2014/main" id="{33DF8B61-543C-4DA1-A355-912B61591DE9}"/>
-                </a:ext>
-              </a:extLst>
-            </p:cNvPr>
-            <p:cNvPicPr>
-              <a:picLocks noChangeAspect="1" noChangeArrowheads="1"/>
-            </p:cNvPicPr>
-            <p:nvPr/>
-          </p:nvPicPr>
-          <p:blipFill>
-            <a:blip r:embed="rId5">
-              <a:duotone>
-                <a:schemeClr val="accent1">
-                  <a:shade val="45000"/>
-                  <a:satMod val="135000"/>
-                </a:schemeClr>
-                <a:prstClr val="white"/>
-              </a:duotone>
-              <a:extLst>
-                <a:ext uri="{28A0092B-C50C-407E-A947-70E740481C1C}">
-                  <a14:useLocalDpi xmlns:a14="http://schemas.microsoft.com/office/drawing/2010/main" val="0"/>
-                </a:ext>
-              </a:extLst>
-            </a:blip>
-            <a:srcRect/>
-            <a:stretch>
-              <a:fillRect/>
-            </a:stretch>
-          </p:blipFill>
-          <p:spPr bwMode="auto">
-            <a:xfrm>
-              <a:off x="2861253" y="4577308"/>
-              <a:ext cx="1147763" cy="1147763"/>
+              <a:off x="920683" y="4169373"/>
+              <a:ext cx="1444814" cy="1444812"/>
             </a:xfrm>
             <a:prstGeom prst="rect">
               <a:avLst/>
@@ -18102,8 +19126,8 @@
           </p:nvSpPr>
           <p:spPr>
             <a:xfrm>
-              <a:off x="1463581" y="2598003"/>
-              <a:ext cx="2570835" cy="1323439"/>
+              <a:off x="442517" y="2937329"/>
+              <a:ext cx="3722402" cy="968283"/>
             </a:xfrm>
             <a:prstGeom prst="rect">
               <a:avLst/>
@@ -18118,13 +19142,13 @@
             <a:p>
               <a:pPr algn="ctr"/>
               <a:r>
-                <a:rPr lang="en-US" sz="3600" dirty="0">
+                <a:rPr lang="en-US" dirty="0">
                   <a:cs typeface="Aharoni" panose="02010803020104030203" pitchFamily="2" charset="-79"/>
                 </a:rPr>
                 <a:t>Behavior Matters</a:t>
               </a:r>
               <a:r>
-                <a:rPr lang="en-US" sz="4400" dirty="0">
+                <a:rPr lang="en-US" sz="2400" dirty="0">
                   <a:cs typeface="Aharoni" panose="02010803020104030203" pitchFamily="2" charset="-79"/>
                 </a:rPr>
                 <a:t>:</a:t>
@@ -18148,7 +19172,7 @@
           <p:nvPr/>
         </p:nvPicPr>
         <p:blipFill>
-          <a:blip r:embed="rId6">
+          <a:blip r:embed="rId5">
             <a:duotone>
               <a:schemeClr val="accent1">
                 <a:shade val="45000"/>
@@ -18174,10 +19198,10 @@
       </p:pic>
       <p:graphicFrame>
         <p:nvGraphicFramePr>
-          <p:cNvPr id="18" name="Table 17">
+          <p:cNvPr id="14" name="Table 13">
             <a:extLst>
               <a:ext uri="{FF2B5EF4-FFF2-40B4-BE49-F238E27FC236}">
-                <a16:creationId xmlns:a16="http://schemas.microsoft.com/office/drawing/2014/main" id="{497B32AB-D86B-4864-BA88-A48E48B9E84D}"/>
+                <a16:creationId xmlns:a16="http://schemas.microsoft.com/office/drawing/2014/main" id="{F180954B-B445-4FC2-A8C7-C78D5823BE26}"/>
               </a:ext>
             </a:extLst>
           </p:cNvPr>
@@ -18187,111 +19211,44 @@
           <p:nvPr>
             <p:extLst>
               <p:ext uri="{D42A27DB-BD31-4B8C-83A1-F6EECF244321}">
-                <p14:modId xmlns:p14="http://schemas.microsoft.com/office/powerpoint/2010/main" val="1852862731"/>
+                <p14:modId xmlns:p14="http://schemas.microsoft.com/office/powerpoint/2010/main" val="4153443324"/>
               </p:ext>
             </p:extLst>
           </p:nvPr>
         </p:nvGraphicFramePr>
         <p:xfrm>
-          <a:off x="282667" y="2313208"/>
-          <a:ext cx="7267484" cy="3650990"/>
+          <a:off x="7391400" y="1993111"/>
+          <a:ext cx="4800600" cy="2517560"/>
         </p:xfrm>
         <a:graphic>
           <a:graphicData uri="http://schemas.openxmlformats.org/drawingml/2006/table">
             <a:tbl>
               <a:tblPr/>
               <a:tblGrid>
-                <a:gridCol w="5432260">
+                <a:gridCol w="4800600">
                   <a:extLst>
                     <a:ext uri="{9D8B030D-6E8A-4147-A177-3AD203B41FA5}">
-                      <a16:colId xmlns:a16="http://schemas.microsoft.com/office/drawing/2014/main" val="3356052469"/>
-                    </a:ext>
-                  </a:extLst>
-                </a:gridCol>
-                <a:gridCol w="1835224">
-                  <a:extLst>
-                    <a:ext uri="{9D8B030D-6E8A-4147-A177-3AD203B41FA5}">
-                      <a16:colId xmlns:a16="http://schemas.microsoft.com/office/drawing/2014/main" val="3317993951"/>
+                      <a16:colId xmlns:a16="http://schemas.microsoft.com/office/drawing/2014/main" val="2673914551"/>
                     </a:ext>
                   </a:extLst>
                 </a:gridCol>
               </a:tblGrid>
-              <a:tr h="503571">
+              <a:tr h="629390">
                 <a:tc>
                   <a:txBody>
                     <a:bodyPr/>
                     <a:lstStyle/>
                     <a:p>
-                      <a:pPr algn="ctr" rtl="0" fontAlgn="b"/>
+                      <a:pPr algn="ctr" fontAlgn="b"/>
                       <a:r>
-                        <a:rPr lang="en-US" sz="2400" b="1" i="0" u="none" strike="noStrike">
+                        <a:rPr lang="en-US" sz="2000" b="1" i="0" u="none" strike="noStrike" dirty="0">
                           <a:solidFill>
                             <a:srgbClr val="000000"/>
                           </a:solidFill>
                           <a:effectLst/>
                           <a:latin typeface="Calibri" panose="020F0502020204030204" pitchFamily="34" charset="0"/>
                         </a:rPr>
-                        <a:t>Feature:</a:t>
-                      </a:r>
-                    </a:p>
-                  </a:txBody>
-                  <a:tcPr marL="6350" marR="6350" marT="6350" marB="0" anchor="b">
-                    <a:lnL w="6350" cap="flat" cmpd="sng" algn="ctr">
-                      <a:solidFill>
-                        <a:srgbClr val="000000"/>
-                      </a:solidFill>
-                      <a:prstDash val="solid"/>
-                      <a:round/>
-                      <a:headEnd type="none" w="med" len="med"/>
-                      <a:tailEnd type="none" w="med" len="med"/>
-                    </a:lnL>
-                    <a:lnR w="6350" cap="flat" cmpd="sng" algn="ctr">
-                      <a:solidFill>
-                        <a:srgbClr val="000000"/>
-                      </a:solidFill>
-                      <a:prstDash val="solid"/>
-                      <a:round/>
-                      <a:headEnd type="none" w="med" len="med"/>
-                      <a:tailEnd type="none" w="med" len="med"/>
-                    </a:lnR>
-                    <a:lnT w="6350" cap="flat" cmpd="sng" algn="ctr">
-                      <a:solidFill>
-                        <a:srgbClr val="000000"/>
-                      </a:solidFill>
-                      <a:prstDash val="solid"/>
-                      <a:round/>
-                      <a:headEnd type="none" w="med" len="med"/>
-                      <a:tailEnd type="none" w="med" len="med"/>
-                    </a:lnT>
-                    <a:lnB w="6350" cap="flat" cmpd="sng" algn="ctr">
-                      <a:solidFill>
-                        <a:srgbClr val="000000"/>
-                      </a:solidFill>
-                      <a:prstDash val="solid"/>
-                      <a:round/>
-                      <a:headEnd type="none" w="med" len="med"/>
-                      <a:tailEnd type="none" w="med" len="med"/>
-                    </a:lnB>
-                    <a:solidFill>
-                      <a:srgbClr val="FFFFFF"/>
-                    </a:solidFill>
-                  </a:tcPr>
-                </a:tc>
-                <a:tc>
-                  <a:txBody>
-                    <a:bodyPr/>
-                    <a:lstStyle/>
-                    <a:p>
-                      <a:pPr algn="ctr" rtl="0" fontAlgn="b"/>
-                      <a:r>
-                        <a:rPr lang="en-US" sz="2400" b="1" i="0" u="none" strike="noStrike">
-                          <a:solidFill>
-                            <a:srgbClr val="000000"/>
-                          </a:solidFill>
-                          <a:effectLst/>
-                          <a:latin typeface="Calibri" panose="020F0502020204030204" pitchFamily="34" charset="0"/>
-                        </a:rPr>
-                        <a:t>Correlation:</a:t>
+                        <a:t>Negatively Correlated</a:t>
                       </a:r>
                     </a:p>
                   </a:txBody>
@@ -18339,17 +19296,17 @@
                 </a:tc>
                 <a:extLst>
                   <a:ext uri="{0D108BD9-81ED-4DB2-BD59-A6C34878D82A}">
-                    <a16:rowId xmlns:a16="http://schemas.microsoft.com/office/drawing/2014/main" val="282097052"/>
+                    <a16:rowId xmlns:a16="http://schemas.microsoft.com/office/drawing/2014/main" val="4116428125"/>
                   </a:ext>
                 </a:extLst>
               </a:tr>
-              <a:tr h="451252">
+              <a:tr h="629390">
                 <a:tc>
                   <a:txBody>
                     <a:bodyPr/>
                     <a:lstStyle/>
                     <a:p>
-                      <a:pPr algn="l" rtl="0" fontAlgn="b"/>
+                      <a:pPr algn="l" fontAlgn="b"/>
                       <a:r>
                         <a:rPr lang="en-US" sz="1800" b="0" i="0" u="none" strike="noStrike" dirty="0">
                           <a:solidFill>
@@ -18358,67 +19315,7 @@
                           <a:effectLst/>
                           <a:latin typeface="Calibri" panose="020F0502020204030204" pitchFamily="34" charset="0"/>
                         </a:rPr>
-                        <a:t>Exhibiting COVID-19 symptoms</a:t>
-                      </a:r>
-                    </a:p>
-                  </a:txBody>
-                  <a:tcPr marL="6350" marR="6350" marT="6350" marB="0" anchor="b">
-                    <a:lnL w="6350" cap="flat" cmpd="sng" algn="ctr">
-                      <a:solidFill>
-                        <a:srgbClr val="000000"/>
-                      </a:solidFill>
-                      <a:prstDash val="solid"/>
-                      <a:round/>
-                      <a:headEnd type="none" w="med" len="med"/>
-                      <a:tailEnd type="none" w="med" len="med"/>
-                    </a:lnL>
-                    <a:lnR w="6350" cap="flat" cmpd="sng" algn="ctr">
-                      <a:solidFill>
-                        <a:srgbClr val="000000"/>
-                      </a:solidFill>
-                      <a:prstDash val="solid"/>
-                      <a:round/>
-                      <a:headEnd type="none" w="med" len="med"/>
-                      <a:tailEnd type="none" w="med" len="med"/>
-                    </a:lnR>
-                    <a:lnT w="6350" cap="flat" cmpd="sng" algn="ctr">
-                      <a:solidFill>
-                        <a:srgbClr val="000000"/>
-                      </a:solidFill>
-                      <a:prstDash val="solid"/>
-                      <a:round/>
-                      <a:headEnd type="none" w="med" len="med"/>
-                      <a:tailEnd type="none" w="med" len="med"/>
-                    </a:lnT>
-                    <a:lnB w="6350" cap="flat" cmpd="sng" algn="ctr">
-                      <a:solidFill>
-                        <a:srgbClr val="000000"/>
-                      </a:solidFill>
-                      <a:prstDash val="solid"/>
-                      <a:round/>
-                      <a:headEnd type="none" w="med" len="med"/>
-                      <a:tailEnd type="none" w="med" len="med"/>
-                    </a:lnB>
-                    <a:solidFill>
-                      <a:srgbClr val="F2F2F2"/>
-                    </a:solidFill>
-                  </a:tcPr>
-                </a:tc>
-                <a:tc>
-                  <a:txBody>
-                    <a:bodyPr/>
-                    <a:lstStyle/>
-                    <a:p>
-                      <a:pPr algn="ctr" rtl="0" fontAlgn="b"/>
-                      <a:r>
-                        <a:rPr lang="en-US" sz="2600" b="0" i="0" u="none" strike="noStrike">
-                          <a:solidFill>
-                            <a:srgbClr val="000000"/>
-                          </a:solidFill>
-                          <a:effectLst/>
-                          <a:latin typeface="Calibri" panose="020F0502020204030204" pitchFamily="34" charset="0"/>
-                        </a:rPr>
-                        <a:t>+</a:t>
+                        <a:t>Household practiced social distancing and hygiene</a:t>
                       </a:r>
                     </a:p>
                   </a:txBody>
@@ -18466,86 +19363,26 @@
                 </a:tc>
                 <a:extLst>
                   <a:ext uri="{0D108BD9-81ED-4DB2-BD59-A6C34878D82A}">
-                    <a16:rowId xmlns:a16="http://schemas.microsoft.com/office/drawing/2014/main" val="4258238431"/>
+                    <a16:rowId xmlns:a16="http://schemas.microsoft.com/office/drawing/2014/main" val="2217189570"/>
                   </a:ext>
                 </a:extLst>
               </a:tr>
-              <a:tr h="438172">
+              <a:tr h="629390">
                 <a:tc>
                   <a:txBody>
                     <a:bodyPr/>
                     <a:lstStyle/>
                     <a:p>
-                      <a:pPr algn="l" rtl="0" fontAlgn="b"/>
+                      <a:pPr algn="l" fontAlgn="b"/>
                       <a:r>
-                        <a:rPr lang="en-US" sz="1800" b="0" i="0" u="none" strike="noStrike">
+                        <a:rPr lang="en-US" sz="1800" b="0" i="0" u="none" strike="noStrike" dirty="0">
                           <a:solidFill>
                             <a:srgbClr val="000000"/>
                           </a:solidFill>
                           <a:effectLst/>
                           <a:latin typeface="Calibri" panose="020F0502020204030204" pitchFamily="34" charset="0"/>
                         </a:rPr>
-                        <a:t>Belief in contracting the disease</a:t>
-                      </a:r>
-                    </a:p>
-                  </a:txBody>
-                  <a:tcPr marL="6350" marR="6350" marT="6350" marB="0" anchor="b">
-                    <a:lnL w="6350" cap="flat" cmpd="sng" algn="ctr">
-                      <a:solidFill>
-                        <a:srgbClr val="000000"/>
-                      </a:solidFill>
-                      <a:prstDash val="solid"/>
-                      <a:round/>
-                      <a:headEnd type="none" w="med" len="med"/>
-                      <a:tailEnd type="none" w="med" len="med"/>
-                    </a:lnL>
-                    <a:lnR w="6350" cap="flat" cmpd="sng" algn="ctr">
-                      <a:solidFill>
-                        <a:srgbClr val="000000"/>
-                      </a:solidFill>
-                      <a:prstDash val="solid"/>
-                      <a:round/>
-                      <a:headEnd type="none" w="med" len="med"/>
-                      <a:tailEnd type="none" w="med" len="med"/>
-                    </a:lnR>
-                    <a:lnT w="6350" cap="flat" cmpd="sng" algn="ctr">
-                      <a:solidFill>
-                        <a:srgbClr val="000000"/>
-                      </a:solidFill>
-                      <a:prstDash val="solid"/>
-                      <a:round/>
-                      <a:headEnd type="none" w="med" len="med"/>
-                      <a:tailEnd type="none" w="med" len="med"/>
-                    </a:lnT>
-                    <a:lnB w="6350" cap="flat" cmpd="sng" algn="ctr">
-                      <a:solidFill>
-                        <a:srgbClr val="000000"/>
-                      </a:solidFill>
-                      <a:prstDash val="solid"/>
-                      <a:round/>
-                      <a:headEnd type="none" w="med" len="med"/>
-                      <a:tailEnd type="none" w="med" len="med"/>
-                    </a:lnB>
-                    <a:solidFill>
-                      <a:srgbClr val="FFFFFF"/>
-                    </a:solidFill>
-                  </a:tcPr>
-                </a:tc>
-                <a:tc>
-                  <a:txBody>
-                    <a:bodyPr/>
-                    <a:lstStyle/>
-                    <a:p>
-                      <a:pPr algn="ctr" rtl="0" fontAlgn="b"/>
-                      <a:r>
-                        <a:rPr lang="en-US" sz="2600" b="0" i="0" u="none" strike="noStrike">
-                          <a:solidFill>
-                            <a:srgbClr val="000000"/>
-                          </a:solidFill>
-                          <a:effectLst/>
-                          <a:latin typeface="Calibri" panose="020F0502020204030204" pitchFamily="34" charset="0"/>
-                        </a:rPr>
-                        <a:t>+</a:t>
+                        <a:t>Individual practiced social distancing and hygiene</a:t>
                       </a:r>
                     </a:p>
                   </a:txBody>
@@ -18593,86 +19430,26 @@
                 </a:tc>
                 <a:extLst>
                   <a:ext uri="{0D108BD9-81ED-4DB2-BD59-A6C34878D82A}">
-                    <a16:rowId xmlns:a16="http://schemas.microsoft.com/office/drawing/2014/main" val="3976308527"/>
+                    <a16:rowId xmlns:a16="http://schemas.microsoft.com/office/drawing/2014/main" val="4135570023"/>
                   </a:ext>
                 </a:extLst>
               </a:tr>
-              <a:tr h="461062">
+              <a:tr h="629390">
                 <a:tc>
                   <a:txBody>
                     <a:bodyPr/>
                     <a:lstStyle/>
                     <a:p>
-                      <a:pPr algn="l" rtl="0" fontAlgn="b"/>
+                      <a:pPr algn="l" fontAlgn="b"/>
                       <a:r>
-                        <a:rPr lang="en-US" sz="1800" b="0" i="0" u="none" strike="noStrike">
+                        <a:rPr lang="en-US" sz="1800" b="0" i="0" u="none" strike="noStrike" dirty="0">
                           <a:solidFill>
                             <a:srgbClr val="000000"/>
                           </a:solidFill>
                           <a:effectLst/>
                           <a:latin typeface="Calibri" panose="020F0502020204030204" pitchFamily="34" charset="0"/>
                         </a:rPr>
-                        <a:t>Contact with others infected with COVID-19</a:t>
-                      </a:r>
-                    </a:p>
-                  </a:txBody>
-                  <a:tcPr marL="6350" marR="6350" marT="6350" marB="0" anchor="b">
-                    <a:lnL w="6350" cap="flat" cmpd="sng" algn="ctr">
-                      <a:solidFill>
-                        <a:srgbClr val="000000"/>
-                      </a:solidFill>
-                      <a:prstDash val="solid"/>
-                      <a:round/>
-                      <a:headEnd type="none" w="med" len="med"/>
-                      <a:tailEnd type="none" w="med" len="med"/>
-                    </a:lnL>
-                    <a:lnR w="6350" cap="flat" cmpd="sng" algn="ctr">
-                      <a:solidFill>
-                        <a:srgbClr val="000000"/>
-                      </a:solidFill>
-                      <a:prstDash val="solid"/>
-                      <a:round/>
-                      <a:headEnd type="none" w="med" len="med"/>
-                      <a:tailEnd type="none" w="med" len="med"/>
-                    </a:lnR>
-                    <a:lnT w="6350" cap="flat" cmpd="sng" algn="ctr">
-                      <a:solidFill>
-                        <a:srgbClr val="000000"/>
-                      </a:solidFill>
-                      <a:prstDash val="solid"/>
-                      <a:round/>
-                      <a:headEnd type="none" w="med" len="med"/>
-                      <a:tailEnd type="none" w="med" len="med"/>
-                    </a:lnT>
-                    <a:lnB w="6350" cap="flat" cmpd="sng" algn="ctr">
-                      <a:solidFill>
-                        <a:srgbClr val="000000"/>
-                      </a:solidFill>
-                      <a:prstDash val="solid"/>
-                      <a:round/>
-                      <a:headEnd type="none" w="med" len="med"/>
-                      <a:tailEnd type="none" w="med" len="med"/>
-                    </a:lnB>
-                    <a:solidFill>
-                      <a:srgbClr val="F2F2F2"/>
-                    </a:solidFill>
-                  </a:tcPr>
-                </a:tc>
-                <a:tc>
-                  <a:txBody>
-                    <a:bodyPr/>
-                    <a:lstStyle/>
-                    <a:p>
-                      <a:pPr algn="ctr" rtl="0" fontAlgn="b"/>
-                      <a:r>
-                        <a:rPr lang="en-US" sz="2600" b="0" i="0" u="none" strike="noStrike" dirty="0">
-                          <a:solidFill>
-                            <a:srgbClr val="000000"/>
-                          </a:solidFill>
-                          <a:effectLst/>
-                          <a:latin typeface="Calibri" panose="020F0502020204030204" pitchFamily="34" charset="0"/>
-                        </a:rPr>
-                        <a:t>+</a:t>
+                        <a:t>Individual was female</a:t>
                       </a:r>
                     </a:p>
                   </a:txBody>
@@ -18720,86 +19497,106 @@
                 </a:tc>
                 <a:extLst>
                   <a:ext uri="{0D108BD9-81ED-4DB2-BD59-A6C34878D82A}">
-                    <a16:rowId xmlns:a16="http://schemas.microsoft.com/office/drawing/2014/main" val="4162284825"/>
+                    <a16:rowId xmlns:a16="http://schemas.microsoft.com/office/drawing/2014/main" val="3499823358"/>
                   </a:ext>
                 </a:extLst>
               </a:tr>
-              <a:tr h="505960">
+            </a:tbl>
+          </a:graphicData>
+        </a:graphic>
+      </p:graphicFrame>
+      <p:pic>
+        <p:nvPicPr>
+          <p:cNvPr id="10" name="Graphic 9" descr="Woman">
+            <a:extLst>
+              <a:ext uri="{FF2B5EF4-FFF2-40B4-BE49-F238E27FC236}">
+                <a16:creationId xmlns:a16="http://schemas.microsoft.com/office/drawing/2014/main" id="{333D9716-5BAE-4E24-9452-572473DD4661}"/>
+              </a:ext>
+            </a:extLst>
+          </p:cNvPr>
+          <p:cNvPicPr>
+            <a:picLocks noChangeAspect="1"/>
+          </p:cNvPicPr>
+          <p:nvPr/>
+        </p:nvPicPr>
+        <p:blipFill>
+          <a:blip r:embed="rId6">
+            <a:extLst>
+              <a:ext uri="{28A0092B-C50C-407E-A947-70E740481C1C}">
+                <a14:useLocalDpi xmlns:a14="http://schemas.microsoft.com/office/drawing/2010/main" val="0"/>
+              </a:ext>
+              <a:ext uri="{96DAC541-7B7A-43D3-8B79-37D633B846F1}">
+                <asvg:svgBlip xmlns:asvg="http://schemas.microsoft.com/office/drawing/2016/SVG/main" r:embed="rId7"/>
+              </a:ext>
+            </a:extLst>
+          </a:blip>
+          <a:stretch>
+            <a:fillRect/>
+          </a:stretch>
+        </p:blipFill>
+        <p:spPr>
+          <a:xfrm>
+            <a:off x="9508151" y="3899730"/>
+            <a:ext cx="590134" cy="590134"/>
+          </a:xfrm>
+          <a:prstGeom prst="rect">
+            <a:avLst/>
+          </a:prstGeom>
+        </p:spPr>
+      </p:pic>
+      <p:graphicFrame>
+        <p:nvGraphicFramePr>
+          <p:cNvPr id="16" name="Table 15">
+            <a:extLst>
+              <a:ext uri="{FF2B5EF4-FFF2-40B4-BE49-F238E27FC236}">
+                <a16:creationId xmlns:a16="http://schemas.microsoft.com/office/drawing/2014/main" id="{24B1FFF8-A3F8-4F14-A2D2-2EB341F9DA11}"/>
+              </a:ext>
+            </a:extLst>
+          </p:cNvPr>
+          <p:cNvGraphicFramePr>
+            <a:graphicFrameLocks noGrp="1"/>
+          </p:cNvGraphicFramePr>
+          <p:nvPr>
+            <p:extLst>
+              <p:ext uri="{D42A27DB-BD31-4B8C-83A1-F6EECF244321}">
+                <p14:modId xmlns:p14="http://schemas.microsoft.com/office/powerpoint/2010/main" val="3751677613"/>
+              </p:ext>
+            </p:extLst>
+          </p:nvPr>
+        </p:nvGraphicFramePr>
+        <p:xfrm>
+          <a:off x="265265" y="1975308"/>
+          <a:ext cx="6843153" cy="4377348"/>
+        </p:xfrm>
+        <a:graphic>
+          <a:graphicData uri="http://schemas.openxmlformats.org/drawingml/2006/table">
+            <a:tbl>
+              <a:tblPr/>
+              <a:tblGrid>
+                <a:gridCol w="6843153">
+                  <a:extLst>
+                    <a:ext uri="{9D8B030D-6E8A-4147-A177-3AD203B41FA5}">
+                      <a16:colId xmlns:a16="http://schemas.microsoft.com/office/drawing/2014/main" val="1981975742"/>
+                    </a:ext>
+                  </a:extLst>
+                </a:gridCol>
+              </a:tblGrid>
+              <a:tr h="486372">
                 <a:tc>
                   <a:txBody>
                     <a:bodyPr/>
                     <a:lstStyle/>
                     <a:p>
-                      <a:pPr algn="l" rtl="0" fontAlgn="b"/>
+                      <a:pPr algn="ctr" fontAlgn="b"/>
                       <a:r>
-                        <a:rPr lang="en-US" sz="1800" b="0" i="0" u="none" strike="noStrike" dirty="0">
+                        <a:rPr lang="en-US" sz="1800" b="1" i="0" u="none" strike="noStrike" dirty="0">
                           <a:solidFill>
                             <a:srgbClr val="000000"/>
                           </a:solidFill>
                           <a:effectLst/>
                           <a:latin typeface="Calibri" panose="020F0502020204030204" pitchFamily="34" charset="0"/>
                         </a:rPr>
-                        <a:t>Household practiced social distancing &amp; hygiene</a:t>
-                      </a:r>
-                    </a:p>
-                  </a:txBody>
-                  <a:tcPr marL="6350" marR="6350" marT="6350" marB="0" anchor="b">
-                    <a:lnL w="6350" cap="flat" cmpd="sng" algn="ctr">
-                      <a:solidFill>
-                        <a:srgbClr val="000000"/>
-                      </a:solidFill>
-                      <a:prstDash val="solid"/>
-                      <a:round/>
-                      <a:headEnd type="none" w="med" len="med"/>
-                      <a:tailEnd type="none" w="med" len="med"/>
-                    </a:lnL>
-                    <a:lnR w="6350" cap="flat" cmpd="sng" algn="ctr">
-                      <a:solidFill>
-                        <a:srgbClr val="000000"/>
-                      </a:solidFill>
-                      <a:prstDash val="solid"/>
-                      <a:round/>
-                      <a:headEnd type="none" w="med" len="med"/>
-                      <a:tailEnd type="none" w="med" len="med"/>
-                    </a:lnR>
-                    <a:lnT w="6350" cap="flat" cmpd="sng" algn="ctr">
-                      <a:solidFill>
-                        <a:srgbClr val="000000"/>
-                      </a:solidFill>
-                      <a:prstDash val="solid"/>
-                      <a:round/>
-                      <a:headEnd type="none" w="med" len="med"/>
-                      <a:tailEnd type="none" w="med" len="med"/>
-                    </a:lnT>
-                    <a:lnB w="6350" cap="flat" cmpd="sng" algn="ctr">
-                      <a:solidFill>
-                        <a:srgbClr val="000000"/>
-                      </a:solidFill>
-                      <a:prstDash val="solid"/>
-                      <a:round/>
-                      <a:headEnd type="none" w="med" len="med"/>
-                      <a:tailEnd type="none" w="med" len="med"/>
-                    </a:lnB>
-                    <a:solidFill>
-                      <a:srgbClr val="FFFFFF"/>
-                    </a:solidFill>
-                  </a:tcPr>
-                </a:tc>
-                <a:tc>
-                  <a:txBody>
-                    <a:bodyPr/>
-                    <a:lstStyle/>
-                    <a:p>
-                      <a:pPr algn="ctr" rtl="0" fontAlgn="b"/>
-                      <a:r>
-                        <a:rPr lang="en-US" sz="2600" b="0" i="0" u="none" strike="noStrike">
-                          <a:solidFill>
-                            <a:srgbClr val="000000"/>
-                          </a:solidFill>
-                          <a:effectLst/>
-                          <a:latin typeface="Calibri" panose="020F0502020204030204" pitchFamily="34" charset="0"/>
-                        </a:rPr>
-                        <a:t>-</a:t>
+                        <a:t>Positively Correlated</a:t>
                       </a:r>
                     </a:p>
                   </a:txBody>
@@ -18847,17 +19644,17 @@
                 </a:tc>
                 <a:extLst>
                   <a:ext uri="{0D108BD9-81ED-4DB2-BD59-A6C34878D82A}">
-                    <a16:rowId xmlns:a16="http://schemas.microsoft.com/office/drawing/2014/main" val="3828410643"/>
+                    <a16:rowId xmlns:a16="http://schemas.microsoft.com/office/drawing/2014/main" val="3357503309"/>
                   </a:ext>
                 </a:extLst>
               </a:tr>
-              <a:tr h="438172">
+              <a:tr h="486372">
                 <a:tc>
                   <a:txBody>
                     <a:bodyPr/>
                     <a:lstStyle/>
                     <a:p>
-                      <a:pPr algn="l" rtl="0" fontAlgn="b"/>
+                      <a:pPr algn="l" fontAlgn="b"/>
                       <a:r>
                         <a:rPr lang="en-US" sz="1800" b="0" i="0" u="none" strike="noStrike" dirty="0">
                           <a:solidFill>
@@ -18866,67 +19663,7 @@
                           <a:effectLst/>
                           <a:latin typeface="Calibri" panose="020F0502020204030204" pitchFamily="34" charset="0"/>
                         </a:rPr>
-                        <a:t>Taking prescription medication</a:t>
-                      </a:r>
-                    </a:p>
-                  </a:txBody>
-                  <a:tcPr marL="6350" marR="6350" marT="6350" marB="0" anchor="b">
-                    <a:lnL w="6350" cap="flat" cmpd="sng" algn="ctr">
-                      <a:solidFill>
-                        <a:srgbClr val="000000"/>
-                      </a:solidFill>
-                      <a:prstDash val="solid"/>
-                      <a:round/>
-                      <a:headEnd type="none" w="med" len="med"/>
-                      <a:tailEnd type="none" w="med" len="med"/>
-                    </a:lnL>
-                    <a:lnR w="6350" cap="flat" cmpd="sng" algn="ctr">
-                      <a:solidFill>
-                        <a:srgbClr val="000000"/>
-                      </a:solidFill>
-                      <a:prstDash val="solid"/>
-                      <a:round/>
-                      <a:headEnd type="none" w="med" len="med"/>
-                      <a:tailEnd type="none" w="med" len="med"/>
-                    </a:lnR>
-                    <a:lnT w="6350" cap="flat" cmpd="sng" algn="ctr">
-                      <a:solidFill>
-                        <a:srgbClr val="000000"/>
-                      </a:solidFill>
-                      <a:prstDash val="solid"/>
-                      <a:round/>
-                      <a:headEnd type="none" w="med" len="med"/>
-                      <a:tailEnd type="none" w="med" len="med"/>
-                    </a:lnT>
-                    <a:lnB w="6350" cap="flat" cmpd="sng" algn="ctr">
-                      <a:solidFill>
-                        <a:srgbClr val="000000"/>
-                      </a:solidFill>
-                      <a:prstDash val="solid"/>
-                      <a:round/>
-                      <a:headEnd type="none" w="med" len="med"/>
-                      <a:tailEnd type="none" w="med" len="med"/>
-                    </a:lnB>
-                    <a:solidFill>
-                      <a:srgbClr val="F2F2F2"/>
-                    </a:solidFill>
-                  </a:tcPr>
-                </a:tc>
-                <a:tc>
-                  <a:txBody>
-                    <a:bodyPr/>
-                    <a:lstStyle/>
-                    <a:p>
-                      <a:pPr algn="ctr" rtl="0" fontAlgn="b"/>
-                      <a:r>
-                        <a:rPr lang="en-US" sz="2600" b="0" i="0" u="none" strike="noStrike">
-                          <a:solidFill>
-                            <a:srgbClr val="000000"/>
-                          </a:solidFill>
-                          <a:effectLst/>
-                          <a:latin typeface="Calibri" panose="020F0502020204030204" pitchFamily="34" charset="0"/>
-                        </a:rPr>
-                        <a:t>+</a:t>
+                        <a:t>Individual believed they contracted COVID-19</a:t>
                       </a:r>
                     </a:p>
                   </a:txBody>
@@ -18974,86 +19711,26 @@
                 </a:tc>
                 <a:extLst>
                   <a:ext uri="{0D108BD9-81ED-4DB2-BD59-A6C34878D82A}">
-                    <a16:rowId xmlns:a16="http://schemas.microsoft.com/office/drawing/2014/main" val="3686016146"/>
+                    <a16:rowId xmlns:a16="http://schemas.microsoft.com/office/drawing/2014/main" val="2590479393"/>
                   </a:ext>
                 </a:extLst>
               </a:tr>
-              <a:tr h="438172">
+              <a:tr h="486372">
                 <a:tc>
                   <a:txBody>
                     <a:bodyPr/>
                     <a:lstStyle/>
                     <a:p>
-                      <a:pPr algn="l" rtl="0" fontAlgn="b"/>
+                      <a:pPr algn="l" fontAlgn="b"/>
                       <a:r>
-                        <a:rPr lang="en-US" sz="1800" b="0" i="0" u="none" strike="noStrike">
+                        <a:rPr lang="en-US" sz="1800" b="0" i="0" u="none" strike="noStrike" dirty="0">
                           <a:solidFill>
                             <a:srgbClr val="000000"/>
                           </a:solidFill>
                           <a:effectLst/>
                           <a:latin typeface="Calibri" panose="020F0502020204030204" pitchFamily="34" charset="0"/>
                         </a:rPr>
-                        <a:t>Travel</a:t>
-                      </a:r>
-                    </a:p>
-                  </a:txBody>
-                  <a:tcPr marL="6350" marR="6350" marT="6350" marB="0" anchor="b">
-                    <a:lnL w="6350" cap="flat" cmpd="sng" algn="ctr">
-                      <a:solidFill>
-                        <a:srgbClr val="000000"/>
-                      </a:solidFill>
-                      <a:prstDash val="solid"/>
-                      <a:round/>
-                      <a:headEnd type="none" w="med" len="med"/>
-                      <a:tailEnd type="none" w="med" len="med"/>
-                    </a:lnL>
-                    <a:lnR w="6350" cap="flat" cmpd="sng" algn="ctr">
-                      <a:solidFill>
-                        <a:srgbClr val="000000"/>
-                      </a:solidFill>
-                      <a:prstDash val="solid"/>
-                      <a:round/>
-                      <a:headEnd type="none" w="med" len="med"/>
-                      <a:tailEnd type="none" w="med" len="med"/>
-                    </a:lnR>
-                    <a:lnT w="6350" cap="flat" cmpd="sng" algn="ctr">
-                      <a:solidFill>
-                        <a:srgbClr val="000000"/>
-                      </a:solidFill>
-                      <a:prstDash val="solid"/>
-                      <a:round/>
-                      <a:headEnd type="none" w="med" len="med"/>
-                      <a:tailEnd type="none" w="med" len="med"/>
-                    </a:lnT>
-                    <a:lnB w="6350" cap="flat" cmpd="sng" algn="ctr">
-                      <a:solidFill>
-                        <a:srgbClr val="000000"/>
-                      </a:solidFill>
-                      <a:prstDash val="solid"/>
-                      <a:round/>
-                      <a:headEnd type="none" w="med" len="med"/>
-                      <a:tailEnd type="none" w="med" len="med"/>
-                    </a:lnB>
-                    <a:solidFill>
-                      <a:srgbClr val="FFFFFF"/>
-                    </a:solidFill>
-                  </a:tcPr>
-                </a:tc>
-                <a:tc>
-                  <a:txBody>
-                    <a:bodyPr/>
-                    <a:lstStyle/>
-                    <a:p>
-                      <a:pPr algn="ctr" rtl="0" fontAlgn="b"/>
-                      <a:r>
-                        <a:rPr lang="en-US" sz="2600" b="0" i="0" u="none" strike="noStrike">
-                          <a:solidFill>
-                            <a:srgbClr val="000000"/>
-                          </a:solidFill>
-                          <a:effectLst/>
-                          <a:latin typeface="Calibri" panose="020F0502020204030204" pitchFamily="34" charset="0"/>
-                        </a:rPr>
-                        <a:t>+</a:t>
+                        <a:t>Individual exhibited COVID-19 symptoms</a:t>
                       </a:r>
                     </a:p>
                   </a:txBody>
@@ -19101,17 +19778,17 @@
                 </a:tc>
                 <a:extLst>
                   <a:ext uri="{0D108BD9-81ED-4DB2-BD59-A6C34878D82A}">
-                    <a16:rowId xmlns:a16="http://schemas.microsoft.com/office/drawing/2014/main" val="1846506930"/>
+                    <a16:rowId xmlns:a16="http://schemas.microsoft.com/office/drawing/2014/main" val="2739320367"/>
                   </a:ext>
                 </a:extLst>
               </a:tr>
-              <a:tr h="414629">
+              <a:tr h="486372">
                 <a:tc>
                   <a:txBody>
                     <a:bodyPr/>
                     <a:lstStyle/>
                     <a:p>
-                      <a:pPr algn="l" rtl="0" fontAlgn="b"/>
+                      <a:pPr algn="l" fontAlgn="b"/>
                       <a:r>
                         <a:rPr lang="en-US" sz="1800" b="0" i="0" u="none" strike="noStrike" dirty="0">
                           <a:solidFill>
@@ -19120,67 +19797,7 @@
                           <a:effectLst/>
                           <a:latin typeface="Calibri" panose="020F0502020204030204" pitchFamily="34" charset="0"/>
                         </a:rPr>
-                        <a:t>Individual practiced social distancing &amp; hygiene</a:t>
-                      </a:r>
-                    </a:p>
-                  </a:txBody>
-                  <a:tcPr marL="6350" marR="6350" marT="6350" marB="0" anchor="b">
-                    <a:lnL w="6350" cap="flat" cmpd="sng" algn="ctr">
-                      <a:solidFill>
-                        <a:srgbClr val="000000"/>
-                      </a:solidFill>
-                      <a:prstDash val="solid"/>
-                      <a:round/>
-                      <a:headEnd type="none" w="med" len="med"/>
-                      <a:tailEnd type="none" w="med" len="med"/>
-                    </a:lnL>
-                    <a:lnR w="6350" cap="flat" cmpd="sng" algn="ctr">
-                      <a:solidFill>
-                        <a:srgbClr val="000000"/>
-                      </a:solidFill>
-                      <a:prstDash val="solid"/>
-                      <a:round/>
-                      <a:headEnd type="none" w="med" len="med"/>
-                      <a:tailEnd type="none" w="med" len="med"/>
-                    </a:lnR>
-                    <a:lnT w="6350" cap="flat" cmpd="sng" algn="ctr">
-                      <a:solidFill>
-                        <a:srgbClr val="000000"/>
-                      </a:solidFill>
-                      <a:prstDash val="solid"/>
-                      <a:round/>
-                      <a:headEnd type="none" w="med" len="med"/>
-                      <a:tailEnd type="none" w="med" len="med"/>
-                    </a:lnT>
-                    <a:lnB w="6350" cap="flat" cmpd="sng" algn="ctr">
-                      <a:solidFill>
-                        <a:srgbClr val="000000"/>
-                      </a:solidFill>
-                      <a:prstDash val="solid"/>
-                      <a:round/>
-                      <a:headEnd type="none" w="med" len="med"/>
-                      <a:tailEnd type="none" w="med" len="med"/>
-                    </a:lnB>
-                    <a:solidFill>
-                      <a:srgbClr val="F2F2F2"/>
-                    </a:solidFill>
-                  </a:tcPr>
-                </a:tc>
-                <a:tc>
-                  <a:txBody>
-                    <a:bodyPr/>
-                    <a:lstStyle/>
-                    <a:p>
-                      <a:pPr algn="ctr" rtl="0" fontAlgn="b"/>
-                      <a:r>
-                        <a:rPr lang="en-US" sz="2600" b="0" i="0" u="none" strike="noStrike" dirty="0">
-                          <a:solidFill>
-                            <a:srgbClr val="000000"/>
-                          </a:solidFill>
-                          <a:effectLst/>
-                          <a:latin typeface="Calibri" panose="020F0502020204030204" pitchFamily="34" charset="0"/>
-                        </a:rPr>
-                        <a:t>-</a:t>
+                        <a:t>Individual came in contact with another who was COVID-19+</a:t>
                       </a:r>
                     </a:p>
                   </a:txBody>
@@ -19228,7 +19845,342 @@
                 </a:tc>
                 <a:extLst>
                   <a:ext uri="{0D108BD9-81ED-4DB2-BD59-A6C34878D82A}">
-                    <a16:rowId xmlns:a16="http://schemas.microsoft.com/office/drawing/2014/main" val="4212778254"/>
+                    <a16:rowId xmlns:a16="http://schemas.microsoft.com/office/drawing/2014/main" val="2177389538"/>
+                  </a:ext>
+                </a:extLst>
+              </a:tr>
+              <a:tr h="486372">
+                <a:tc>
+                  <a:txBody>
+                    <a:bodyPr/>
+                    <a:lstStyle/>
+                    <a:p>
+                      <a:pPr algn="l" fontAlgn="b"/>
+                      <a:r>
+                        <a:rPr lang="en-US" sz="1800" b="0" i="0" u="none" strike="noStrike" dirty="0">
+                          <a:solidFill>
+                            <a:srgbClr val="000000"/>
+                          </a:solidFill>
+                          <a:effectLst/>
+                          <a:latin typeface="Calibri" panose="020F0502020204030204" pitchFamily="34" charset="0"/>
+                        </a:rPr>
+                        <a:t>Individual did not respond if they believed they could die from COVID-19</a:t>
+                      </a:r>
+                    </a:p>
+                  </a:txBody>
+                  <a:tcPr marL="6350" marR="6350" marT="6350" marB="0" anchor="b">
+                    <a:lnL w="6350" cap="flat" cmpd="sng" algn="ctr">
+                      <a:solidFill>
+                        <a:srgbClr val="000000"/>
+                      </a:solidFill>
+                      <a:prstDash val="solid"/>
+                      <a:round/>
+                      <a:headEnd type="none" w="med" len="med"/>
+                      <a:tailEnd type="none" w="med" len="med"/>
+                    </a:lnL>
+                    <a:lnR w="6350" cap="flat" cmpd="sng" algn="ctr">
+                      <a:solidFill>
+                        <a:srgbClr val="000000"/>
+                      </a:solidFill>
+                      <a:prstDash val="solid"/>
+                      <a:round/>
+                      <a:headEnd type="none" w="med" len="med"/>
+                      <a:tailEnd type="none" w="med" len="med"/>
+                    </a:lnR>
+                    <a:lnT w="6350" cap="flat" cmpd="sng" algn="ctr">
+                      <a:solidFill>
+                        <a:srgbClr val="000000"/>
+                      </a:solidFill>
+                      <a:prstDash val="solid"/>
+                      <a:round/>
+                      <a:headEnd type="none" w="med" len="med"/>
+                      <a:tailEnd type="none" w="med" len="med"/>
+                    </a:lnT>
+                    <a:lnB w="6350" cap="flat" cmpd="sng" algn="ctr">
+                      <a:solidFill>
+                        <a:srgbClr val="000000"/>
+                      </a:solidFill>
+                      <a:prstDash val="solid"/>
+                      <a:round/>
+                      <a:headEnd type="none" w="med" len="med"/>
+                      <a:tailEnd type="none" w="med" len="med"/>
+                    </a:lnB>
+                    <a:solidFill>
+                      <a:srgbClr val="FFFFFF"/>
+                    </a:solidFill>
+                  </a:tcPr>
+                </a:tc>
+                <a:extLst>
+                  <a:ext uri="{0D108BD9-81ED-4DB2-BD59-A6C34878D82A}">
+                    <a16:rowId xmlns:a16="http://schemas.microsoft.com/office/drawing/2014/main" val="3692206361"/>
+                  </a:ext>
+                </a:extLst>
+              </a:tr>
+              <a:tr h="486372">
+                <a:tc>
+                  <a:txBody>
+                    <a:bodyPr/>
+                    <a:lstStyle/>
+                    <a:p>
+                      <a:pPr algn="l" fontAlgn="b"/>
+                      <a:r>
+                        <a:rPr lang="en-US" sz="1800" b="0" i="0" u="none" strike="noStrike" dirty="0">
+                          <a:solidFill>
+                            <a:srgbClr val="000000"/>
+                          </a:solidFill>
+                          <a:effectLst/>
+                          <a:latin typeface="Calibri" panose="020F0502020204030204" pitchFamily="34" charset="0"/>
+                        </a:rPr>
+                        <a:t>Individual did not respond if they believed they could die from COVID-19</a:t>
+                      </a:r>
+                    </a:p>
+                  </a:txBody>
+                  <a:tcPr marL="6350" marR="6350" marT="6350" marB="0" anchor="b">
+                    <a:lnL w="6350" cap="flat" cmpd="sng" algn="ctr">
+                      <a:solidFill>
+                        <a:srgbClr val="000000"/>
+                      </a:solidFill>
+                      <a:prstDash val="solid"/>
+                      <a:round/>
+                      <a:headEnd type="none" w="med" len="med"/>
+                      <a:tailEnd type="none" w="med" len="med"/>
+                    </a:lnL>
+                    <a:lnR w="6350" cap="flat" cmpd="sng" algn="ctr">
+                      <a:solidFill>
+                        <a:srgbClr val="000000"/>
+                      </a:solidFill>
+                      <a:prstDash val="solid"/>
+                      <a:round/>
+                      <a:headEnd type="none" w="med" len="med"/>
+                      <a:tailEnd type="none" w="med" len="med"/>
+                    </a:lnR>
+                    <a:lnT w="6350" cap="flat" cmpd="sng" algn="ctr">
+                      <a:solidFill>
+                        <a:srgbClr val="000000"/>
+                      </a:solidFill>
+                      <a:prstDash val="solid"/>
+                      <a:round/>
+                      <a:headEnd type="none" w="med" len="med"/>
+                      <a:tailEnd type="none" w="med" len="med"/>
+                    </a:lnT>
+                    <a:lnB w="6350" cap="flat" cmpd="sng" algn="ctr">
+                      <a:solidFill>
+                        <a:srgbClr val="000000"/>
+                      </a:solidFill>
+                      <a:prstDash val="solid"/>
+                      <a:round/>
+                      <a:headEnd type="none" w="med" len="med"/>
+                      <a:tailEnd type="none" w="med" len="med"/>
+                    </a:lnB>
+                    <a:solidFill>
+                      <a:srgbClr val="F2F2F2"/>
+                    </a:solidFill>
+                  </a:tcPr>
+                </a:tc>
+                <a:extLst>
+                  <a:ext uri="{0D108BD9-81ED-4DB2-BD59-A6C34878D82A}">
+                    <a16:rowId xmlns:a16="http://schemas.microsoft.com/office/drawing/2014/main" val="3551698161"/>
+                  </a:ext>
+                </a:extLst>
+              </a:tr>
+              <a:tr h="486372">
+                <a:tc>
+                  <a:txBody>
+                    <a:bodyPr/>
+                    <a:lstStyle/>
+                    <a:p>
+                      <a:pPr algn="l" fontAlgn="b"/>
+                      <a:r>
+                        <a:rPr lang="en-US" sz="1800" b="0" i="0" u="none" strike="noStrike" dirty="0">
+                          <a:solidFill>
+                            <a:srgbClr val="000000"/>
+                          </a:solidFill>
+                          <a:effectLst/>
+                          <a:latin typeface="Calibri" panose="020F0502020204030204" pitchFamily="34" charset="0"/>
+                        </a:rPr>
+                        <a:t>Individual was male</a:t>
+                      </a:r>
+                    </a:p>
+                  </a:txBody>
+                  <a:tcPr marL="6350" marR="6350" marT="6350" marB="0" anchor="b">
+                    <a:lnL w="6350" cap="flat" cmpd="sng" algn="ctr">
+                      <a:solidFill>
+                        <a:srgbClr val="000000"/>
+                      </a:solidFill>
+                      <a:prstDash val="solid"/>
+                      <a:round/>
+                      <a:headEnd type="none" w="med" len="med"/>
+                      <a:tailEnd type="none" w="med" len="med"/>
+                    </a:lnL>
+                    <a:lnR w="6350" cap="flat" cmpd="sng" algn="ctr">
+                      <a:solidFill>
+                        <a:srgbClr val="000000"/>
+                      </a:solidFill>
+                      <a:prstDash val="solid"/>
+                      <a:round/>
+                      <a:headEnd type="none" w="med" len="med"/>
+                      <a:tailEnd type="none" w="med" len="med"/>
+                    </a:lnR>
+                    <a:lnT w="6350" cap="flat" cmpd="sng" algn="ctr">
+                      <a:solidFill>
+                        <a:srgbClr val="000000"/>
+                      </a:solidFill>
+                      <a:prstDash val="solid"/>
+                      <a:round/>
+                      <a:headEnd type="none" w="med" len="med"/>
+                      <a:tailEnd type="none" w="med" len="med"/>
+                    </a:lnT>
+                    <a:lnB w="6350" cap="flat" cmpd="sng" algn="ctr">
+                      <a:solidFill>
+                        <a:srgbClr val="000000"/>
+                      </a:solidFill>
+                      <a:prstDash val="solid"/>
+                      <a:round/>
+                      <a:headEnd type="none" w="med" len="med"/>
+                      <a:tailEnd type="none" w="med" len="med"/>
+                    </a:lnB>
+                    <a:solidFill>
+                      <a:srgbClr val="FFFFFF"/>
+                    </a:solidFill>
+                  </a:tcPr>
+                </a:tc>
+                <a:extLst>
+                  <a:ext uri="{0D108BD9-81ED-4DB2-BD59-A6C34878D82A}">
+                    <a16:rowId xmlns:a16="http://schemas.microsoft.com/office/drawing/2014/main" val="1635764257"/>
+                  </a:ext>
+                </a:extLst>
+              </a:tr>
+              <a:tr h="486372">
+                <a:tc>
+                  <a:txBody>
+                    <a:bodyPr/>
+                    <a:lstStyle/>
+                    <a:p>
+                      <a:pPr algn="l" fontAlgn="b"/>
+                      <a:r>
+                        <a:rPr lang="en-US" sz="1800" b="0" i="0" u="none" strike="noStrike" dirty="0">
+                          <a:solidFill>
+                            <a:srgbClr val="000000"/>
+                          </a:solidFill>
+                          <a:effectLst/>
+                          <a:latin typeface="Calibri" panose="020F0502020204030204" pitchFamily="34" charset="0"/>
+                        </a:rPr>
+                        <a:t>Body Mass Index (kg/m** 2)</a:t>
+                      </a:r>
+                    </a:p>
+                  </a:txBody>
+                  <a:tcPr marL="6350" marR="6350" marT="6350" marB="0" anchor="b">
+                    <a:lnL w="6350" cap="flat" cmpd="sng" algn="ctr">
+                      <a:solidFill>
+                        <a:srgbClr val="000000"/>
+                      </a:solidFill>
+                      <a:prstDash val="solid"/>
+                      <a:round/>
+                      <a:headEnd type="none" w="med" len="med"/>
+                      <a:tailEnd type="none" w="med" len="med"/>
+                    </a:lnL>
+                    <a:lnR w="6350" cap="flat" cmpd="sng" algn="ctr">
+                      <a:solidFill>
+                        <a:srgbClr val="000000"/>
+                      </a:solidFill>
+                      <a:prstDash val="solid"/>
+                      <a:round/>
+                      <a:headEnd type="none" w="med" len="med"/>
+                      <a:tailEnd type="none" w="med" len="med"/>
+                    </a:lnR>
+                    <a:lnT w="6350" cap="flat" cmpd="sng" algn="ctr">
+                      <a:solidFill>
+                        <a:srgbClr val="000000"/>
+                      </a:solidFill>
+                      <a:prstDash val="solid"/>
+                      <a:round/>
+                      <a:headEnd type="none" w="med" len="med"/>
+                      <a:tailEnd type="none" w="med" len="med"/>
+                    </a:lnT>
+                    <a:lnB w="6350" cap="flat" cmpd="sng" algn="ctr">
+                      <a:solidFill>
+                        <a:srgbClr val="000000"/>
+                      </a:solidFill>
+                      <a:prstDash val="solid"/>
+                      <a:round/>
+                      <a:headEnd type="none" w="med" len="med"/>
+                      <a:tailEnd type="none" w="med" len="med"/>
+                    </a:lnB>
+                    <a:solidFill>
+                      <a:srgbClr val="F2F2F2"/>
+                    </a:solidFill>
+                  </a:tcPr>
+                </a:tc>
+                <a:extLst>
+                  <a:ext uri="{0D108BD9-81ED-4DB2-BD59-A6C34878D82A}">
+                    <a16:rowId xmlns:a16="http://schemas.microsoft.com/office/drawing/2014/main" val="844221050"/>
+                  </a:ext>
+                </a:extLst>
+              </a:tr>
+              <a:tr h="486372">
+                <a:tc>
+                  <a:txBody>
+                    <a:bodyPr/>
+                    <a:lstStyle/>
+                    <a:p>
+                      <a:pPr algn="l" fontAlgn="b"/>
+                      <a:r>
+                        <a:rPr lang="en-US" sz="1800" b="0" i="0" u="none" strike="noStrike" dirty="0">
+                          <a:solidFill>
+                            <a:srgbClr val="000000"/>
+                          </a:solidFill>
+                          <a:effectLst/>
+                          <a:latin typeface="Calibri" panose="020F0502020204030204" pitchFamily="34" charset="0"/>
+                        </a:rPr>
+                        <a:t>The individual was taking prescription medication</a:t>
+                      </a:r>
+                    </a:p>
+                  </a:txBody>
+                  <a:tcPr marL="6350" marR="6350" marT="6350" marB="0" anchor="b">
+                    <a:lnL w="6350" cap="flat" cmpd="sng" algn="ctr">
+                      <a:solidFill>
+                        <a:srgbClr val="000000"/>
+                      </a:solidFill>
+                      <a:prstDash val="solid"/>
+                      <a:round/>
+                      <a:headEnd type="none" w="med" len="med"/>
+                      <a:tailEnd type="none" w="med" len="med"/>
+                    </a:lnL>
+                    <a:lnR w="6350" cap="flat" cmpd="sng" algn="ctr">
+                      <a:solidFill>
+                        <a:srgbClr val="000000"/>
+                      </a:solidFill>
+                      <a:prstDash val="solid"/>
+                      <a:round/>
+                      <a:headEnd type="none" w="med" len="med"/>
+                      <a:tailEnd type="none" w="med" len="med"/>
+                    </a:lnR>
+                    <a:lnT w="6350" cap="flat" cmpd="sng" algn="ctr">
+                      <a:solidFill>
+                        <a:srgbClr val="000000"/>
+                      </a:solidFill>
+                      <a:prstDash val="solid"/>
+                      <a:round/>
+                      <a:headEnd type="none" w="med" len="med"/>
+                      <a:tailEnd type="none" w="med" len="med"/>
+                    </a:lnT>
+                    <a:lnB w="6350" cap="flat" cmpd="sng" algn="ctr">
+                      <a:solidFill>
+                        <a:srgbClr val="000000"/>
+                      </a:solidFill>
+                      <a:prstDash val="solid"/>
+                      <a:round/>
+                      <a:headEnd type="none" w="med" len="med"/>
+                      <a:tailEnd type="none" w="med" len="med"/>
+                    </a:lnB>
+                    <a:solidFill>
+                      <a:srgbClr val="FFFFFF"/>
+                    </a:solidFill>
+                  </a:tcPr>
+                </a:tc>
+                <a:extLst>
+                  <a:ext uri="{0D108BD9-81ED-4DB2-BD59-A6C34878D82A}">
+                    <a16:rowId xmlns:a16="http://schemas.microsoft.com/office/drawing/2014/main" val="339050399"/>
                   </a:ext>
                 </a:extLst>
               </a:tr>
@@ -19236,210 +20188,252 @@
           </a:graphicData>
         </a:graphic>
       </p:graphicFrame>
-      <p:sp>
-        <p:nvSpPr>
-          <p:cNvPr id="36" name="Flowchart: Connector 35">
+      <p:pic>
+        <p:nvPicPr>
+          <p:cNvPr id="8" name="Graphic 7" descr="Man">
             <a:extLst>
               <a:ext uri="{FF2B5EF4-FFF2-40B4-BE49-F238E27FC236}">
-                <a16:creationId xmlns:a16="http://schemas.microsoft.com/office/drawing/2014/main" id="{084BA0E7-0D0F-4DF0-8B93-9EE06DDA3C39}"/>
+                <a16:creationId xmlns:a16="http://schemas.microsoft.com/office/drawing/2014/main" id="{92E47B00-26A8-40A4-A8F2-A1E065E68FC9}"/>
               </a:ext>
             </a:extLst>
           </p:cNvPr>
-          <p:cNvSpPr/>
+          <p:cNvPicPr>
+            <a:picLocks noChangeAspect="1"/>
+          </p:cNvPicPr>
           <p:nvPr/>
-        </p:nvSpPr>
+        </p:nvPicPr>
+        <p:blipFill>
+          <a:blip r:embed="rId8">
+            <a:extLst>
+              <a:ext uri="{28A0092B-C50C-407E-A947-70E740481C1C}">
+                <a14:useLocalDpi xmlns:a14="http://schemas.microsoft.com/office/drawing/2010/main" val="0"/>
+              </a:ext>
+              <a:ext uri="{96DAC541-7B7A-43D3-8B79-37D633B846F1}">
+                <asvg:svgBlip xmlns:asvg="http://schemas.microsoft.com/office/drawing/2016/SVG/main" r:embed="rId9"/>
+              </a:ext>
+            </a:extLst>
+          </a:blip>
+          <a:stretch>
+            <a:fillRect/>
+          </a:stretch>
+        </p:blipFill>
         <p:spPr>
           <a:xfrm>
-            <a:off x="4948311" y="3814145"/>
-            <a:ext cx="166967" cy="173280"/>
+            <a:off x="3087253" y="4881566"/>
+            <a:ext cx="1011495" cy="1011495"/>
           </a:xfrm>
-          <a:prstGeom prst="flowChartConnector">
+          <a:prstGeom prst="rect">
             <a:avLst/>
           </a:prstGeom>
-          <a:solidFill>
-            <a:schemeClr val="accent1">
-              <a:lumMod val="75000"/>
-            </a:schemeClr>
-          </a:solidFill>
         </p:spPr>
-        <p:style>
-          <a:lnRef idx="2">
-            <a:schemeClr val="accent1">
-              <a:shade val="50000"/>
-            </a:schemeClr>
-          </a:lnRef>
-          <a:fillRef idx="1">
-            <a:schemeClr val="accent1"/>
-          </a:fillRef>
-          <a:effectRef idx="0">
-            <a:schemeClr val="accent1"/>
-          </a:effectRef>
-          <a:fontRef idx="minor">
-            <a:schemeClr val="lt1"/>
-          </a:fontRef>
-        </p:style>
-        <p:txBody>
-          <a:bodyPr rtlCol="0" anchor="ctr"/>
-          <a:lstStyle/>
-          <a:p>
-            <a:pPr algn="ctr"/>
-            <a:endParaRPr lang="en-US"/>
-          </a:p>
-        </p:txBody>
-      </p:sp>
-      <p:sp>
-        <p:nvSpPr>
-          <p:cNvPr id="45" name="Flowchart: Connector 44">
+      </p:pic>
+      <p:pic>
+        <p:nvPicPr>
+          <p:cNvPr id="12" name="Picture 11">
             <a:extLst>
               <a:ext uri="{FF2B5EF4-FFF2-40B4-BE49-F238E27FC236}">
-                <a16:creationId xmlns:a16="http://schemas.microsoft.com/office/drawing/2014/main" id="{57F034DA-6C66-4110-B7B3-4427168E7D42}"/>
+                <a16:creationId xmlns:a16="http://schemas.microsoft.com/office/drawing/2014/main" id="{F9048C64-EBB8-478E-84BD-7F0514D6D944}"/>
               </a:ext>
             </a:extLst>
           </p:cNvPr>
-          <p:cNvSpPr/>
+          <p:cNvPicPr>
+            <a:picLocks noChangeAspect="1"/>
+          </p:cNvPicPr>
           <p:nvPr/>
-        </p:nvSpPr>
+        </p:nvPicPr>
+        <p:blipFill>
+          <a:blip r:embed="rId10">
+            <a:duotone>
+              <a:schemeClr val="accent1">
+                <a:shade val="45000"/>
+                <a:satMod val="135000"/>
+              </a:schemeClr>
+              <a:prstClr val="white"/>
+            </a:duotone>
+          </a:blip>
+          <a:stretch>
+            <a:fillRect/>
+          </a:stretch>
+        </p:blipFill>
         <p:spPr>
           <a:xfrm>
-            <a:off x="4948311" y="5221640"/>
-            <a:ext cx="166967" cy="173280"/>
+            <a:off x="6303040" y="3123020"/>
+            <a:ext cx="678957" cy="745896"/>
           </a:xfrm>
-          <a:prstGeom prst="flowChartConnector">
+          <a:prstGeom prst="rect">
             <a:avLst/>
           </a:prstGeom>
-          <a:solidFill>
-            <a:schemeClr val="accent1">
-              <a:lumMod val="75000"/>
-            </a:schemeClr>
-          </a:solidFill>
         </p:spPr>
-        <p:style>
-          <a:lnRef idx="2">
-            <a:schemeClr val="accent1">
-              <a:shade val="50000"/>
-            </a:schemeClr>
-          </a:lnRef>
-          <a:fillRef idx="1">
-            <a:schemeClr val="accent1"/>
-          </a:fillRef>
-          <a:effectRef idx="0">
-            <a:schemeClr val="accent1"/>
-          </a:effectRef>
-          <a:fontRef idx="minor">
-            <a:schemeClr val="lt1"/>
-          </a:fontRef>
-        </p:style>
-        <p:txBody>
-          <a:bodyPr rtlCol="0" anchor="ctr"/>
-          <a:lstStyle/>
-          <a:p>
-            <a:pPr algn="ctr"/>
-            <a:endParaRPr lang="en-US"/>
-          </a:p>
-        </p:txBody>
-      </p:sp>
-      <p:sp>
-        <p:nvSpPr>
-          <p:cNvPr id="46" name="Flowchart: Connector 45">
+      </p:pic>
+      <p:pic>
+        <p:nvPicPr>
+          <p:cNvPr id="1028" name="Picture 4" descr="Predicting the Dynamics of Non-Adherence | CVS Health Payor Solutions">
             <a:extLst>
               <a:ext uri="{FF2B5EF4-FFF2-40B4-BE49-F238E27FC236}">
-                <a16:creationId xmlns:a16="http://schemas.microsoft.com/office/drawing/2014/main" id="{F8720CAE-7F4F-4F8E-B9D4-972E917D87E9}"/>
+                <a16:creationId xmlns:a16="http://schemas.microsoft.com/office/drawing/2014/main" id="{42059801-7FB1-469D-A443-4B769B4192C6}"/>
               </a:ext>
             </a:extLst>
           </p:cNvPr>
-          <p:cNvSpPr/>
+          <p:cNvPicPr>
+            <a:picLocks noChangeAspect="1" noChangeArrowheads="1"/>
+          </p:cNvPicPr>
           <p:nvPr/>
-        </p:nvSpPr>
-        <p:spPr>
+        </p:nvPicPr>
+        <p:blipFill>
+          <a:blip r:embed="rId11" cstate="print">
+            <a:duotone>
+              <a:schemeClr val="accent1">
+                <a:shade val="45000"/>
+                <a:satMod val="135000"/>
+              </a:schemeClr>
+              <a:prstClr val="white"/>
+            </a:duotone>
+            <a:extLst>
+              <a:ext uri="{28A0092B-C50C-407E-A947-70E740481C1C}">
+                <a14:useLocalDpi xmlns:a14="http://schemas.microsoft.com/office/drawing/2010/main" val="0"/>
+              </a:ext>
+            </a:extLst>
+          </a:blip>
+          <a:srcRect/>
+          <a:stretch>
+            <a:fillRect/>
+          </a:stretch>
+        </p:blipFill>
+        <p:spPr bwMode="auto">
           <a:xfrm>
-            <a:off x="4948310" y="4331924"/>
-            <a:ext cx="166967" cy="173280"/>
+            <a:off x="5032392" y="5941000"/>
+            <a:ext cx="373858" cy="373858"/>
           </a:xfrm>
-          <a:prstGeom prst="flowChartConnector">
+          <a:prstGeom prst="rect">
             <a:avLst/>
           </a:prstGeom>
-          <a:solidFill>
-            <a:schemeClr val="accent1">
-              <a:lumMod val="75000"/>
-            </a:schemeClr>
-          </a:solidFill>
+          <a:noFill/>
+          <a:extLst>
+            <a:ext uri="{909E8E84-426E-40DD-AFC4-6F175D3DCCD1}">
+              <a14:hiddenFill xmlns:a14="http://schemas.microsoft.com/office/drawing/2010/main">
+                <a:solidFill>
+                  <a:srgbClr val="FFFFFF"/>
+                </a:solidFill>
+              </a14:hiddenFill>
+            </a:ext>
+          </a:extLst>
         </p:spPr>
-        <p:style>
-          <a:lnRef idx="2">
-            <a:schemeClr val="accent1">
-              <a:shade val="50000"/>
-            </a:schemeClr>
-          </a:lnRef>
-          <a:fillRef idx="1">
-            <a:schemeClr val="accent1"/>
-          </a:fillRef>
-          <a:effectRef idx="0">
-            <a:schemeClr val="accent1"/>
-          </a:effectRef>
-          <a:fontRef idx="minor">
-            <a:schemeClr val="lt1"/>
-          </a:fontRef>
-        </p:style>
-        <p:txBody>
-          <a:bodyPr rtlCol="0" anchor="ctr"/>
-          <a:lstStyle/>
-          <a:p>
-            <a:pPr algn="ctr"/>
-            <a:endParaRPr lang="en-US"/>
-          </a:p>
-        </p:txBody>
-      </p:sp>
-      <p:sp>
-        <p:nvSpPr>
-          <p:cNvPr id="47" name="Flowchart: Connector 46">
+      </p:pic>
+      <p:pic>
+        <p:nvPicPr>
+          <p:cNvPr id="13" name="Picture 12">
             <a:extLst>
               <a:ext uri="{FF2B5EF4-FFF2-40B4-BE49-F238E27FC236}">
-                <a16:creationId xmlns:a16="http://schemas.microsoft.com/office/drawing/2014/main" id="{4D683B1B-66EC-4958-9CCC-66EB1FA25D27}"/>
+                <a16:creationId xmlns:a16="http://schemas.microsoft.com/office/drawing/2014/main" id="{10254A40-AA27-4771-AF19-EC6B53A2D991}"/>
               </a:ext>
             </a:extLst>
           </p:cNvPr>
-          <p:cNvSpPr/>
+          <p:cNvPicPr>
+            <a:picLocks noChangeAspect="1"/>
+          </p:cNvPicPr>
           <p:nvPr/>
-        </p:nvSpPr>
+        </p:nvPicPr>
+        <p:blipFill>
+          <a:blip r:embed="rId12">
+            <a:duotone>
+              <a:schemeClr val="accent1">
+                <a:shade val="45000"/>
+                <a:satMod val="135000"/>
+              </a:schemeClr>
+              <a:prstClr val="white"/>
+            </a:duotone>
+          </a:blip>
+          <a:stretch>
+            <a:fillRect/>
+          </a:stretch>
+        </p:blipFill>
         <p:spPr>
           <a:xfrm>
-            <a:off x="4948310" y="5652779"/>
-            <a:ext cx="166967" cy="173280"/>
+            <a:off x="4891387" y="2421801"/>
+            <a:ext cx="752778" cy="701219"/>
           </a:xfrm>
-          <a:prstGeom prst="flowChartConnector">
+          <a:prstGeom prst="rect">
             <a:avLst/>
           </a:prstGeom>
-          <a:solidFill>
-            <a:schemeClr val="accent1">
-              <a:lumMod val="75000"/>
-            </a:schemeClr>
-          </a:solidFill>
         </p:spPr>
-        <p:style>
-          <a:lnRef idx="2">
-            <a:schemeClr val="accent1">
-              <a:shade val="50000"/>
-            </a:schemeClr>
-          </a:lnRef>
-          <a:fillRef idx="1">
-            <a:schemeClr val="accent1"/>
-          </a:fillRef>
-          <a:effectRef idx="0">
-            <a:schemeClr val="accent1"/>
-          </a:effectRef>
-          <a:fontRef idx="minor">
-            <a:schemeClr val="lt1"/>
-          </a:fontRef>
-        </p:style>
-        <p:txBody>
-          <a:bodyPr rtlCol="0" anchor="ctr"/>
-          <a:lstStyle/>
-          <a:p>
-            <a:pPr algn="ctr"/>
-            <a:endParaRPr lang="en-US"/>
-          </a:p>
-        </p:txBody>
-      </p:sp>
+      </p:pic>
+      <p:pic>
+        <p:nvPicPr>
+          <p:cNvPr id="11" name="Picture 10">
+            <a:extLst>
+              <a:ext uri="{FF2B5EF4-FFF2-40B4-BE49-F238E27FC236}">
+                <a16:creationId xmlns:a16="http://schemas.microsoft.com/office/drawing/2014/main" id="{020F6A76-B802-463E-AFA8-CB77B75BAA30}"/>
+              </a:ext>
+            </a:extLst>
+          </p:cNvPr>
+          <p:cNvPicPr>
+            <a:picLocks noChangeAspect="1"/>
+          </p:cNvPicPr>
+          <p:nvPr/>
+        </p:nvPicPr>
+        <p:blipFill>
+          <a:blip r:embed="rId13">
+            <a:duotone>
+              <a:schemeClr val="accent1">
+                <a:shade val="45000"/>
+                <a:satMod val="135000"/>
+              </a:schemeClr>
+              <a:prstClr val="white"/>
+            </a:duotone>
+          </a:blip>
+          <a:stretch>
+            <a:fillRect/>
+          </a:stretch>
+        </p:blipFill>
+        <p:spPr>
+          <a:xfrm>
+            <a:off x="5667356" y="2736085"/>
+            <a:ext cx="573041" cy="745896"/>
+          </a:xfrm>
+          <a:prstGeom prst="rect">
+            <a:avLst/>
+          </a:prstGeom>
+        </p:spPr>
+      </p:pic>
+      <p:pic>
+        <p:nvPicPr>
+          <p:cNvPr id="22" name="Graphic 21" descr="Add">
+            <a:extLst>
+              <a:ext uri="{FF2B5EF4-FFF2-40B4-BE49-F238E27FC236}">
+                <a16:creationId xmlns:a16="http://schemas.microsoft.com/office/drawing/2014/main" id="{E663DCC7-E322-4876-8553-F994C06265FC}"/>
+              </a:ext>
+            </a:extLst>
+          </p:cNvPr>
+          <p:cNvPicPr>
+            <a:picLocks noChangeAspect="1"/>
+          </p:cNvPicPr>
+          <p:nvPr/>
+        </p:nvPicPr>
+        <p:blipFill>
+          <a:blip r:embed="rId14" cstate="print">
+            <a:extLst>
+              <a:ext uri="{28A0092B-C50C-407E-A947-70E740481C1C}">
+                <a14:useLocalDpi xmlns:a14="http://schemas.microsoft.com/office/drawing/2010/main" val="0"/>
+              </a:ext>
+              <a:ext uri="{96DAC541-7B7A-43D3-8B79-37D633B846F1}">
+                <asvg:svgBlip xmlns:asvg="http://schemas.microsoft.com/office/drawing/2016/SVG/main" r:embed="rId15"/>
+              </a:ext>
+            </a:extLst>
+          </a:blip>
+          <a:stretch>
+            <a:fillRect/>
+          </a:stretch>
+        </p:blipFill>
+        <p:spPr>
+          <a:xfrm>
+            <a:off x="1932016" y="2045785"/>
+            <a:ext cx="381000" cy="381000"/>
+          </a:xfrm>
+          <a:prstGeom prst="rect">
+            <a:avLst/>
+          </a:prstGeom>
+        </p:spPr>
+      </p:pic>
     </p:spTree>
     <p:extLst>
       <p:ext uri="{BB962C8B-B14F-4D97-AF65-F5344CB8AC3E}">
@@ -19462,168 +20456,6 @@
       </p:transition>
     </mc:Fallback>
   </mc:AlternateContent>
-  <p:timing>
-    <p:tnLst>
-      <p:par>
-        <p:cTn id="1" dur="indefinite" restart="never" nodeType="tmRoot">
-          <p:childTnLst>
-            <p:seq concurrent="1" nextAc="seek">
-              <p:cTn id="2" dur="indefinite" nodeType="mainSeq">
-                <p:childTnLst>
-                  <p:par>
-                    <p:cTn id="3" fill="hold">
-                      <p:stCondLst>
-                        <p:cond delay="indefinite"/>
-                      </p:stCondLst>
-                      <p:childTnLst>
-                        <p:par>
-                          <p:cTn id="4" fill="hold">
-                            <p:stCondLst>
-                              <p:cond delay="0"/>
-                            </p:stCondLst>
-                            <p:childTnLst>
-                              <p:par>
-                                <p:cTn id="5" presetID="1" presetClass="entr" presetSubtype="0" fill="hold" grpId="0" nodeType="clickEffect">
-                                  <p:stCondLst>
-                                    <p:cond delay="0"/>
-                                  </p:stCondLst>
-                                  <p:childTnLst>
-                                    <p:set>
-                                      <p:cBhvr>
-                                        <p:cTn id="6" dur="1" fill="hold">
-                                          <p:stCondLst>
-                                            <p:cond delay="0"/>
-                                          </p:stCondLst>
-                                        </p:cTn>
-                                        <p:tgtEl>
-                                          <p:spTgt spid="45"/>
-                                        </p:tgtEl>
-                                        <p:attrNameLst>
-                                          <p:attrName>style.visibility</p:attrName>
-                                        </p:attrNameLst>
-                                      </p:cBhvr>
-                                      <p:to>
-                                        <p:strVal val="visible"/>
-                                      </p:to>
-                                    </p:set>
-                                  </p:childTnLst>
-                                </p:cTn>
-                              </p:par>
-                              <p:par>
-                                <p:cTn id="7" presetID="1" presetClass="entr" presetSubtype="0" fill="hold" grpId="0" nodeType="withEffect">
-                                  <p:stCondLst>
-                                    <p:cond delay="0"/>
-                                  </p:stCondLst>
-                                  <p:childTnLst>
-                                    <p:set>
-                                      <p:cBhvr>
-                                        <p:cTn id="8" dur="1" fill="hold">
-                                          <p:stCondLst>
-                                            <p:cond delay="0"/>
-                                          </p:stCondLst>
-                                        </p:cTn>
-                                        <p:tgtEl>
-                                          <p:spTgt spid="47"/>
-                                        </p:tgtEl>
-                                        <p:attrNameLst>
-                                          <p:attrName>style.visibility</p:attrName>
-                                        </p:attrNameLst>
-                                      </p:cBhvr>
-                                      <p:to>
-                                        <p:strVal val="visible"/>
-                                      </p:to>
-                                    </p:set>
-                                  </p:childTnLst>
-                                </p:cTn>
-                              </p:par>
-                              <p:par>
-                                <p:cTn id="9" presetID="1" presetClass="entr" presetSubtype="0" fill="hold" grpId="0" nodeType="withEffect">
-                                  <p:stCondLst>
-                                    <p:cond delay="0"/>
-                                  </p:stCondLst>
-                                  <p:childTnLst>
-                                    <p:set>
-                                      <p:cBhvr>
-                                        <p:cTn id="10" dur="1" fill="hold">
-                                          <p:stCondLst>
-                                            <p:cond delay="0"/>
-                                          </p:stCondLst>
-                                        </p:cTn>
-                                        <p:tgtEl>
-                                          <p:spTgt spid="46"/>
-                                        </p:tgtEl>
-                                        <p:attrNameLst>
-                                          <p:attrName>style.visibility</p:attrName>
-                                        </p:attrNameLst>
-                                      </p:cBhvr>
-                                      <p:to>
-                                        <p:strVal val="visible"/>
-                                      </p:to>
-                                    </p:set>
-                                  </p:childTnLst>
-                                </p:cTn>
-                              </p:par>
-                              <p:par>
-                                <p:cTn id="11" presetID="1" presetClass="entr" presetSubtype="0" fill="hold" grpId="0" nodeType="withEffect">
-                                  <p:stCondLst>
-                                    <p:cond delay="0"/>
-                                  </p:stCondLst>
-                                  <p:childTnLst>
-                                    <p:set>
-                                      <p:cBhvr>
-                                        <p:cTn id="12" dur="1" fill="hold">
-                                          <p:stCondLst>
-                                            <p:cond delay="0"/>
-                                          </p:stCondLst>
-                                        </p:cTn>
-                                        <p:tgtEl>
-                                          <p:spTgt spid="36"/>
-                                        </p:tgtEl>
-                                        <p:attrNameLst>
-                                          <p:attrName>style.visibility</p:attrName>
-                                        </p:attrNameLst>
-                                      </p:cBhvr>
-                                      <p:to>
-                                        <p:strVal val="visible"/>
-                                      </p:to>
-                                    </p:set>
-                                  </p:childTnLst>
-                                </p:cTn>
-                              </p:par>
-                            </p:childTnLst>
-                          </p:cTn>
-                        </p:par>
-                      </p:childTnLst>
-                    </p:cTn>
-                  </p:par>
-                </p:childTnLst>
-              </p:cTn>
-              <p:prevCondLst>
-                <p:cond evt="onPrev" delay="0">
-                  <p:tgtEl>
-                    <p:sldTgt/>
-                  </p:tgtEl>
-                </p:cond>
-              </p:prevCondLst>
-              <p:nextCondLst>
-                <p:cond evt="onNext" delay="0">
-                  <p:tgtEl>
-                    <p:sldTgt/>
-                  </p:tgtEl>
-                </p:cond>
-              </p:nextCondLst>
-            </p:seq>
-          </p:childTnLst>
-        </p:cTn>
-      </p:par>
-    </p:tnLst>
-    <p:bldLst>
-      <p:bldP spid="36" grpId="0" animBg="1"/>
-      <p:bldP spid="45" grpId="0" animBg="1"/>
-      <p:bldP spid="46" grpId="0" animBg="1"/>
-      <p:bldP spid="47" grpId="0" animBg="1"/>
-    </p:bldLst>
-  </p:timing>
 </p:sld>
 </file>
 

</xml_diff>